<commit_message>
updated presentation, budget sheet hub operation
hype-V instructions. Stuff for workshop tomorrow
</commit_message>
<xml_diff>
--- a/WesternRegionalWorkshop/NGDSSustainability.pptx
+++ b/WesternRegionalWorkshop/NGDSSustainability.pptx
@@ -5,16 +5,21 @@
     <p:sldMasterId id="2147483648" r:id="rId1"/>
   </p:sldMasterIdLst>
   <p:notesMasterIdLst>
-    <p:notesMasterId r:id="rId6"/>
+    <p:notesMasterId r:id="rId11"/>
   </p:notesMasterIdLst>
   <p:handoutMasterIdLst>
-    <p:handoutMasterId r:id="rId7"/>
+    <p:handoutMasterId r:id="rId12"/>
   </p:handoutMasterIdLst>
   <p:sldIdLst>
     <p:sldId id="259" r:id="rId2"/>
     <p:sldId id="261" r:id="rId3"/>
     <p:sldId id="262" r:id="rId4"/>
     <p:sldId id="263" r:id="rId5"/>
+    <p:sldId id="264" r:id="rId6"/>
+    <p:sldId id="265" r:id="rId7"/>
+    <p:sldId id="266" r:id="rId8"/>
+    <p:sldId id="267" r:id="rId9"/>
+    <p:sldId id="268" r:id="rId10"/>
   </p:sldIdLst>
   <p:sldSz cx="9144000" cy="6858000" type="screen4x3"/>
   <p:notesSz cx="6858000" cy="9144000"/>
@@ -200,7 +205,7 @@
             <a:fld id="{D83FDC75-7F73-4A4A-A77C-09AADF00E0EA}" type="datetimeFigureOut">
               <a:rPr lang="en-US" smtClean="0"/>
               <a:pPr/>
-              <a:t>5/10/2013</a:t>
+              <a:t>5/13/2013</a:t>
             </a:fld>
             <a:endParaRPr lang="en-US" dirty="0"/>
           </a:p>
@@ -367,7 +372,7 @@
             <a:fld id="{48AEF76B-3757-4A0B-AF93-28494465C1DD}" type="datetimeFigureOut">
               <a:rPr lang="en-US" smtClean="0"/>
               <a:pPr/>
-              <a:t>5/10/2013</a:t>
+              <a:t>5/13/2013</a:t>
             </a:fld>
             <a:endParaRPr lang="en-US" dirty="0"/>
           </a:p>
@@ -1273,7 +1278,7 @@
             <a:fld id="{757B281C-5159-4971-8228-52B9A72E9ED2}" type="datetimeFigureOut">
               <a:rPr lang="en-US" smtClean="0"/>
               <a:pPr/>
-              <a:t>5/10/2013</a:t>
+              <a:t>5/13/2013</a:t>
             </a:fld>
             <a:endParaRPr lang="en-US" dirty="0"/>
           </a:p>
@@ -1375,7 +1380,7 @@
             <a:fld id="{757B281C-5159-4971-8228-52B9A72E9ED2}" type="datetimeFigureOut">
               <a:rPr lang="en-US" smtClean="0"/>
               <a:pPr/>
-              <a:t>5/10/2013</a:t>
+              <a:t>5/13/2013</a:t>
             </a:fld>
             <a:endParaRPr lang="en-US" dirty="0"/>
           </a:p>
@@ -1511,7 +1516,7 @@
             <a:fld id="{757B281C-5159-4971-8228-52B9A72E9ED2}" type="datetimeFigureOut">
               <a:rPr lang="en-US" smtClean="0"/>
               <a:pPr/>
-              <a:t>5/10/2013</a:t>
+              <a:t>5/13/2013</a:t>
             </a:fld>
             <a:endParaRPr lang="en-US" dirty="0"/>
           </a:p>
@@ -1717,7 +1722,7 @@
             <a:fld id="{757B281C-5159-4971-8228-52B9A72E9ED2}" type="datetimeFigureOut">
               <a:rPr lang="en-US" smtClean="0"/>
               <a:pPr/>
-              <a:t>5/10/2013</a:t>
+              <a:t>5/13/2013</a:t>
             </a:fld>
             <a:endParaRPr lang="en-US" dirty="0"/>
           </a:p>
@@ -2116,7 +2121,7 @@
             <a:fld id="{757B281C-5159-4971-8228-52B9A72E9ED2}" type="datetimeFigureOut">
               <a:rPr lang="en-US" smtClean="0"/>
               <a:pPr/>
-              <a:t>5/10/2013</a:t>
+              <a:t>5/13/2013</a:t>
             </a:fld>
             <a:endParaRPr lang="en-US" dirty="0"/>
           </a:p>
@@ -2416,7 +2421,7 @@
             <a:fld id="{757B281C-5159-4971-8228-52B9A72E9ED2}" type="datetimeFigureOut">
               <a:rPr lang="en-US" smtClean="0"/>
               <a:pPr/>
-              <a:t>5/10/2013</a:t>
+              <a:t>5/13/2013</a:t>
             </a:fld>
             <a:endParaRPr lang="en-US" dirty="0"/>
           </a:p>
@@ -2845,7 +2850,7 @@
             <a:fld id="{757B281C-5159-4971-8228-52B9A72E9ED2}" type="datetimeFigureOut">
               <a:rPr lang="en-US" smtClean="0"/>
               <a:pPr/>
-              <a:t>5/10/2013</a:t>
+              <a:t>5/13/2013</a:t>
             </a:fld>
             <a:endParaRPr lang="en-US" dirty="0"/>
           </a:p>
@@ -3122,7 +3127,7 @@
             <a:fld id="{757B281C-5159-4971-8228-52B9A72E9ED2}" type="datetimeFigureOut">
               <a:rPr lang="en-US" smtClean="0"/>
               <a:pPr/>
-              <a:t>5/10/2013</a:t>
+              <a:t>5/13/2013</a:t>
             </a:fld>
             <a:endParaRPr lang="en-US" dirty="0"/>
           </a:p>
@@ -3386,7 +3391,7 @@
             <a:fld id="{757B281C-5159-4971-8228-52B9A72E9ED2}" type="datetimeFigureOut">
               <a:rPr lang="en-US" smtClean="0"/>
               <a:pPr/>
-              <a:t>5/10/2013</a:t>
+              <a:t>5/13/2013</a:t>
             </a:fld>
             <a:endParaRPr lang="en-US" dirty="0"/>
           </a:p>
@@ -3556,7 +3561,7 @@
             <a:fld id="{757B281C-5159-4971-8228-52B9A72E9ED2}" type="datetimeFigureOut">
               <a:rPr lang="en-US" smtClean="0"/>
               <a:pPr/>
-              <a:t>5/10/2013</a:t>
+              <a:t>5/13/2013</a:t>
             </a:fld>
             <a:endParaRPr lang="en-US" dirty="0"/>
           </a:p>
@@ -3736,7 +3741,7 @@
             <a:fld id="{757B281C-5159-4971-8228-52B9A72E9ED2}" type="datetimeFigureOut">
               <a:rPr lang="en-US" smtClean="0"/>
               <a:pPr/>
-              <a:t>5/10/2013</a:t>
+              <a:t>5/13/2013</a:t>
             </a:fld>
             <a:endParaRPr lang="en-US" dirty="0"/>
           </a:p>
@@ -3978,7 +3983,7 @@
             <a:fld id="{757B281C-5159-4971-8228-52B9A72E9ED2}" type="datetimeFigureOut">
               <a:rPr lang="en-US" smtClean="0"/>
               <a:pPr/>
-              <a:t>5/10/2013</a:t>
+              <a:t>5/13/2013</a:t>
             </a:fld>
             <a:endParaRPr lang="en-US" dirty="0"/>
           </a:p>
@@ -4441,9 +4446,6 @@
               </a:rPr>
               <a:t>Stephen Richard and NGDS team</a:t>
             </a:r>
-            <a:endParaRPr lang="en-US" sz="2400" dirty="0" smtClean="0">
-              <a:latin typeface="+mn-lt"/>
-            </a:endParaRPr>
           </a:p>
           <a:p>
             <a:r>
@@ -4546,7 +4548,6 @@
               <a:rPr lang="en-US" dirty="0" smtClean="0"/>
               <a:t>What needs to be sustained </a:t>
             </a:r>
-            <a:endParaRPr lang="en-US" dirty="0" smtClean="0"/>
           </a:p>
           <a:p>
             <a:r>
@@ -4641,13 +4642,21 @@
           <a:p>
             <a:r>
               <a:rPr lang="en-US" dirty="0" smtClean="0"/>
-              <a:t>Paper publications as the product</a:t>
-            </a:r>
-          </a:p>
-          <a:p>
+              <a:t>From: Paper </a:t>
+            </a:r>
             <a:r>
               <a:rPr lang="en-US" dirty="0" smtClean="0"/>
-              <a:t>Information via web services as the product </a:t>
+              <a:t>publications as the product</a:t>
+            </a:r>
+          </a:p>
+          <a:p>
+            <a:r>
+              <a:rPr lang="en-US" dirty="0" smtClean="0"/>
+              <a:t>To: Information </a:t>
+            </a:r>
+            <a:r>
+              <a:rPr lang="en-US" dirty="0" smtClean="0"/>
+              <a:t>via web services as the product </a:t>
             </a:r>
             <a:endParaRPr lang="en-US" dirty="0"/>
           </a:p>
@@ -4808,7 +4817,11 @@
           <a:p>
             <a:r>
               <a:rPr lang="en-US" dirty="0" smtClean="0"/>
-              <a:t>Just like we all have web servers and web sites </a:t>
+              <a:t>We </a:t>
+            </a:r>
+            <a:r>
+              <a:rPr lang="en-US" dirty="0" smtClean="0"/>
+              <a:t>all have web servers and web sites </a:t>
             </a:r>
           </a:p>
           <a:p>
@@ -4820,7 +4833,11 @@
           <a:p>
             <a:r>
               <a:rPr lang="en-US" dirty="0" smtClean="0"/>
-              <a:t>Have to integrate web usage metrics into agency impact assessment</a:t>
+              <a:t>Have to integrate web usage metrics into agency </a:t>
+            </a:r>
+            <a:r>
+              <a:rPr lang="en-US" dirty="0" smtClean="0"/>
+              <a:t>performance assessment</a:t>
             </a:r>
             <a:endParaRPr lang="en-US" dirty="0"/>
           </a:p>
@@ -4830,6 +4847,1318 @@
     <p:extLst>
       <p:ext uri="{BB962C8B-B14F-4D97-AF65-F5344CB8AC3E}">
         <p14:creationId xmlns:p14="http://schemas.microsoft.com/office/powerpoint/2010/main" val="1464449752"/>
+      </p:ext>
+    </p:extLst>
+  </p:cSld>
+  <p:clrMapOvr>
+    <a:masterClrMapping/>
+  </p:clrMapOvr>
+  <p:transition spd="slow">
+    <p:wipe dir="d"/>
+  </p:transition>
+</p:sld>
+</file>
+
+<file path=ppt/slides/slide5.xml><?xml version="1.0" encoding="utf-8"?>
+<p:sld xmlns:a="http://schemas.openxmlformats.org/drawingml/2006/main" xmlns:r="http://schemas.openxmlformats.org/officeDocument/2006/relationships" xmlns:p="http://schemas.openxmlformats.org/presentationml/2006/main">
+  <p:cSld>
+    <p:spTree>
+      <p:nvGrpSpPr>
+        <p:cNvPr id="1" name=""/>
+        <p:cNvGrpSpPr/>
+        <p:nvPr/>
+      </p:nvGrpSpPr>
+      <p:grpSpPr>
+        <a:xfrm>
+          <a:off x="0" y="0"/>
+          <a:ext cx="0" cy="0"/>
+          <a:chOff x="0" y="0"/>
+          <a:chExt cx="0" cy="0"/>
+        </a:xfrm>
+      </p:grpSpPr>
+      <p:sp>
+        <p:nvSpPr>
+          <p:cNvPr id="2" name="Title 1"/>
+          <p:cNvSpPr>
+            <a:spLocks noGrp="1"/>
+          </p:cNvSpPr>
+          <p:nvPr>
+            <p:ph type="title"/>
+          </p:nvPr>
+        </p:nvSpPr>
+        <p:spPr/>
+        <p:txBody>
+          <a:bodyPr/>
+          <a:lstStyle/>
+          <a:p>
+            <a:r>
+              <a:rPr lang="en-US" dirty="0" smtClean="0"/>
+              <a:t>What needs to be maintained</a:t>
+            </a:r>
+            <a:endParaRPr lang="en-US" dirty="0"/>
+          </a:p>
+        </p:txBody>
+      </p:sp>
+      <p:sp>
+        <p:nvSpPr>
+          <p:cNvPr id="3" name="Content Placeholder 2"/>
+          <p:cNvSpPr>
+            <a:spLocks noGrp="1"/>
+          </p:cNvSpPr>
+          <p:nvPr>
+            <p:ph idx="1"/>
+          </p:nvPr>
+        </p:nvSpPr>
+        <p:spPr>
+          <a:xfrm>
+            <a:off x="762000" y="1596413"/>
+            <a:ext cx="8077200" cy="4575787"/>
+          </a:xfrm>
+        </p:spPr>
+        <p:txBody>
+          <a:bodyPr>
+            <a:normAutofit/>
+          </a:bodyPr>
+          <a:lstStyle/>
+          <a:p>
+            <a:r>
+              <a:rPr lang="en-US" dirty="0" smtClean="0"/>
+              <a:t>Web server:</a:t>
+            </a:r>
+          </a:p>
+          <a:p>
+            <a:pPr lvl="1"/>
+            <a:r>
+              <a:rPr lang="en-US" dirty="0" smtClean="0"/>
+              <a:t>Physical server</a:t>
+            </a:r>
+          </a:p>
+          <a:p>
+            <a:pPr lvl="1"/>
+            <a:r>
+              <a:rPr lang="en-US" dirty="0" smtClean="0"/>
+              <a:t>Cloud server</a:t>
+            </a:r>
+          </a:p>
+          <a:p>
+            <a:pPr lvl="1"/>
+            <a:r>
+              <a:rPr lang="en-US" dirty="0" smtClean="0"/>
+              <a:t>Hosting service</a:t>
+            </a:r>
+          </a:p>
+          <a:p>
+            <a:r>
+              <a:rPr lang="en-US" dirty="0" smtClean="0"/>
+              <a:t>Datasets:</a:t>
+            </a:r>
+          </a:p>
+          <a:p>
+            <a:pPr lvl="1"/>
+            <a:r>
+              <a:rPr lang="en-US" dirty="0" smtClean="0"/>
+              <a:t>Correct errors</a:t>
+            </a:r>
+          </a:p>
+          <a:p>
+            <a:pPr lvl="1"/>
+            <a:r>
+              <a:rPr lang="en-US" dirty="0" smtClean="0"/>
+              <a:t>Update with new data</a:t>
+            </a:r>
+          </a:p>
+          <a:p>
+            <a:pPr lvl="1"/>
+            <a:r>
+              <a:rPr lang="en-US" dirty="0" smtClean="0"/>
+              <a:t>Upgrade as software evolves</a:t>
+            </a:r>
+            <a:endParaRPr lang="en-US" dirty="0"/>
+          </a:p>
+        </p:txBody>
+      </p:sp>
+    </p:spTree>
+    <p:extLst>
+      <p:ext uri="{BB962C8B-B14F-4D97-AF65-F5344CB8AC3E}">
+        <p14:creationId xmlns:p14="http://schemas.microsoft.com/office/powerpoint/2010/main" val="1930345773"/>
+      </p:ext>
+    </p:extLst>
+  </p:cSld>
+  <p:clrMapOvr>
+    <a:masterClrMapping/>
+  </p:clrMapOvr>
+  <p:transition spd="slow">
+    <p:wipe dir="d"/>
+  </p:transition>
+</p:sld>
+</file>
+
+<file path=ppt/slides/slide6.xml><?xml version="1.0" encoding="utf-8"?>
+<p:sld xmlns:a="http://schemas.openxmlformats.org/drawingml/2006/main" xmlns:r="http://schemas.openxmlformats.org/officeDocument/2006/relationships" xmlns:p="http://schemas.openxmlformats.org/presentationml/2006/main">
+  <p:cSld>
+    <p:spTree>
+      <p:nvGrpSpPr>
+        <p:cNvPr id="1" name=""/>
+        <p:cNvGrpSpPr/>
+        <p:nvPr/>
+      </p:nvGrpSpPr>
+      <p:grpSpPr>
+        <a:xfrm>
+          <a:off x="0" y="0"/>
+          <a:ext cx="0" cy="0"/>
+          <a:chOff x="0" y="0"/>
+          <a:chExt cx="0" cy="0"/>
+        </a:xfrm>
+      </p:grpSpPr>
+      <p:sp>
+        <p:nvSpPr>
+          <p:cNvPr id="2" name="Title 1"/>
+          <p:cNvSpPr>
+            <a:spLocks noGrp="1"/>
+          </p:cNvSpPr>
+          <p:nvPr>
+            <p:ph type="title"/>
+          </p:nvPr>
+        </p:nvSpPr>
+        <p:spPr/>
+        <p:txBody>
+          <a:bodyPr/>
+          <a:lstStyle/>
+          <a:p>
+            <a:r>
+              <a:rPr lang="en-US" dirty="0" smtClean="0"/>
+              <a:t>What’s it cost… People	</a:t>
+            </a:r>
+            <a:endParaRPr lang="en-US" dirty="0"/>
+          </a:p>
+        </p:txBody>
+      </p:sp>
+      <p:sp>
+        <p:nvSpPr>
+          <p:cNvPr id="3" name="Content Placeholder 2"/>
+          <p:cNvSpPr>
+            <a:spLocks noGrp="1"/>
+          </p:cNvSpPr>
+          <p:nvPr>
+            <p:ph idx="1"/>
+          </p:nvPr>
+        </p:nvSpPr>
+        <p:spPr/>
+        <p:txBody>
+          <a:bodyPr/>
+          <a:lstStyle/>
+          <a:p>
+            <a:r>
+              <a:rPr lang="en-US" dirty="0" smtClean="0"/>
+              <a:t>costs calculated for AZGS, include ERE, vacation, holiday, sick…</a:t>
+            </a:r>
+            <a:endParaRPr lang="en-US" dirty="0" smtClean="0">
+              <a:solidFill>
+                <a:srgbClr val="000000"/>
+              </a:solidFill>
+            </a:endParaRPr>
+          </a:p>
+          <a:p>
+            <a:endParaRPr lang="en-US" dirty="0" smtClean="0"/>
+          </a:p>
+          <a:p>
+            <a:endParaRPr lang="en-US" dirty="0"/>
+          </a:p>
+        </p:txBody>
+      </p:sp>
+      <p:graphicFrame>
+        <p:nvGraphicFramePr>
+          <p:cNvPr id="4" name="Table 3"/>
+          <p:cNvGraphicFramePr>
+            <a:graphicFrameLocks noGrp="1"/>
+          </p:cNvGraphicFramePr>
+          <p:nvPr>
+            <p:extLst>
+              <p:ext uri="{D42A27DB-BD31-4B8C-83A1-F6EECF244321}">
+                <p14:modId xmlns:p14="http://schemas.microsoft.com/office/powerpoint/2010/main" val="3587828673"/>
+              </p:ext>
+            </p:extLst>
+          </p:nvPr>
+        </p:nvGraphicFramePr>
+        <p:xfrm>
+          <a:off x="838200" y="2895600"/>
+          <a:ext cx="7772402" cy="2841208"/>
+        </p:xfrm>
+        <a:graphic>
+          <a:graphicData uri="http://schemas.openxmlformats.org/drawingml/2006/table">
+            <a:tbl>
+              <a:tblPr>
+                <a:tableStyleId>{5C22544A-7EE6-4342-B048-85BDC9FD1C3A}</a:tableStyleId>
+              </a:tblPr>
+              <a:tblGrid>
+                <a:gridCol w="1524000"/>
+                <a:gridCol w="4343400"/>
+                <a:gridCol w="1905002"/>
+              </a:tblGrid>
+              <a:tr h="681464">
+                <a:tc>
+                  <a:txBody>
+                    <a:bodyPr/>
+                    <a:lstStyle/>
+                    <a:p>
+                      <a:pPr algn="l" fontAlgn="t"/>
+                      <a:r>
+                        <a:rPr lang="en-US" sz="2400" u="none" strike="noStrike" dirty="0">
+                          <a:effectLst/>
+                        </a:rPr>
+                        <a:t>supervisor</a:t>
+                      </a:r>
+                      <a:endParaRPr lang="en-US" sz="2400" b="0" i="0" u="none" strike="noStrike" dirty="0">
+                        <a:solidFill>
+                          <a:srgbClr val="000000"/>
+                        </a:solidFill>
+                        <a:effectLst/>
+                        <a:latin typeface="Calibri"/>
+                      </a:endParaRPr>
+                    </a:p>
+                  </a:txBody>
+                  <a:tcPr marL="7620" marR="7620" marT="7620" marB="0"/>
+                </a:tc>
+                <a:tc>
+                  <a:txBody>
+                    <a:bodyPr/>
+                    <a:lstStyle/>
+                    <a:p>
+                      <a:pPr algn="l" fontAlgn="t"/>
+                      <a:r>
+                        <a:rPr lang="en-US" sz="2400" u="none" strike="noStrike" dirty="0">
+                          <a:effectLst/>
+                        </a:rPr>
+                        <a:t>1 </a:t>
+                      </a:r>
+                      <a:r>
+                        <a:rPr lang="en-US" sz="2400" u="none" strike="noStrike" dirty="0" err="1">
+                          <a:effectLst/>
+                        </a:rPr>
+                        <a:t>hr</a:t>
+                      </a:r>
+                      <a:r>
+                        <a:rPr lang="en-US" sz="2400" u="none" strike="noStrike" dirty="0">
+                          <a:effectLst/>
+                        </a:rPr>
+                        <a:t>/</a:t>
+                      </a:r>
+                      <a:r>
+                        <a:rPr lang="en-US" sz="2400" u="none" strike="noStrike" dirty="0" err="1">
+                          <a:effectLst/>
+                        </a:rPr>
+                        <a:t>wk</a:t>
+                      </a:r>
+                      <a:endParaRPr lang="en-US" sz="2400" b="0" i="0" u="none" strike="noStrike" dirty="0">
+                        <a:solidFill>
+                          <a:srgbClr val="000000"/>
+                        </a:solidFill>
+                        <a:effectLst/>
+                        <a:latin typeface="Calibri"/>
+                      </a:endParaRPr>
+                    </a:p>
+                  </a:txBody>
+                  <a:tcPr marL="7620" marR="7620" marT="7620" marB="0"/>
+                </a:tc>
+                <a:tc>
+                  <a:txBody>
+                    <a:bodyPr/>
+                    <a:lstStyle/>
+                    <a:p>
+                      <a:pPr algn="l" fontAlgn="t"/>
+                      <a:r>
+                        <a:rPr lang="en-US" sz="2400" b="0" i="0" u="none" strike="noStrike" dirty="0">
+                          <a:solidFill>
+                            <a:srgbClr val="000000"/>
+                          </a:solidFill>
+                          <a:effectLst/>
+                          <a:latin typeface="Calibri"/>
+                        </a:rPr>
+                        <a:t> $   3,120.00 </a:t>
+                      </a:r>
+                    </a:p>
+                  </a:txBody>
+                  <a:tcPr marL="7620" marR="7620" marT="7620" marB="0"/>
+                </a:tc>
+              </a:tr>
+              <a:tr h="461536">
+                <a:tc>
+                  <a:txBody>
+                    <a:bodyPr/>
+                    <a:lstStyle/>
+                    <a:p>
+                      <a:pPr algn="l" fontAlgn="t"/>
+                      <a:r>
+                        <a:rPr lang="en-US" sz="2400" u="none" strike="noStrike">
+                          <a:effectLst/>
+                        </a:rPr>
+                        <a:t>Technician</a:t>
+                      </a:r>
+                      <a:endParaRPr lang="en-US" sz="2400" b="0" i="0" u="none" strike="noStrike">
+                        <a:solidFill>
+                          <a:srgbClr val="000000"/>
+                        </a:solidFill>
+                        <a:effectLst/>
+                        <a:latin typeface="Calibri"/>
+                      </a:endParaRPr>
+                    </a:p>
+                  </a:txBody>
+                  <a:tcPr marL="7620" marR="7620" marT="7620" marB="0"/>
+                </a:tc>
+                <a:tc>
+                  <a:txBody>
+                    <a:bodyPr/>
+                    <a:lstStyle/>
+                    <a:p>
+                      <a:pPr algn="l" fontAlgn="t"/>
+                      <a:r>
+                        <a:rPr lang="en-US" sz="2400" u="none" strike="noStrike" dirty="0">
+                          <a:effectLst/>
+                        </a:rPr>
+                        <a:t>8hrs/</a:t>
+                      </a:r>
+                      <a:r>
+                        <a:rPr lang="en-US" sz="2400" u="none" strike="noStrike" dirty="0" err="1">
+                          <a:effectLst/>
+                        </a:rPr>
+                        <a:t>mo</a:t>
+                      </a:r>
+                      <a:r>
+                        <a:rPr lang="en-US" sz="2400" u="none" strike="noStrike" dirty="0" smtClean="0">
+                          <a:effectLst/>
+                        </a:rPr>
+                        <a:t>, </a:t>
+                      </a:r>
+                      <a:r>
+                        <a:rPr lang="en-US" sz="2400" u="none" strike="noStrike" dirty="0">
+                          <a:effectLst/>
+                        </a:rPr>
+                        <a:t>every  year a big </a:t>
+                      </a:r>
+                      <a:r>
+                        <a:rPr lang="en-US" sz="2400" u="none" strike="noStrike" dirty="0" smtClean="0">
+                          <a:effectLst/>
+                        </a:rPr>
+                        <a:t>job =</a:t>
+                      </a:r>
+                      <a:r>
+                        <a:rPr lang="en-US" sz="2400" u="none" strike="noStrike" baseline="0" dirty="0" smtClean="0">
+                          <a:effectLst/>
+                        </a:rPr>
+                        <a:t> +</a:t>
+                      </a:r>
+                      <a:r>
+                        <a:rPr lang="en-US" sz="2400" u="none" strike="noStrike" dirty="0" smtClean="0">
+                          <a:effectLst/>
+                        </a:rPr>
+                        <a:t>40hr/</a:t>
+                      </a:r>
+                      <a:r>
+                        <a:rPr lang="en-US" sz="2400" u="none" strike="noStrike" dirty="0" err="1" smtClean="0">
+                          <a:effectLst/>
+                        </a:rPr>
+                        <a:t>yr</a:t>
+                      </a:r>
+                      <a:endParaRPr lang="en-US" sz="2400" b="0" i="0" u="none" strike="noStrike" dirty="0">
+                        <a:solidFill>
+                          <a:srgbClr val="000000"/>
+                        </a:solidFill>
+                        <a:effectLst/>
+                        <a:latin typeface="Calibri"/>
+                      </a:endParaRPr>
+                    </a:p>
+                  </a:txBody>
+                  <a:tcPr marL="7620" marR="7620" marT="7620" marB="0"/>
+                </a:tc>
+                <a:tc>
+                  <a:txBody>
+                    <a:bodyPr/>
+                    <a:lstStyle/>
+                    <a:p>
+                      <a:pPr algn="l" fontAlgn="t"/>
+                      <a:r>
+                        <a:rPr lang="en-US" sz="2400" b="0" i="0" u="none" strike="noStrike" dirty="0">
+                          <a:solidFill>
+                            <a:srgbClr val="000000"/>
+                          </a:solidFill>
+                          <a:effectLst/>
+                          <a:latin typeface="Calibri"/>
+                        </a:rPr>
+                        <a:t> $   6,800.00 </a:t>
+                      </a:r>
+                    </a:p>
+                    <a:p>
+                      <a:pPr algn="l" fontAlgn="b"/>
+                      <a:r>
+                        <a:rPr lang="en-US" sz="2400" b="0" i="0" u="none" strike="noStrike" dirty="0">
+                          <a:solidFill>
+                            <a:srgbClr val="000000"/>
+                          </a:solidFill>
+                          <a:effectLst/>
+                          <a:latin typeface="Calibri"/>
+                        </a:rPr>
+                        <a:t> </a:t>
+                      </a:r>
+                    </a:p>
+                  </a:txBody>
+                  <a:tcPr marL="7620" marR="7620" marT="7620" marB="0"/>
+                </a:tc>
+              </a:tr>
+              <a:tr h="681464">
+                <a:tc>
+                  <a:txBody>
+                    <a:bodyPr/>
+                    <a:lstStyle/>
+                    <a:p>
+                      <a:pPr algn="l" fontAlgn="t"/>
+                      <a:r>
+                        <a:rPr lang="en-US" sz="2400" u="none" strike="noStrike">
+                          <a:effectLst/>
+                        </a:rPr>
+                        <a:t>Content manager</a:t>
+                      </a:r>
+                      <a:endParaRPr lang="en-US" sz="2400" b="0" i="0" u="none" strike="noStrike">
+                        <a:solidFill>
+                          <a:srgbClr val="000000"/>
+                        </a:solidFill>
+                        <a:effectLst/>
+                        <a:latin typeface="Calibri"/>
+                      </a:endParaRPr>
+                    </a:p>
+                  </a:txBody>
+                  <a:tcPr marL="7620" marR="7620" marT="7620" marB="0"/>
+                </a:tc>
+                <a:tc>
+                  <a:txBody>
+                    <a:bodyPr/>
+                    <a:lstStyle/>
+                    <a:p>
+                      <a:pPr algn="l" fontAlgn="t"/>
+                      <a:r>
+                        <a:rPr lang="en-US" sz="2400" u="none" strike="noStrike" dirty="0">
+                          <a:effectLst/>
+                        </a:rPr>
+                        <a:t>4 weeks/</a:t>
+                      </a:r>
+                      <a:r>
+                        <a:rPr lang="en-US" sz="2400" u="none" strike="noStrike" dirty="0" err="1">
+                          <a:effectLst/>
+                        </a:rPr>
+                        <a:t>yr</a:t>
+                      </a:r>
+                      <a:r>
+                        <a:rPr lang="en-US" sz="2400" u="none" strike="noStrike" dirty="0">
+                          <a:effectLst/>
+                        </a:rPr>
+                        <a:t>; new content and updates come in bursts</a:t>
+                      </a:r>
+                      <a:endParaRPr lang="en-US" sz="2400" b="0" i="0" u="none" strike="noStrike" dirty="0">
+                        <a:solidFill>
+                          <a:srgbClr val="000000"/>
+                        </a:solidFill>
+                        <a:effectLst/>
+                        <a:latin typeface="Calibri"/>
+                      </a:endParaRPr>
+                    </a:p>
+                  </a:txBody>
+                  <a:tcPr marL="7620" marR="7620" marT="7620" marB="0"/>
+                </a:tc>
+                <a:tc>
+                  <a:txBody>
+                    <a:bodyPr/>
+                    <a:lstStyle/>
+                    <a:p>
+                      <a:pPr algn="l" fontAlgn="t"/>
+                      <a:r>
+                        <a:rPr lang="en-US" sz="2400" b="0" i="0" u="none" strike="noStrike" dirty="0">
+                          <a:solidFill>
+                            <a:srgbClr val="000000"/>
+                          </a:solidFill>
+                          <a:effectLst/>
+                          <a:latin typeface="Calibri"/>
+                        </a:rPr>
+                        <a:t> $   5,280.00 </a:t>
+                      </a:r>
+                    </a:p>
+                    <a:p>
+                      <a:pPr algn="l" fontAlgn="t"/>
+                      <a:r>
+                        <a:rPr lang="en-US" sz="2400" b="0" i="0" u="none" strike="noStrike" dirty="0">
+                          <a:solidFill>
+                            <a:srgbClr val="000000"/>
+                          </a:solidFill>
+                          <a:effectLst/>
+                          <a:latin typeface="Calibri"/>
+                        </a:rPr>
+                        <a:t> </a:t>
+                      </a:r>
+                    </a:p>
+                  </a:txBody>
+                  <a:tcPr marL="7620" marR="7620" marT="7620" marB="0"/>
+                </a:tc>
+              </a:tr>
+              <a:tr h="681464">
+                <a:tc>
+                  <a:txBody>
+                    <a:bodyPr/>
+                    <a:lstStyle/>
+                    <a:p>
+                      <a:pPr algn="l" fontAlgn="t"/>
+                      <a:endParaRPr lang="en-US" sz="2400" b="0" i="0" u="none" strike="noStrike">
+                        <a:solidFill>
+                          <a:srgbClr val="000000"/>
+                        </a:solidFill>
+                        <a:effectLst/>
+                        <a:latin typeface="Calibri"/>
+                      </a:endParaRPr>
+                    </a:p>
+                  </a:txBody>
+                  <a:tcPr marL="7620" marR="7620" marT="7620" marB="0"/>
+                </a:tc>
+                <a:tc>
+                  <a:txBody>
+                    <a:bodyPr/>
+                    <a:lstStyle/>
+                    <a:p>
+                      <a:pPr algn="l" fontAlgn="t"/>
+                      <a:endParaRPr lang="en-US" sz="2400" b="0" i="0" u="none" strike="noStrike" dirty="0">
+                        <a:solidFill>
+                          <a:srgbClr val="000000"/>
+                        </a:solidFill>
+                        <a:effectLst/>
+                        <a:latin typeface="Calibri"/>
+                      </a:endParaRPr>
+                    </a:p>
+                  </a:txBody>
+                  <a:tcPr marL="7620" marR="7620" marT="7620" marB="0"/>
+                </a:tc>
+                <a:tc>
+                  <a:txBody>
+                    <a:bodyPr/>
+                    <a:lstStyle/>
+                    <a:p>
+                      <a:pPr marL="0" marR="0" indent="0" algn="l" defTabSz="914400" rtl="0" eaLnBrk="1" fontAlgn="t" latinLnBrk="0" hangingPunct="1">
+                        <a:lnSpc>
+                          <a:spcPct val="100000"/>
+                        </a:lnSpc>
+                        <a:spcBef>
+                          <a:spcPts val="0"/>
+                        </a:spcBef>
+                        <a:spcAft>
+                          <a:spcPts val="0"/>
+                        </a:spcAft>
+                        <a:buClrTx/>
+                        <a:buSzTx/>
+                        <a:buFontTx/>
+                        <a:buNone/>
+                        <a:tabLst/>
+                        <a:defRPr/>
+                      </a:pPr>
+                      <a:r>
+                        <a:rPr lang="en-US" sz="2800" b="1" i="0" u="none" strike="noStrike" dirty="0" smtClean="0">
+                          <a:solidFill>
+                            <a:srgbClr val="000000"/>
+                          </a:solidFill>
+                          <a:effectLst/>
+                          <a:latin typeface="+mn-lt"/>
+                        </a:rPr>
+                        <a:t>$15,200.00 </a:t>
+                      </a:r>
+                    </a:p>
+                  </a:txBody>
+                  <a:tcPr marL="7620" marR="7620" marT="7620" marB="0"/>
+                </a:tc>
+              </a:tr>
+            </a:tbl>
+          </a:graphicData>
+        </a:graphic>
+      </p:graphicFrame>
+    </p:spTree>
+    <p:extLst>
+      <p:ext uri="{BB962C8B-B14F-4D97-AF65-F5344CB8AC3E}">
+        <p14:creationId xmlns:p14="http://schemas.microsoft.com/office/powerpoint/2010/main" val="4256028602"/>
+      </p:ext>
+    </p:extLst>
+  </p:cSld>
+  <p:clrMapOvr>
+    <a:masterClrMapping/>
+  </p:clrMapOvr>
+  <p:transition spd="slow">
+    <p:wipe dir="d"/>
+  </p:transition>
+</p:sld>
+</file>
+
+<file path=ppt/slides/slide7.xml><?xml version="1.0" encoding="utf-8"?>
+<p:sld xmlns:a="http://schemas.openxmlformats.org/drawingml/2006/main" xmlns:r="http://schemas.openxmlformats.org/officeDocument/2006/relationships" xmlns:p="http://schemas.openxmlformats.org/presentationml/2006/main">
+  <p:cSld>
+    <p:spTree>
+      <p:nvGrpSpPr>
+        <p:cNvPr id="1" name=""/>
+        <p:cNvGrpSpPr/>
+        <p:nvPr/>
+      </p:nvGrpSpPr>
+      <p:grpSpPr>
+        <a:xfrm>
+          <a:off x="0" y="0"/>
+          <a:ext cx="0" cy="0"/>
+          <a:chOff x="0" y="0"/>
+          <a:chExt cx="0" cy="0"/>
+        </a:xfrm>
+      </p:grpSpPr>
+      <p:sp>
+        <p:nvSpPr>
+          <p:cNvPr id="2" name="Title 1"/>
+          <p:cNvSpPr>
+            <a:spLocks noGrp="1"/>
+          </p:cNvSpPr>
+          <p:nvPr>
+            <p:ph type="title"/>
+          </p:nvPr>
+        </p:nvSpPr>
+        <p:spPr>
+          <a:xfrm>
+            <a:off x="685800" y="381000"/>
+            <a:ext cx="8077200" cy="1143000"/>
+          </a:xfrm>
+        </p:spPr>
+        <p:txBody>
+          <a:bodyPr/>
+          <a:lstStyle/>
+          <a:p>
+            <a:r>
+              <a:rPr lang="en-US" dirty="0" smtClean="0"/>
+              <a:t>What’s it cost:</a:t>
+            </a:r>
+            <a:r>
+              <a:rPr lang="en-US" dirty="0"/>
+              <a:t> </a:t>
+            </a:r>
+            <a:r>
+              <a:rPr lang="en-US" dirty="0" smtClean="0"/>
+              <a:t>Computers</a:t>
+            </a:r>
+            <a:endParaRPr lang="en-US" dirty="0"/>
+          </a:p>
+        </p:txBody>
+      </p:sp>
+      <p:graphicFrame>
+        <p:nvGraphicFramePr>
+          <p:cNvPr id="4" name="Content Placeholder 3"/>
+          <p:cNvGraphicFramePr>
+            <a:graphicFrameLocks noGrp="1"/>
+          </p:cNvGraphicFramePr>
+          <p:nvPr>
+            <p:ph idx="1"/>
+            <p:extLst>
+              <p:ext uri="{D42A27DB-BD31-4B8C-83A1-F6EECF244321}">
+                <p14:modId xmlns:p14="http://schemas.microsoft.com/office/powerpoint/2010/main" val="2372958236"/>
+              </p:ext>
+            </p:extLst>
+          </p:nvPr>
+        </p:nvGraphicFramePr>
+        <p:xfrm>
+          <a:off x="1064172" y="1697421"/>
+          <a:ext cx="7315200" cy="1608931"/>
+        </p:xfrm>
+        <a:graphic>
+          <a:graphicData uri="http://schemas.openxmlformats.org/drawingml/2006/table">
+            <a:tbl>
+              <a:tblPr>
+                <a:tableStyleId>{5C22544A-7EE6-4342-B048-85BDC9FD1C3A}</a:tableStyleId>
+              </a:tblPr>
+              <a:tblGrid>
+                <a:gridCol w="5489028"/>
+                <a:gridCol w="1826172"/>
+              </a:tblGrid>
+              <a:tr h="457200">
+                <a:tc>
+                  <a:txBody>
+                    <a:bodyPr/>
+                    <a:lstStyle/>
+                    <a:p>
+                      <a:pPr algn="l" fontAlgn="t"/>
+                      <a:r>
+                        <a:rPr lang="en-US" sz="2400" u="none" strike="noStrike" dirty="0">
+                          <a:effectLst/>
+                        </a:rPr>
+                        <a:t>electricity, cooling, space</a:t>
+                      </a:r>
+                      <a:endParaRPr lang="en-US" sz="2400" b="0" i="0" u="none" strike="noStrike" dirty="0">
+                        <a:solidFill>
+                          <a:srgbClr val="000000"/>
+                        </a:solidFill>
+                        <a:effectLst/>
+                        <a:latin typeface="Calibri"/>
+                      </a:endParaRPr>
+                    </a:p>
+                  </a:txBody>
+                  <a:tcPr marL="7620" marR="7620" marT="7620" marB="0"/>
+                </a:tc>
+                <a:tc>
+                  <a:txBody>
+                    <a:bodyPr/>
+                    <a:lstStyle/>
+                    <a:p>
+                      <a:pPr algn="l" fontAlgn="t"/>
+                      <a:r>
+                        <a:rPr lang="en-US" sz="2400" u="none" strike="noStrike" dirty="0">
+                          <a:effectLst/>
+                        </a:rPr>
+                        <a:t> $        800.00 </a:t>
+                      </a:r>
+                      <a:endParaRPr lang="en-US" sz="2400" b="0" i="0" u="none" strike="noStrike" dirty="0">
+                        <a:solidFill>
+                          <a:srgbClr val="000000"/>
+                        </a:solidFill>
+                        <a:effectLst/>
+                        <a:latin typeface="Calibri"/>
+                      </a:endParaRPr>
+                    </a:p>
+                  </a:txBody>
+                  <a:tcPr marL="7620" marR="7620" marT="7620" marB="0"/>
+                </a:tc>
+              </a:tr>
+              <a:tr h="412591">
+                <a:tc>
+                  <a:txBody>
+                    <a:bodyPr/>
+                    <a:lstStyle/>
+                    <a:p>
+                      <a:pPr algn="l" fontAlgn="t"/>
+                      <a:r>
+                        <a:rPr lang="en-US" sz="2400" u="none" strike="noStrike" dirty="0">
+                          <a:effectLst/>
+                        </a:rPr>
+                        <a:t>internet</a:t>
+                      </a:r>
+                      <a:endParaRPr lang="en-US" sz="2400" b="0" i="0" u="none" strike="noStrike" dirty="0">
+                        <a:solidFill>
+                          <a:srgbClr val="000000"/>
+                        </a:solidFill>
+                        <a:effectLst/>
+                        <a:latin typeface="Calibri"/>
+                      </a:endParaRPr>
+                    </a:p>
+                  </a:txBody>
+                  <a:tcPr marL="7620" marR="7620" marT="7620" marB="0"/>
+                </a:tc>
+                <a:tc>
+                  <a:txBody>
+                    <a:bodyPr/>
+                    <a:lstStyle/>
+                    <a:p>
+                      <a:pPr algn="l" fontAlgn="t"/>
+                      <a:r>
+                        <a:rPr lang="en-US" sz="2400" u="none" strike="noStrike">
+                          <a:effectLst/>
+                        </a:rPr>
+                        <a:t> $        100.00 </a:t>
+                      </a:r>
+                      <a:endParaRPr lang="en-US" sz="2400" b="0" i="0" u="none" strike="noStrike">
+                        <a:solidFill>
+                          <a:srgbClr val="000000"/>
+                        </a:solidFill>
+                        <a:effectLst/>
+                        <a:latin typeface="Calibri"/>
+                      </a:endParaRPr>
+                    </a:p>
+                  </a:txBody>
+                  <a:tcPr marL="7620" marR="7620" marT="7620" marB="0"/>
+                </a:tc>
+              </a:tr>
+              <a:tr h="730409">
+                <a:tc>
+                  <a:txBody>
+                    <a:bodyPr/>
+                    <a:lstStyle/>
+                    <a:p>
+                      <a:pPr algn="l" fontAlgn="t"/>
+                      <a:r>
+                        <a:rPr lang="en-US" sz="2400" u="none" strike="noStrike" dirty="0">
+                          <a:effectLst/>
+                        </a:rPr>
+                        <a:t>software, guess academic site license kind of pricing</a:t>
+                      </a:r>
+                      <a:endParaRPr lang="en-US" sz="2400" b="0" i="0" u="none" strike="noStrike" dirty="0">
+                        <a:solidFill>
+                          <a:srgbClr val="000000"/>
+                        </a:solidFill>
+                        <a:effectLst/>
+                        <a:latin typeface="Calibri"/>
+                      </a:endParaRPr>
+                    </a:p>
+                  </a:txBody>
+                  <a:tcPr marL="7620" marR="7620" marT="7620" marB="0"/>
+                </a:tc>
+                <a:tc>
+                  <a:txBody>
+                    <a:bodyPr/>
+                    <a:lstStyle/>
+                    <a:p>
+                      <a:pPr algn="l" fontAlgn="t"/>
+                      <a:r>
+                        <a:rPr lang="en-US" sz="2400" u="none" strike="noStrike" dirty="0">
+                          <a:effectLst/>
+                        </a:rPr>
+                        <a:t> $    1,000.00 </a:t>
+                      </a:r>
+                      <a:endParaRPr lang="en-US" sz="2400" b="0" i="0" u="none" strike="noStrike" dirty="0">
+                        <a:solidFill>
+                          <a:srgbClr val="000000"/>
+                        </a:solidFill>
+                        <a:effectLst/>
+                        <a:latin typeface="Calibri"/>
+                      </a:endParaRPr>
+                    </a:p>
+                  </a:txBody>
+                  <a:tcPr marL="7620" marR="7620" marT="7620" marB="0"/>
+                </a:tc>
+              </a:tr>
+            </a:tbl>
+          </a:graphicData>
+        </a:graphic>
+      </p:graphicFrame>
+      <p:sp>
+        <p:nvSpPr>
+          <p:cNvPr id="5" name="TextBox 4"/>
+          <p:cNvSpPr txBox="1"/>
+          <p:nvPr/>
+        </p:nvSpPr>
+        <p:spPr>
+          <a:xfrm>
+            <a:off x="1066800" y="1328089"/>
+            <a:ext cx="4668394" cy="369332"/>
+          </a:xfrm>
+          <a:prstGeom prst="rect">
+            <a:avLst/>
+          </a:prstGeom>
+          <a:noFill/>
+        </p:spPr>
+        <p:txBody>
+          <a:bodyPr wrap="none" rtlCol="0">
+            <a:spAutoFit/>
+          </a:bodyPr>
+          <a:lstStyle/>
+          <a:p>
+            <a:r>
+              <a:rPr lang="en-US" dirty="0" smtClean="0"/>
+              <a:t>Estimated cost per year; these will vary widely…</a:t>
+            </a:r>
+            <a:endParaRPr lang="en-US" dirty="0"/>
+          </a:p>
+        </p:txBody>
+      </p:sp>
+      <p:graphicFrame>
+        <p:nvGraphicFramePr>
+          <p:cNvPr id="6" name="Table 5"/>
+          <p:cNvGraphicFramePr>
+            <a:graphicFrameLocks noGrp="1"/>
+          </p:cNvGraphicFramePr>
+          <p:nvPr>
+            <p:extLst>
+              <p:ext uri="{D42A27DB-BD31-4B8C-83A1-F6EECF244321}">
+                <p14:modId xmlns:p14="http://schemas.microsoft.com/office/powerpoint/2010/main" val="54494998"/>
+              </p:ext>
+            </p:extLst>
+          </p:nvPr>
+        </p:nvGraphicFramePr>
+        <p:xfrm>
+          <a:off x="1066800" y="3505200"/>
+          <a:ext cx="7675180" cy="1470660"/>
+        </p:xfrm>
+        <a:graphic>
+          <a:graphicData uri="http://schemas.openxmlformats.org/drawingml/2006/table">
+            <a:tbl>
+              <a:tblPr>
+                <a:tableStyleId>{5C22544A-7EE6-4342-B048-85BDC9FD1C3A}</a:tableStyleId>
+              </a:tblPr>
+              <a:tblGrid>
+                <a:gridCol w="5532433"/>
+                <a:gridCol w="2142747"/>
+              </a:tblGrid>
+              <a:tr h="548640">
+                <a:tc>
+                  <a:txBody>
+                    <a:bodyPr/>
+                    <a:lstStyle/>
+                    <a:p>
+                      <a:pPr algn="l" fontAlgn="t"/>
+                      <a:r>
+                        <a:rPr lang="en-US" sz="2400" u="none" strike="noStrike" dirty="0">
+                          <a:effectLst/>
+                        </a:rPr>
+                        <a:t>Servers, storage (budget on basis of </a:t>
+                      </a:r>
+                      <a:r>
+                        <a:rPr lang="en-US" sz="2400" u="none" strike="noStrike" dirty="0" smtClean="0">
+                          <a:effectLst/>
+                        </a:rPr>
+                        <a:t>VMs running </a:t>
+                      </a:r>
+                      <a:r>
+                        <a:rPr lang="en-US" sz="2400" u="none" strike="noStrike" dirty="0">
+                          <a:effectLst/>
+                        </a:rPr>
+                        <a:t>in a local host, with a storage-area network); base on AZGS calculation with HP server running ~20 VMs, 5 year lifetime.</a:t>
+                      </a:r>
+                      <a:endParaRPr lang="en-US" sz="2400" b="0" i="0" u="none" strike="noStrike" dirty="0">
+                        <a:solidFill>
+                          <a:srgbClr val="000000"/>
+                        </a:solidFill>
+                        <a:effectLst/>
+                        <a:latin typeface="Calibri"/>
+                      </a:endParaRPr>
+                    </a:p>
+                  </a:txBody>
+                  <a:tcPr marL="7620" marR="7620" marT="7620" marB="0"/>
+                </a:tc>
+                <a:tc>
+                  <a:txBody>
+                    <a:bodyPr/>
+                    <a:lstStyle/>
+                    <a:p>
+                      <a:pPr algn="l" fontAlgn="t"/>
+                      <a:r>
+                        <a:rPr lang="en-US" sz="2400" u="none" strike="noStrike" dirty="0">
+                          <a:effectLst/>
+                        </a:rPr>
+                        <a:t> </a:t>
+                      </a:r>
+                      <a:r>
+                        <a:rPr lang="en-US" sz="2400" u="none" strike="noStrike" dirty="0" smtClean="0">
+                          <a:effectLst/>
+                        </a:rPr>
+                        <a:t>$500.00</a:t>
+                      </a:r>
+                      <a:r>
+                        <a:rPr lang="en-US" sz="2400" u="none" strike="noStrike" baseline="0" dirty="0" smtClean="0">
+                          <a:effectLst/>
+                        </a:rPr>
+                        <a:t> </a:t>
+                      </a:r>
+                      <a:r>
+                        <a:rPr lang="en-US" sz="1600" u="none" strike="noStrike" baseline="0" dirty="0" smtClean="0">
+                          <a:effectLst/>
+                        </a:rPr>
+                        <a:t>/</a:t>
+                      </a:r>
+                      <a:r>
+                        <a:rPr lang="en-US" sz="1600" u="none" strike="noStrike" baseline="0" dirty="0" err="1" smtClean="0">
+                          <a:effectLst/>
+                        </a:rPr>
+                        <a:t>yr</a:t>
+                      </a:r>
+                      <a:r>
+                        <a:rPr lang="en-US" sz="1600" u="none" strike="noStrike" baseline="0" dirty="0" smtClean="0">
+                          <a:effectLst/>
+                        </a:rPr>
+                        <a:t> per VM; </a:t>
+                      </a:r>
+                    </a:p>
+                    <a:p>
+                      <a:pPr algn="l" fontAlgn="t"/>
+                      <a:r>
+                        <a:rPr lang="en-US" sz="2400" u="none" strike="noStrike" baseline="0" dirty="0" smtClean="0">
+                          <a:effectLst/>
+                        </a:rPr>
+                        <a:t>est. $</a:t>
+                      </a:r>
+                      <a:r>
+                        <a:rPr lang="en-US" sz="2400" b="1" u="none" strike="noStrike" baseline="0" dirty="0" smtClean="0">
+                          <a:effectLst/>
+                        </a:rPr>
+                        <a:t>1200 /</a:t>
+                      </a:r>
+                      <a:r>
+                        <a:rPr lang="en-US" sz="2400" b="1" u="none" strike="noStrike" baseline="0" dirty="0" err="1" smtClean="0">
+                          <a:effectLst/>
+                        </a:rPr>
+                        <a:t>yr</a:t>
+                      </a:r>
+                      <a:endParaRPr lang="en-US" sz="2400" b="1" i="0" u="none" strike="noStrike" dirty="0">
+                        <a:solidFill>
+                          <a:srgbClr val="000000"/>
+                        </a:solidFill>
+                        <a:effectLst/>
+                        <a:latin typeface="Calibri"/>
+                      </a:endParaRPr>
+                    </a:p>
+                  </a:txBody>
+                  <a:tcPr marL="7620" marR="7620" marT="7620" marB="0"/>
+                </a:tc>
+              </a:tr>
+            </a:tbl>
+          </a:graphicData>
+        </a:graphic>
+      </p:graphicFrame>
+      <p:sp>
+        <p:nvSpPr>
+          <p:cNvPr id="10" name="TextBox 9"/>
+          <p:cNvSpPr txBox="1"/>
+          <p:nvPr/>
+        </p:nvSpPr>
+        <p:spPr>
+          <a:xfrm flipH="1">
+            <a:off x="3581400" y="5255566"/>
+            <a:ext cx="5212081" cy="461665"/>
+          </a:xfrm>
+          <a:prstGeom prst="rect">
+            <a:avLst/>
+          </a:prstGeom>
+          <a:noFill/>
+        </p:spPr>
+        <p:txBody>
+          <a:bodyPr wrap="square" rtlCol="0">
+            <a:spAutoFit/>
+          </a:bodyPr>
+          <a:lstStyle/>
+          <a:p>
+            <a:r>
+              <a:rPr lang="en-US" sz="2400" b="1" dirty="0"/>
+              <a:t>subtotal computer	 $3,100.00 </a:t>
+            </a:r>
+          </a:p>
+        </p:txBody>
+      </p:sp>
+    </p:spTree>
+    <p:extLst>
+      <p:ext uri="{BB962C8B-B14F-4D97-AF65-F5344CB8AC3E}">
+        <p14:creationId xmlns:p14="http://schemas.microsoft.com/office/powerpoint/2010/main" val="3654602520"/>
+      </p:ext>
+    </p:extLst>
+  </p:cSld>
+  <p:clrMapOvr>
+    <a:masterClrMapping/>
+  </p:clrMapOvr>
+  <p:transition spd="slow">
+    <p:wipe dir="d"/>
+  </p:transition>
+</p:sld>
+</file>
+
+<file path=ppt/slides/slide8.xml><?xml version="1.0" encoding="utf-8"?>
+<p:sld xmlns:a="http://schemas.openxmlformats.org/drawingml/2006/main" xmlns:r="http://schemas.openxmlformats.org/officeDocument/2006/relationships" xmlns:p="http://schemas.openxmlformats.org/presentationml/2006/main">
+  <p:cSld>
+    <p:spTree>
+      <p:nvGrpSpPr>
+        <p:cNvPr id="1" name=""/>
+        <p:cNvGrpSpPr/>
+        <p:nvPr/>
+      </p:nvGrpSpPr>
+      <p:grpSpPr>
+        <a:xfrm>
+          <a:off x="0" y="0"/>
+          <a:ext cx="0" cy="0"/>
+          <a:chOff x="0" y="0"/>
+          <a:chExt cx="0" cy="0"/>
+        </a:xfrm>
+      </p:grpSpPr>
+      <p:sp>
+        <p:nvSpPr>
+          <p:cNvPr id="2" name="Title 1"/>
+          <p:cNvSpPr>
+            <a:spLocks noGrp="1"/>
+          </p:cNvSpPr>
+          <p:nvPr>
+            <p:ph type="title"/>
+          </p:nvPr>
+        </p:nvSpPr>
+        <p:spPr/>
+        <p:txBody>
+          <a:bodyPr>
+            <a:normAutofit/>
+          </a:bodyPr>
+          <a:lstStyle/>
+          <a:p>
+            <a:r>
+              <a:rPr lang="en-US" dirty="0" smtClean="0"/>
+              <a:t>Grand Total:</a:t>
+            </a:r>
+            <a:endParaRPr lang="en-US" dirty="0"/>
+          </a:p>
+        </p:txBody>
+      </p:sp>
+      <p:sp>
+        <p:nvSpPr>
+          <p:cNvPr id="3" name="Content Placeholder 2"/>
+          <p:cNvSpPr>
+            <a:spLocks noGrp="1"/>
+          </p:cNvSpPr>
+          <p:nvPr>
+            <p:ph idx="1"/>
+          </p:nvPr>
+        </p:nvSpPr>
+        <p:spPr/>
+        <p:txBody>
+          <a:bodyPr/>
+          <a:lstStyle/>
+          <a:p>
+            <a:r>
+              <a:rPr lang="en-US" b="1" dirty="0"/>
+              <a:t>$</a:t>
+            </a:r>
+            <a:r>
+              <a:rPr lang="en-US" b="1" dirty="0" smtClean="0"/>
+              <a:t>18,300.00   </a:t>
+            </a:r>
+            <a:r>
+              <a:rPr lang="en-US" dirty="0" smtClean="0"/>
+              <a:t>per year</a:t>
+            </a:r>
+          </a:p>
+          <a:p>
+            <a:pPr lvl="1"/>
+            <a:r>
+              <a:rPr lang="en-US" dirty="0" smtClean="0"/>
+              <a:t>% personnel</a:t>
+            </a:r>
+            <a:r>
+              <a:rPr lang="en-US" dirty="0"/>
+              <a:t>	83%</a:t>
+            </a:r>
+          </a:p>
+          <a:p>
+            <a:pPr lvl="1"/>
+            <a:r>
+              <a:rPr lang="en-US" dirty="0" smtClean="0"/>
+              <a:t>% equipment</a:t>
+            </a:r>
+            <a:r>
+              <a:rPr lang="en-US" dirty="0"/>
+              <a:t>	17</a:t>
+            </a:r>
+            <a:r>
+              <a:rPr lang="en-US" dirty="0" smtClean="0"/>
+              <a:t>%</a:t>
+            </a:r>
+          </a:p>
+          <a:p>
+            <a:pPr lvl="1"/>
+            <a:endParaRPr lang="en-US" dirty="0"/>
+          </a:p>
+          <a:p>
+            <a:r>
+              <a:rPr lang="en-US" dirty="0" smtClean="0"/>
+              <a:t>Account for lifetime of hardware</a:t>
+            </a:r>
+          </a:p>
+          <a:p>
+            <a:r>
+              <a:rPr lang="en-US" dirty="0" smtClean="0"/>
+              <a:t>Include funds for personnel to monitor and update</a:t>
+            </a:r>
+            <a:endParaRPr lang="en-US" dirty="0"/>
+          </a:p>
+        </p:txBody>
+      </p:sp>
+    </p:spTree>
+    <p:extLst>
+      <p:ext uri="{BB962C8B-B14F-4D97-AF65-F5344CB8AC3E}">
+        <p14:creationId xmlns:p14="http://schemas.microsoft.com/office/powerpoint/2010/main" val="288215504"/>
+      </p:ext>
+    </p:extLst>
+  </p:cSld>
+  <p:clrMapOvr>
+    <a:masterClrMapping/>
+  </p:clrMapOvr>
+  <p:transition spd="slow">
+    <p:wipe dir="d"/>
+  </p:transition>
+</p:sld>
+</file>
+
+<file path=ppt/slides/slide9.xml><?xml version="1.0" encoding="utf-8"?>
+<p:sld xmlns:a="http://schemas.openxmlformats.org/drawingml/2006/main" xmlns:r="http://schemas.openxmlformats.org/officeDocument/2006/relationships" xmlns:p="http://schemas.openxmlformats.org/presentationml/2006/main">
+  <p:cSld>
+    <p:spTree>
+      <p:nvGrpSpPr>
+        <p:cNvPr id="1" name=""/>
+        <p:cNvGrpSpPr/>
+        <p:nvPr/>
+      </p:nvGrpSpPr>
+      <p:grpSpPr>
+        <a:xfrm>
+          <a:off x="0" y="0"/>
+          <a:ext cx="0" cy="0"/>
+          <a:chOff x="0" y="0"/>
+          <a:chExt cx="0" cy="0"/>
+        </a:xfrm>
+      </p:grpSpPr>
+      <p:sp>
+        <p:nvSpPr>
+          <p:cNvPr id="2" name="Title 1"/>
+          <p:cNvSpPr>
+            <a:spLocks noGrp="1"/>
+          </p:cNvSpPr>
+          <p:nvPr>
+            <p:ph type="title"/>
+          </p:nvPr>
+        </p:nvSpPr>
+        <p:spPr/>
+        <p:txBody>
+          <a:bodyPr/>
+          <a:lstStyle/>
+          <a:p>
+            <a:r>
+              <a:rPr lang="en-US" dirty="0" smtClean="0"/>
+              <a:t>Business models:</a:t>
+            </a:r>
+            <a:endParaRPr lang="en-US" dirty="0"/>
+          </a:p>
+        </p:txBody>
+      </p:sp>
+      <p:sp>
+        <p:nvSpPr>
+          <p:cNvPr id="3" name="Content Placeholder 2"/>
+          <p:cNvSpPr>
+            <a:spLocks noGrp="1"/>
+          </p:cNvSpPr>
+          <p:nvPr>
+            <p:ph idx="1"/>
+          </p:nvPr>
+        </p:nvSpPr>
+        <p:spPr/>
+        <p:txBody>
+          <a:bodyPr/>
+          <a:lstStyle/>
+          <a:p>
+            <a:r>
+              <a:rPr lang="en-US" dirty="0" smtClean="0"/>
+              <a:t>Build into operating costs</a:t>
+            </a:r>
+          </a:p>
+          <a:p>
+            <a:r>
+              <a:rPr lang="en-US" dirty="0" smtClean="0"/>
+              <a:t>Sponsors</a:t>
+            </a:r>
+          </a:p>
+          <a:p>
+            <a:r>
+              <a:rPr lang="en-US" dirty="0" smtClean="0"/>
+              <a:t>Advertising</a:t>
+            </a:r>
+          </a:p>
+          <a:p>
+            <a:r>
+              <a:rPr lang="en-US" dirty="0" smtClean="0"/>
+              <a:t>Subscriptions</a:t>
+            </a:r>
+          </a:p>
+          <a:p>
+            <a:r>
+              <a:rPr lang="en-US" dirty="0" smtClean="0"/>
+              <a:t>… </a:t>
+            </a:r>
+            <a:endParaRPr lang="en-US" dirty="0"/>
+          </a:p>
+        </p:txBody>
+      </p:sp>
+    </p:spTree>
+    <p:extLst>
+      <p:ext uri="{BB962C8B-B14F-4D97-AF65-F5344CB8AC3E}">
+        <p14:creationId xmlns:p14="http://schemas.microsoft.com/office/powerpoint/2010/main" val="3394251941"/>
       </p:ext>
     </p:extLst>
   </p:cSld>

</xml_diff>

<commit_message>
more work on SMR presentation for workshop
some demo files in case web connectivity is not good, also updates to
pptx
</commit_message>
<xml_diff>
--- a/WesternRegionalWorkshop/NGDSSustainability.pptx
+++ b/WesternRegionalWorkshop/NGDSSustainability.pptx
@@ -5,21 +5,25 @@
     <p:sldMasterId id="2147483648" r:id="rId1"/>
   </p:sldMasterIdLst>
   <p:notesMasterIdLst>
-    <p:notesMasterId r:id="rId11"/>
+    <p:notesMasterId r:id="rId15"/>
   </p:notesMasterIdLst>
   <p:handoutMasterIdLst>
-    <p:handoutMasterId r:id="rId12"/>
+    <p:handoutMasterId r:id="rId16"/>
   </p:handoutMasterIdLst>
   <p:sldIdLst>
-    <p:sldId id="259" r:id="rId2"/>
-    <p:sldId id="261" r:id="rId3"/>
-    <p:sldId id="262" r:id="rId4"/>
-    <p:sldId id="263" r:id="rId5"/>
-    <p:sldId id="264" r:id="rId6"/>
-    <p:sldId id="265" r:id="rId7"/>
-    <p:sldId id="266" r:id="rId8"/>
-    <p:sldId id="267" r:id="rId9"/>
-    <p:sldId id="268" r:id="rId10"/>
+    <p:sldId id="269" r:id="rId2"/>
+    <p:sldId id="270" r:id="rId3"/>
+    <p:sldId id="271" r:id="rId4"/>
+    <p:sldId id="272" r:id="rId5"/>
+    <p:sldId id="259" r:id="rId6"/>
+    <p:sldId id="261" r:id="rId7"/>
+    <p:sldId id="262" r:id="rId8"/>
+    <p:sldId id="263" r:id="rId9"/>
+    <p:sldId id="264" r:id="rId10"/>
+    <p:sldId id="265" r:id="rId11"/>
+    <p:sldId id="266" r:id="rId12"/>
+    <p:sldId id="267" r:id="rId13"/>
+    <p:sldId id="268" r:id="rId14"/>
   </p:sldIdLst>
   <p:sldSz cx="9144000" cy="6858000" type="screen4x3"/>
   <p:notesSz cx="6858000" cy="9144000"/>
@@ -709,7 +713,7 @@
             <a:fld id="{EC6EAC7D-5A89-47C2-8ABA-56C9C2DEF7A4}" type="slidenum">
               <a:rPr lang="en-US" smtClean="0"/>
               <a:pPr/>
-              <a:t>1</a:t>
+              <a:t>5</a:t>
             </a:fld>
             <a:endParaRPr lang="en-US"/>
           </a:p>
@@ -796,7 +800,7 @@
             <a:fld id="{EC6EAC7D-5A89-47C2-8ABA-56C9C2DEF7A4}" type="slidenum">
               <a:rPr lang="en-US" smtClean="0"/>
               <a:pPr/>
-              <a:t>2</a:t>
+              <a:t>6</a:t>
             </a:fld>
             <a:endParaRPr lang="en-US"/>
           </a:p>
@@ -4402,9 +4406,6 @@
           </p:cNvSpPr>
           <p:nvPr>
             <p:ph type="ctrTitle"/>
-            <p:custDataLst>
-              <p:tags r:id="rId2"/>
-            </p:custDataLst>
           </p:nvPr>
         </p:nvSpPr>
         <p:spPr/>
@@ -4414,7 +4415,7 @@
           <a:p>
             <a:r>
               <a:rPr lang="en-US" dirty="0" smtClean="0"/>
-              <a:t>NGDS Sustainability</a:t>
+              <a:t>Why </a:t>
             </a:r>
             <a:endParaRPr lang="en-US" dirty="0"/>
           </a:p>
@@ -4428,87 +4429,6 @@
           </p:cNvSpPr>
           <p:nvPr>
             <p:ph type="subTitle" idx="1"/>
-            <p:custDataLst>
-              <p:tags r:id="rId3"/>
-            </p:custDataLst>
-          </p:nvPr>
-        </p:nvSpPr>
-        <p:spPr/>
-        <p:txBody>
-          <a:bodyPr>
-            <a:normAutofit/>
-          </a:bodyPr>
-          <a:lstStyle/>
-          <a:p>
-            <a:r>
-              <a:rPr lang="en-US" sz="2400" dirty="0" smtClean="0">
-                <a:latin typeface="+mn-lt"/>
-              </a:rPr>
-              <a:t>Stephen Richard and NGDS team</a:t>
-            </a:r>
-          </a:p>
-          <a:p>
-            <a:r>
-              <a:rPr lang="en-US" sz="2400" dirty="0" smtClean="0">
-                <a:latin typeface="+mn-lt"/>
-              </a:rPr>
-              <a:t>Reno, NV  May 14, 2013 </a:t>
-            </a:r>
-            <a:endParaRPr lang="en-US" sz="2400" dirty="0">
-              <a:latin typeface="+mn-lt"/>
-            </a:endParaRPr>
-          </a:p>
-        </p:txBody>
-      </p:sp>
-    </p:spTree>
-    <p:custDataLst>
-      <p:tags r:id="rId1"/>
-    </p:custDataLst>
-  </p:cSld>
-  <p:clrMapOvr>
-    <a:masterClrMapping/>
-  </p:clrMapOvr>
-  <p:transition spd="slow">
-    <p:fade/>
-  </p:transition>
-  <p:timing>
-    <p:tnLst>
-      <p:par>
-        <p:cTn id="1" dur="indefinite" restart="never" nodeType="tmRoot"/>
-      </p:par>
-    </p:tnLst>
-  </p:timing>
-</p:sld>
-</file>
-
-<file path=ppt/slides/slide2.xml><?xml version="1.0" encoding="utf-8"?>
-<p:sld xmlns:a="http://schemas.openxmlformats.org/drawingml/2006/main" xmlns:r="http://schemas.openxmlformats.org/officeDocument/2006/relationships" xmlns:p="http://schemas.openxmlformats.org/presentationml/2006/main">
-  <p:cSld>
-    <p:spTree>
-      <p:nvGrpSpPr>
-        <p:cNvPr id="1" name=""/>
-        <p:cNvGrpSpPr/>
-        <p:nvPr/>
-      </p:nvGrpSpPr>
-      <p:grpSpPr>
-        <a:xfrm>
-          <a:off x="0" y="0"/>
-          <a:ext cx="0" cy="0"/>
-          <a:chOff x="0" y="0"/>
-          <a:chExt cx="0" cy="0"/>
-        </a:xfrm>
-      </p:grpSpPr>
-      <p:sp>
-        <p:nvSpPr>
-          <p:cNvPr id="2" name="Title 1"/>
-          <p:cNvSpPr>
-            <a:spLocks noGrp="1"/>
-          </p:cNvSpPr>
-          <p:nvPr>
-            <p:ph type="title"/>
-            <p:custDataLst>
-              <p:tags r:id="rId2"/>
-            </p:custDataLst>
           </p:nvPr>
         </p:nvSpPr>
         <p:spPr/>
@@ -4518,145 +4438,7 @@
           <a:p>
             <a:r>
               <a:rPr lang="en-US" dirty="0" smtClean="0"/>
-              <a:t>Outline</a:t>
-            </a:r>
-            <a:endParaRPr lang="en-US" dirty="0"/>
-          </a:p>
-        </p:txBody>
-      </p:sp>
-      <p:sp>
-        <p:nvSpPr>
-          <p:cNvPr id="5" name="Content Placeholder 4"/>
-          <p:cNvSpPr>
-            <a:spLocks noGrp="1"/>
-          </p:cNvSpPr>
-          <p:nvPr>
-            <p:ph idx="1"/>
-            <p:custDataLst>
-              <p:tags r:id="rId3"/>
-            </p:custDataLst>
-          </p:nvPr>
-        </p:nvSpPr>
-        <p:spPr/>
-        <p:txBody>
-          <a:bodyPr>
-            <a:normAutofit/>
-          </a:bodyPr>
-          <a:lstStyle/>
-          <a:p>
-            <a:r>
-              <a:rPr lang="en-US" dirty="0" smtClean="0"/>
-              <a:t>What needs to be sustained </a:t>
-            </a:r>
-          </a:p>
-          <a:p>
-            <a:r>
-              <a:rPr lang="en-US" dirty="0" smtClean="0"/>
-              <a:t>Costs</a:t>
-            </a:r>
-          </a:p>
-          <a:p>
-            <a:r>
-              <a:rPr lang="en-US" dirty="0" smtClean="0"/>
-              <a:t>Business models</a:t>
-            </a:r>
-            <a:endParaRPr lang="en-US" dirty="0"/>
-          </a:p>
-        </p:txBody>
-      </p:sp>
-    </p:spTree>
-    <p:custDataLst>
-      <p:tags r:id="rId1"/>
-    </p:custDataLst>
-  </p:cSld>
-  <p:clrMapOvr>
-    <a:masterClrMapping/>
-  </p:clrMapOvr>
-  <p:transition spd="slow">
-    <p:wipe dir="d"/>
-  </p:transition>
-  <p:timing>
-    <p:tnLst>
-      <p:par>
-        <p:cTn id="1" dur="indefinite" restart="never" nodeType="tmRoot"/>
-      </p:par>
-    </p:tnLst>
-  </p:timing>
-</p:sld>
-</file>
-
-<file path=ppt/slides/slide3.xml><?xml version="1.0" encoding="utf-8"?>
-<p:sld xmlns:a="http://schemas.openxmlformats.org/drawingml/2006/main" xmlns:r="http://schemas.openxmlformats.org/officeDocument/2006/relationships" xmlns:p="http://schemas.openxmlformats.org/presentationml/2006/main">
-  <p:cSld>
-    <p:spTree>
-      <p:nvGrpSpPr>
-        <p:cNvPr id="1" name=""/>
-        <p:cNvGrpSpPr/>
-        <p:nvPr/>
-      </p:nvGrpSpPr>
-      <p:grpSpPr>
-        <a:xfrm>
-          <a:off x="0" y="0"/>
-          <a:ext cx="0" cy="0"/>
-          <a:chOff x="0" y="0"/>
-          <a:chExt cx="0" cy="0"/>
-        </a:xfrm>
-      </p:grpSpPr>
-      <p:sp>
-        <p:nvSpPr>
-          <p:cNvPr id="2" name="Title 1"/>
-          <p:cNvSpPr>
-            <a:spLocks noGrp="1"/>
-          </p:cNvSpPr>
-          <p:nvPr>
-            <p:ph type="title"/>
-          </p:nvPr>
-        </p:nvSpPr>
-        <p:spPr/>
-        <p:txBody>
-          <a:bodyPr/>
-          <a:lstStyle/>
-          <a:p>
-            <a:r>
-              <a:rPr lang="en-US" dirty="0" smtClean="0"/>
-              <a:t>Paradigm Shift</a:t>
-            </a:r>
-            <a:endParaRPr lang="en-US" dirty="0"/>
-          </a:p>
-        </p:txBody>
-      </p:sp>
-      <p:sp>
-        <p:nvSpPr>
-          <p:cNvPr id="3" name="Content Placeholder 2"/>
-          <p:cNvSpPr>
-            <a:spLocks noGrp="1"/>
-          </p:cNvSpPr>
-          <p:nvPr>
-            <p:ph idx="1"/>
-          </p:nvPr>
-        </p:nvSpPr>
-        <p:spPr/>
-        <p:txBody>
-          <a:bodyPr/>
-          <a:lstStyle/>
-          <a:p>
-            <a:r>
-              <a:rPr lang="en-US" dirty="0" smtClean="0"/>
-              <a:t>From: Paper </a:t>
-            </a:r>
-            <a:r>
-              <a:rPr lang="en-US" dirty="0" smtClean="0"/>
-              <a:t>publications as the product</a:t>
-            </a:r>
-          </a:p>
-          <a:p>
-            <a:r>
-              <a:rPr lang="en-US" dirty="0" smtClean="0"/>
-              <a:t>To: Information </a:t>
-            </a:r>
-            <a:r>
-              <a:rPr lang="en-US" dirty="0" smtClean="0"/>
-              <a:t>via web services as the product </a:t>
+              <a:t>Is interoperability worth the pain</a:t>
             </a:r>
             <a:endParaRPr lang="en-US" dirty="0"/>
           </a:p>
@@ -4664,9 +4446,9 @@
       </p:sp>
       <p:pic>
         <p:nvPicPr>
-          <p:cNvPr id="1028" name="Picture 4" descr="https://encrypted-tbn1.gstatic.com/images?q=tbn:ANd9GcRbgruyKr4FgIaCjZpvoCF83xj2-2jv1Iw0VpazuSXvyxaUX-ftag"/>
+          <p:cNvPr id="6" name="Picture 5"/>
           <p:cNvPicPr>
-            <a:picLocks noChangeAspect="1" noChangeArrowheads="1"/>
+            <a:picLocks noChangeAspect="1"/>
           </p:cNvPicPr>
           <p:nvPr/>
         </p:nvPicPr>
@@ -4678,76 +4460,24 @@
               </a:ext>
             </a:extLst>
           </a:blip>
-          <a:srcRect/>
           <a:stretch>
             <a:fillRect/>
           </a:stretch>
         </p:blipFill>
-        <p:spPr bwMode="auto">
+        <p:spPr>
           <a:xfrm>
-            <a:off x="10058400" y="2819400"/>
-            <a:ext cx="2162175" cy="2114550"/>
+            <a:off x="7543800" y="4876800"/>
+            <a:ext cx="686198" cy="1270738"/>
           </a:xfrm>
           <a:prstGeom prst="rect">
             <a:avLst/>
           </a:prstGeom>
-          <a:noFill/>
-          <a:extLst>
-            <a:ext uri="{909E8E84-426E-40DD-AFC4-6F175D3DCCD1}">
-              <a14:hiddenFill xmlns:a14="http://schemas.microsoft.com/office/drawing/2010/main">
-                <a:solidFill>
-                  <a:srgbClr val="FFFFFF"/>
-                </a:solidFill>
-              </a14:hiddenFill>
-            </a:ext>
-          </a:extLst>
-        </p:spPr>
-      </p:pic>
-      <p:pic>
-        <p:nvPicPr>
-          <p:cNvPr id="1030" name="Picture 6" descr="http://www.aronsonsecurity.com/Portals/55833/images/newparadigmahead.jpg"/>
-          <p:cNvPicPr>
-            <a:picLocks noChangeAspect="1" noChangeArrowheads="1"/>
-          </p:cNvPicPr>
-          <p:nvPr/>
-        </p:nvPicPr>
-        <p:blipFill>
-          <a:blip r:embed="rId3">
-            <a:extLst>
-              <a:ext uri="{28A0092B-C50C-407E-A947-70E740481C1C}">
-                <a14:useLocalDpi xmlns:a14="http://schemas.microsoft.com/office/drawing/2010/main" val="0"/>
-              </a:ext>
-            </a:extLst>
-          </a:blip>
-          <a:srcRect/>
-          <a:stretch>
-            <a:fillRect/>
-          </a:stretch>
-        </p:blipFill>
-        <p:spPr bwMode="auto">
-          <a:xfrm>
-            <a:off x="1077884" y="3590924"/>
-            <a:ext cx="4048125" cy="2686051"/>
-          </a:xfrm>
-          <a:prstGeom prst="rect">
-            <a:avLst/>
-          </a:prstGeom>
-          <a:noFill/>
-          <a:extLst>
-            <a:ext uri="{909E8E84-426E-40DD-AFC4-6F175D3DCCD1}">
-              <a14:hiddenFill xmlns:a14="http://schemas.microsoft.com/office/drawing/2010/main">
-                <a:solidFill>
-                  <a:srgbClr val="FFFFFF"/>
-                </a:solidFill>
-              </a14:hiddenFill>
-            </a:ext>
-          </a:extLst>
         </p:spPr>
       </p:pic>
     </p:spTree>
     <p:extLst>
       <p:ext uri="{BB962C8B-B14F-4D97-AF65-F5344CB8AC3E}">
-        <p14:creationId xmlns:p14="http://schemas.microsoft.com/office/powerpoint/2010/main" val="137891083"/>
+        <p14:creationId xmlns:p14="http://schemas.microsoft.com/office/powerpoint/2010/main" val="3208795293"/>
       </p:ext>
     </p:extLst>
   </p:cSld>
@@ -4760,240 +4490,7 @@
 </p:sld>
 </file>
 
-<file path=ppt/slides/slide4.xml><?xml version="1.0" encoding="utf-8"?>
-<p:sld xmlns:a="http://schemas.openxmlformats.org/drawingml/2006/main" xmlns:r="http://schemas.openxmlformats.org/officeDocument/2006/relationships" xmlns:p="http://schemas.openxmlformats.org/presentationml/2006/main">
-  <p:cSld>
-    <p:spTree>
-      <p:nvGrpSpPr>
-        <p:cNvPr id="1" name=""/>
-        <p:cNvGrpSpPr/>
-        <p:nvPr/>
-      </p:nvGrpSpPr>
-      <p:grpSpPr>
-        <a:xfrm>
-          <a:off x="0" y="0"/>
-          <a:ext cx="0" cy="0"/>
-          <a:chOff x="0" y="0"/>
-          <a:chExt cx="0" cy="0"/>
-        </a:xfrm>
-      </p:grpSpPr>
-      <p:sp>
-        <p:nvSpPr>
-          <p:cNvPr id="2" name="Title 1"/>
-          <p:cNvSpPr>
-            <a:spLocks noGrp="1"/>
-          </p:cNvSpPr>
-          <p:nvPr>
-            <p:ph type="title"/>
-          </p:nvPr>
-        </p:nvSpPr>
-        <p:spPr/>
-        <p:txBody>
-          <a:bodyPr/>
-          <a:lstStyle/>
-          <a:p>
-            <a:r>
-              <a:rPr lang="en-US" dirty="0" smtClean="0"/>
-              <a:t>State surveys as data providers</a:t>
-            </a:r>
-            <a:endParaRPr lang="en-US" dirty="0"/>
-          </a:p>
-        </p:txBody>
-      </p:sp>
-      <p:sp>
-        <p:nvSpPr>
-          <p:cNvPr id="3" name="Content Placeholder 2"/>
-          <p:cNvSpPr>
-            <a:spLocks noGrp="1"/>
-          </p:cNvSpPr>
-          <p:nvPr>
-            <p:ph idx="1"/>
-          </p:nvPr>
-        </p:nvSpPr>
-        <p:spPr/>
-        <p:txBody>
-          <a:bodyPr/>
-          <a:lstStyle/>
-          <a:p>
-            <a:r>
-              <a:rPr lang="en-US" dirty="0" smtClean="0"/>
-              <a:t>We </a:t>
-            </a:r>
-            <a:r>
-              <a:rPr lang="en-US" dirty="0" smtClean="0"/>
-              <a:t>all have web servers and web sites </a:t>
-            </a:r>
-          </a:p>
-          <a:p>
-            <a:r>
-              <a:rPr lang="en-US" dirty="0" smtClean="0"/>
-              <a:t>Run data services </a:t>
-            </a:r>
-          </a:p>
-          <a:p>
-            <a:r>
-              <a:rPr lang="en-US" dirty="0" smtClean="0"/>
-              <a:t>Have to integrate web usage metrics into agency </a:t>
-            </a:r>
-            <a:r>
-              <a:rPr lang="en-US" dirty="0" smtClean="0"/>
-              <a:t>performance assessment</a:t>
-            </a:r>
-            <a:endParaRPr lang="en-US" dirty="0"/>
-          </a:p>
-        </p:txBody>
-      </p:sp>
-    </p:spTree>
-    <p:extLst>
-      <p:ext uri="{BB962C8B-B14F-4D97-AF65-F5344CB8AC3E}">
-        <p14:creationId xmlns:p14="http://schemas.microsoft.com/office/powerpoint/2010/main" val="1464449752"/>
-      </p:ext>
-    </p:extLst>
-  </p:cSld>
-  <p:clrMapOvr>
-    <a:masterClrMapping/>
-  </p:clrMapOvr>
-  <p:transition spd="slow">
-    <p:wipe dir="d"/>
-  </p:transition>
-</p:sld>
-</file>
-
-<file path=ppt/slides/slide5.xml><?xml version="1.0" encoding="utf-8"?>
-<p:sld xmlns:a="http://schemas.openxmlformats.org/drawingml/2006/main" xmlns:r="http://schemas.openxmlformats.org/officeDocument/2006/relationships" xmlns:p="http://schemas.openxmlformats.org/presentationml/2006/main">
-  <p:cSld>
-    <p:spTree>
-      <p:nvGrpSpPr>
-        <p:cNvPr id="1" name=""/>
-        <p:cNvGrpSpPr/>
-        <p:nvPr/>
-      </p:nvGrpSpPr>
-      <p:grpSpPr>
-        <a:xfrm>
-          <a:off x="0" y="0"/>
-          <a:ext cx="0" cy="0"/>
-          <a:chOff x="0" y="0"/>
-          <a:chExt cx="0" cy="0"/>
-        </a:xfrm>
-      </p:grpSpPr>
-      <p:sp>
-        <p:nvSpPr>
-          <p:cNvPr id="2" name="Title 1"/>
-          <p:cNvSpPr>
-            <a:spLocks noGrp="1"/>
-          </p:cNvSpPr>
-          <p:nvPr>
-            <p:ph type="title"/>
-          </p:nvPr>
-        </p:nvSpPr>
-        <p:spPr/>
-        <p:txBody>
-          <a:bodyPr/>
-          <a:lstStyle/>
-          <a:p>
-            <a:r>
-              <a:rPr lang="en-US" dirty="0" smtClean="0"/>
-              <a:t>What needs to be maintained</a:t>
-            </a:r>
-            <a:endParaRPr lang="en-US" dirty="0"/>
-          </a:p>
-        </p:txBody>
-      </p:sp>
-      <p:sp>
-        <p:nvSpPr>
-          <p:cNvPr id="3" name="Content Placeholder 2"/>
-          <p:cNvSpPr>
-            <a:spLocks noGrp="1"/>
-          </p:cNvSpPr>
-          <p:nvPr>
-            <p:ph idx="1"/>
-          </p:nvPr>
-        </p:nvSpPr>
-        <p:spPr>
-          <a:xfrm>
-            <a:off x="762000" y="1596413"/>
-            <a:ext cx="8077200" cy="4575787"/>
-          </a:xfrm>
-        </p:spPr>
-        <p:txBody>
-          <a:bodyPr>
-            <a:normAutofit/>
-          </a:bodyPr>
-          <a:lstStyle/>
-          <a:p>
-            <a:r>
-              <a:rPr lang="en-US" dirty="0" smtClean="0"/>
-              <a:t>Web server:</a:t>
-            </a:r>
-          </a:p>
-          <a:p>
-            <a:pPr lvl="1"/>
-            <a:r>
-              <a:rPr lang="en-US" dirty="0" smtClean="0"/>
-              <a:t>Physical server</a:t>
-            </a:r>
-          </a:p>
-          <a:p>
-            <a:pPr lvl="1"/>
-            <a:r>
-              <a:rPr lang="en-US" dirty="0" smtClean="0"/>
-              <a:t>Cloud server</a:t>
-            </a:r>
-          </a:p>
-          <a:p>
-            <a:pPr lvl="1"/>
-            <a:r>
-              <a:rPr lang="en-US" dirty="0" smtClean="0"/>
-              <a:t>Hosting service</a:t>
-            </a:r>
-          </a:p>
-          <a:p>
-            <a:r>
-              <a:rPr lang="en-US" dirty="0" smtClean="0"/>
-              <a:t>Datasets:</a:t>
-            </a:r>
-          </a:p>
-          <a:p>
-            <a:pPr lvl="1"/>
-            <a:r>
-              <a:rPr lang="en-US" dirty="0" smtClean="0"/>
-              <a:t>Correct errors</a:t>
-            </a:r>
-          </a:p>
-          <a:p>
-            <a:pPr lvl="1"/>
-            <a:r>
-              <a:rPr lang="en-US" dirty="0" smtClean="0"/>
-              <a:t>Update with new data</a:t>
-            </a:r>
-          </a:p>
-          <a:p>
-            <a:pPr lvl="1"/>
-            <a:r>
-              <a:rPr lang="en-US" dirty="0" smtClean="0"/>
-              <a:t>Upgrade as software evolves</a:t>
-            </a:r>
-            <a:endParaRPr lang="en-US" dirty="0"/>
-          </a:p>
-        </p:txBody>
-      </p:sp>
-    </p:spTree>
-    <p:extLst>
-      <p:ext uri="{BB962C8B-B14F-4D97-AF65-F5344CB8AC3E}">
-        <p14:creationId xmlns:p14="http://schemas.microsoft.com/office/powerpoint/2010/main" val="1930345773"/>
-      </p:ext>
-    </p:extLst>
-  </p:cSld>
-  <p:clrMapOvr>
-    <a:masterClrMapping/>
-  </p:clrMapOvr>
-  <p:transition spd="slow">
-    <p:wipe dir="d"/>
-  </p:transition>
-</p:sld>
-</file>
-
-<file path=ppt/slides/slide6.xml><?xml version="1.0" encoding="utf-8"?>
+<file path=ppt/slides/slide10.xml><?xml version="1.0" encoding="utf-8"?>
 <p:sld xmlns:a="http://schemas.openxmlformats.org/drawingml/2006/main" xmlns:r="http://schemas.openxmlformats.org/officeDocument/2006/relationships" xmlns:p="http://schemas.openxmlformats.org/presentationml/2006/main">
   <p:cSld>
     <p:spTree>
@@ -5489,7 +4986,7 @@
 </p:sld>
 </file>
 
-<file path=ppt/slides/slide7.xml><?xml version="1.0" encoding="utf-8"?>
+<file path=ppt/slides/slide11.xml><?xml version="1.0" encoding="utf-8"?>
 <p:sld xmlns:a="http://schemas.openxmlformats.org/drawingml/2006/main" xmlns:r="http://schemas.openxmlformats.org/officeDocument/2006/relationships" xmlns:p="http://schemas.openxmlformats.org/presentationml/2006/main">
   <p:cSld>
     <p:spTree>
@@ -5937,6 +5434,947 @@
 </p:sld>
 </file>
 
+<file path=ppt/slides/slide12.xml><?xml version="1.0" encoding="utf-8"?>
+<p:sld xmlns:a="http://schemas.openxmlformats.org/drawingml/2006/main" xmlns:r="http://schemas.openxmlformats.org/officeDocument/2006/relationships" xmlns:p="http://schemas.openxmlformats.org/presentationml/2006/main">
+  <p:cSld>
+    <p:spTree>
+      <p:nvGrpSpPr>
+        <p:cNvPr id="1" name=""/>
+        <p:cNvGrpSpPr/>
+        <p:nvPr/>
+      </p:nvGrpSpPr>
+      <p:grpSpPr>
+        <a:xfrm>
+          <a:off x="0" y="0"/>
+          <a:ext cx="0" cy="0"/>
+          <a:chOff x="0" y="0"/>
+          <a:chExt cx="0" cy="0"/>
+        </a:xfrm>
+      </p:grpSpPr>
+      <p:sp>
+        <p:nvSpPr>
+          <p:cNvPr id="2" name="Title 1"/>
+          <p:cNvSpPr>
+            <a:spLocks noGrp="1"/>
+          </p:cNvSpPr>
+          <p:nvPr>
+            <p:ph type="title"/>
+          </p:nvPr>
+        </p:nvSpPr>
+        <p:spPr/>
+        <p:txBody>
+          <a:bodyPr>
+            <a:normAutofit/>
+          </a:bodyPr>
+          <a:lstStyle/>
+          <a:p>
+            <a:r>
+              <a:rPr lang="en-US" dirty="0" smtClean="0"/>
+              <a:t>Grand Total:</a:t>
+            </a:r>
+            <a:endParaRPr lang="en-US" dirty="0"/>
+          </a:p>
+        </p:txBody>
+      </p:sp>
+      <p:sp>
+        <p:nvSpPr>
+          <p:cNvPr id="3" name="Content Placeholder 2"/>
+          <p:cNvSpPr>
+            <a:spLocks noGrp="1"/>
+          </p:cNvSpPr>
+          <p:nvPr>
+            <p:ph idx="1"/>
+          </p:nvPr>
+        </p:nvSpPr>
+        <p:spPr/>
+        <p:txBody>
+          <a:bodyPr/>
+          <a:lstStyle/>
+          <a:p>
+            <a:r>
+              <a:rPr lang="en-US" b="1" dirty="0"/>
+              <a:t>$</a:t>
+            </a:r>
+            <a:r>
+              <a:rPr lang="en-US" b="1" dirty="0" smtClean="0"/>
+              <a:t>18,300.00   </a:t>
+            </a:r>
+            <a:r>
+              <a:rPr lang="en-US" dirty="0" smtClean="0"/>
+              <a:t>per year</a:t>
+            </a:r>
+          </a:p>
+          <a:p>
+            <a:pPr lvl="1"/>
+            <a:r>
+              <a:rPr lang="en-US" dirty="0" smtClean="0"/>
+              <a:t>% personnel</a:t>
+            </a:r>
+            <a:r>
+              <a:rPr lang="en-US" dirty="0"/>
+              <a:t>	83%</a:t>
+            </a:r>
+          </a:p>
+          <a:p>
+            <a:pPr lvl="1"/>
+            <a:r>
+              <a:rPr lang="en-US" dirty="0" smtClean="0"/>
+              <a:t>% equipment</a:t>
+            </a:r>
+            <a:r>
+              <a:rPr lang="en-US" dirty="0"/>
+              <a:t>	17</a:t>
+            </a:r>
+            <a:r>
+              <a:rPr lang="en-US" dirty="0" smtClean="0"/>
+              <a:t>%</a:t>
+            </a:r>
+          </a:p>
+          <a:p>
+            <a:pPr lvl="1"/>
+            <a:endParaRPr lang="en-US" dirty="0"/>
+          </a:p>
+          <a:p>
+            <a:r>
+              <a:rPr lang="en-US" dirty="0" smtClean="0"/>
+              <a:t>Account for lifetime of hardware</a:t>
+            </a:r>
+          </a:p>
+          <a:p>
+            <a:r>
+              <a:rPr lang="en-US" dirty="0" smtClean="0"/>
+              <a:t>Include funds for personnel to monitor and update</a:t>
+            </a:r>
+            <a:endParaRPr lang="en-US" dirty="0"/>
+          </a:p>
+        </p:txBody>
+      </p:sp>
+    </p:spTree>
+    <p:extLst>
+      <p:ext uri="{BB962C8B-B14F-4D97-AF65-F5344CB8AC3E}">
+        <p14:creationId xmlns:p14="http://schemas.microsoft.com/office/powerpoint/2010/main" val="288215504"/>
+      </p:ext>
+    </p:extLst>
+  </p:cSld>
+  <p:clrMapOvr>
+    <a:masterClrMapping/>
+  </p:clrMapOvr>
+  <p:transition spd="slow">
+    <p:wipe dir="d"/>
+  </p:transition>
+</p:sld>
+</file>
+
+<file path=ppt/slides/slide13.xml><?xml version="1.0" encoding="utf-8"?>
+<p:sld xmlns:a="http://schemas.openxmlformats.org/drawingml/2006/main" xmlns:r="http://schemas.openxmlformats.org/officeDocument/2006/relationships" xmlns:p="http://schemas.openxmlformats.org/presentationml/2006/main">
+  <p:cSld>
+    <p:spTree>
+      <p:nvGrpSpPr>
+        <p:cNvPr id="1" name=""/>
+        <p:cNvGrpSpPr/>
+        <p:nvPr/>
+      </p:nvGrpSpPr>
+      <p:grpSpPr>
+        <a:xfrm>
+          <a:off x="0" y="0"/>
+          <a:ext cx="0" cy="0"/>
+          <a:chOff x="0" y="0"/>
+          <a:chExt cx="0" cy="0"/>
+        </a:xfrm>
+      </p:grpSpPr>
+      <p:sp>
+        <p:nvSpPr>
+          <p:cNvPr id="2" name="Title 1"/>
+          <p:cNvSpPr>
+            <a:spLocks noGrp="1"/>
+          </p:cNvSpPr>
+          <p:nvPr>
+            <p:ph type="title"/>
+          </p:nvPr>
+        </p:nvSpPr>
+        <p:spPr/>
+        <p:txBody>
+          <a:bodyPr/>
+          <a:lstStyle/>
+          <a:p>
+            <a:r>
+              <a:rPr lang="en-US" dirty="0" smtClean="0"/>
+              <a:t>Business models:</a:t>
+            </a:r>
+            <a:endParaRPr lang="en-US" dirty="0"/>
+          </a:p>
+        </p:txBody>
+      </p:sp>
+      <p:sp>
+        <p:nvSpPr>
+          <p:cNvPr id="3" name="Content Placeholder 2"/>
+          <p:cNvSpPr>
+            <a:spLocks noGrp="1"/>
+          </p:cNvSpPr>
+          <p:nvPr>
+            <p:ph idx="1"/>
+          </p:nvPr>
+        </p:nvSpPr>
+        <p:spPr/>
+        <p:txBody>
+          <a:bodyPr/>
+          <a:lstStyle/>
+          <a:p>
+            <a:r>
+              <a:rPr lang="en-US" dirty="0" smtClean="0"/>
+              <a:t>Build into operating costs</a:t>
+            </a:r>
+          </a:p>
+          <a:p>
+            <a:r>
+              <a:rPr lang="en-US" dirty="0" smtClean="0"/>
+              <a:t>Sponsors</a:t>
+            </a:r>
+          </a:p>
+          <a:p>
+            <a:r>
+              <a:rPr lang="en-US" dirty="0" smtClean="0"/>
+              <a:t>Advertising</a:t>
+            </a:r>
+          </a:p>
+          <a:p>
+            <a:r>
+              <a:rPr lang="en-US" dirty="0" smtClean="0"/>
+              <a:t>Subscriptions</a:t>
+            </a:r>
+          </a:p>
+          <a:p>
+            <a:r>
+              <a:rPr lang="en-US" dirty="0" smtClean="0"/>
+              <a:t>… </a:t>
+            </a:r>
+            <a:endParaRPr lang="en-US" dirty="0"/>
+          </a:p>
+        </p:txBody>
+      </p:sp>
+    </p:spTree>
+    <p:extLst>
+      <p:ext uri="{BB962C8B-B14F-4D97-AF65-F5344CB8AC3E}">
+        <p14:creationId xmlns:p14="http://schemas.microsoft.com/office/powerpoint/2010/main" val="3394251941"/>
+      </p:ext>
+    </p:extLst>
+  </p:cSld>
+  <p:clrMapOvr>
+    <a:masterClrMapping/>
+  </p:clrMapOvr>
+  <p:transition spd="slow">
+    <p:wipe dir="d"/>
+  </p:transition>
+</p:sld>
+</file>
+
+<file path=ppt/slides/slide2.xml><?xml version="1.0" encoding="utf-8"?>
+<p:sld xmlns:a="http://schemas.openxmlformats.org/drawingml/2006/main" xmlns:r="http://schemas.openxmlformats.org/officeDocument/2006/relationships" xmlns:p="http://schemas.openxmlformats.org/presentationml/2006/main">
+  <p:cSld>
+    <p:spTree>
+      <p:nvGrpSpPr>
+        <p:cNvPr id="1" name=""/>
+        <p:cNvGrpSpPr/>
+        <p:nvPr/>
+      </p:nvGrpSpPr>
+      <p:grpSpPr>
+        <a:xfrm>
+          <a:off x="0" y="0"/>
+          <a:ext cx="0" cy="0"/>
+          <a:chOff x="0" y="0"/>
+          <a:chExt cx="0" cy="0"/>
+        </a:xfrm>
+      </p:grpSpPr>
+      <p:sp>
+        <p:nvSpPr>
+          <p:cNvPr id="4" name="Title 3"/>
+          <p:cNvSpPr>
+            <a:spLocks noGrp="1"/>
+          </p:cNvSpPr>
+          <p:nvPr>
+            <p:ph type="title"/>
+          </p:nvPr>
+        </p:nvSpPr>
+        <p:spPr/>
+        <p:txBody>
+          <a:bodyPr/>
+          <a:lstStyle/>
+          <a:p>
+            <a:r>
+              <a:rPr lang="en-US" dirty="0" smtClean="0"/>
+              <a:t>Make things easier</a:t>
+            </a:r>
+            <a:endParaRPr lang="en-US" dirty="0"/>
+          </a:p>
+        </p:txBody>
+      </p:sp>
+      <p:sp>
+        <p:nvSpPr>
+          <p:cNvPr id="5" name="Content Placeholder 4"/>
+          <p:cNvSpPr>
+            <a:spLocks noGrp="1"/>
+          </p:cNvSpPr>
+          <p:nvPr>
+            <p:ph idx="1"/>
+          </p:nvPr>
+        </p:nvSpPr>
+        <p:spPr/>
+        <p:txBody>
+          <a:bodyPr/>
+          <a:lstStyle/>
+          <a:p>
+            <a:r>
+              <a:rPr lang="en-US" dirty="0"/>
+              <a:t>Make life easier for the </a:t>
+            </a:r>
+            <a:r>
+              <a:rPr lang="en-US" dirty="0" smtClean="0"/>
+              <a:t>customer</a:t>
+            </a:r>
+          </a:p>
+          <a:p>
+            <a:pPr lvl="1"/>
+            <a:r>
+              <a:rPr lang="en-US" dirty="0" smtClean="0"/>
+              <a:t>They don’t have to do figure out new data structures</a:t>
+            </a:r>
+          </a:p>
+          <a:p>
+            <a:r>
+              <a:rPr lang="en-US" dirty="0" smtClean="0"/>
+              <a:t>Make metadata easier</a:t>
+            </a:r>
+          </a:p>
+          <a:p>
+            <a:pPr lvl="1"/>
+            <a:r>
+              <a:rPr lang="en-US" dirty="0" smtClean="0"/>
+              <a:t>Don’t have to document data structure-it’s already done.</a:t>
+            </a:r>
+          </a:p>
+          <a:p>
+            <a:r>
+              <a:rPr lang="en-US" dirty="0" smtClean="0"/>
+              <a:t>Create bigger market for applications</a:t>
+            </a:r>
+            <a:endParaRPr lang="en-US" dirty="0"/>
+          </a:p>
+        </p:txBody>
+      </p:sp>
+    </p:spTree>
+    <p:extLst>
+      <p:ext uri="{BB962C8B-B14F-4D97-AF65-F5344CB8AC3E}">
+        <p14:creationId xmlns:p14="http://schemas.microsoft.com/office/powerpoint/2010/main" val="1877369427"/>
+      </p:ext>
+    </p:extLst>
+  </p:cSld>
+  <p:clrMapOvr>
+    <a:masterClrMapping/>
+  </p:clrMapOvr>
+  <p:transition spd="slow">
+    <p:wipe dir="d"/>
+  </p:transition>
+</p:sld>
+</file>
+
+<file path=ppt/slides/slide3.xml><?xml version="1.0" encoding="utf-8"?>
+<p:sld xmlns:a="http://schemas.openxmlformats.org/drawingml/2006/main" xmlns:r="http://schemas.openxmlformats.org/officeDocument/2006/relationships" xmlns:p="http://schemas.openxmlformats.org/presentationml/2006/main">
+  <p:cSld>
+    <p:spTree>
+      <p:nvGrpSpPr>
+        <p:cNvPr id="1" name=""/>
+        <p:cNvGrpSpPr/>
+        <p:nvPr/>
+      </p:nvGrpSpPr>
+      <p:grpSpPr>
+        <a:xfrm>
+          <a:off x="0" y="0"/>
+          <a:ext cx="0" cy="0"/>
+          <a:chOff x="0" y="0"/>
+          <a:chExt cx="0" cy="0"/>
+        </a:xfrm>
+      </p:grpSpPr>
+      <p:sp>
+        <p:nvSpPr>
+          <p:cNvPr id="4" name="Title 3"/>
+          <p:cNvSpPr>
+            <a:spLocks noGrp="1"/>
+          </p:cNvSpPr>
+          <p:nvPr>
+            <p:ph type="title"/>
+          </p:nvPr>
+        </p:nvSpPr>
+        <p:spPr/>
+        <p:txBody>
+          <a:bodyPr>
+            <a:normAutofit fontScale="90000"/>
+          </a:bodyPr>
+          <a:lstStyle/>
+          <a:p>
+            <a:r>
+              <a:rPr lang="en-US" dirty="0" smtClean="0"/>
+              <a:t>Example: NGDS Borehole temperatures</a:t>
+            </a:r>
+            <a:endParaRPr lang="en-US" dirty="0"/>
+          </a:p>
+        </p:txBody>
+      </p:sp>
+      <p:pic>
+        <p:nvPicPr>
+          <p:cNvPr id="1026" name="Picture 2"/>
+          <p:cNvPicPr>
+            <a:picLocks noChangeAspect="1" noChangeArrowheads="1"/>
+          </p:cNvPicPr>
+          <p:nvPr/>
+        </p:nvPicPr>
+        <p:blipFill>
+          <a:blip r:embed="rId2">
+            <a:extLst>
+              <a:ext uri="{28A0092B-C50C-407E-A947-70E740481C1C}">
+                <a14:useLocalDpi xmlns:a14="http://schemas.microsoft.com/office/drawing/2010/main" val="0"/>
+              </a:ext>
+            </a:extLst>
+          </a:blip>
+          <a:srcRect/>
+          <a:stretch>
+            <a:fillRect/>
+          </a:stretch>
+        </p:blipFill>
+        <p:spPr bwMode="auto">
+          <a:xfrm>
+            <a:off x="727842" y="1718442"/>
+            <a:ext cx="8124825" cy="4219575"/>
+          </a:xfrm>
+          <a:prstGeom prst="rect">
+            <a:avLst/>
+          </a:prstGeom>
+          <a:noFill/>
+          <a:ln>
+            <a:noFill/>
+          </a:ln>
+          <a:extLst>
+            <a:ext uri="{909E8E84-426E-40DD-AFC4-6F175D3DCCD1}">
+              <a14:hiddenFill xmlns:a14="http://schemas.microsoft.com/office/drawing/2010/main">
+                <a:solidFill>
+                  <a:schemeClr val="accent1"/>
+                </a:solidFill>
+              </a14:hiddenFill>
+            </a:ext>
+            <a:ext uri="{91240B29-F687-4F45-9708-019B960494DF}">
+              <a14:hiddenLine xmlns:a14="http://schemas.microsoft.com/office/drawing/2010/main" w="9525">
+                <a:solidFill>
+                  <a:schemeClr val="tx1"/>
+                </a:solidFill>
+                <a:miter lim="800000"/>
+                <a:headEnd/>
+                <a:tailEnd/>
+              </a14:hiddenLine>
+            </a:ext>
+          </a:extLst>
+        </p:spPr>
+      </p:pic>
+    </p:spTree>
+    <p:extLst>
+      <p:ext uri="{BB962C8B-B14F-4D97-AF65-F5344CB8AC3E}">
+        <p14:creationId xmlns:p14="http://schemas.microsoft.com/office/powerpoint/2010/main" val="2071471179"/>
+      </p:ext>
+    </p:extLst>
+  </p:cSld>
+  <p:clrMapOvr>
+    <a:masterClrMapping/>
+  </p:clrMapOvr>
+  <p:transition spd="slow">
+    <p:wipe dir="d"/>
+  </p:transition>
+</p:sld>
+</file>
+
+<file path=ppt/slides/slide4.xml><?xml version="1.0" encoding="utf-8"?>
+<p:sld xmlns:a="http://schemas.openxmlformats.org/drawingml/2006/main" xmlns:r="http://schemas.openxmlformats.org/officeDocument/2006/relationships" xmlns:p="http://schemas.openxmlformats.org/presentationml/2006/main">
+  <p:cSld>
+    <p:spTree>
+      <p:nvGrpSpPr>
+        <p:cNvPr id="1" name=""/>
+        <p:cNvGrpSpPr/>
+        <p:nvPr/>
+      </p:nvGrpSpPr>
+      <p:grpSpPr>
+        <a:xfrm>
+          <a:off x="0" y="0"/>
+          <a:ext cx="0" cy="0"/>
+          <a:chOff x="0" y="0"/>
+          <a:chExt cx="0" cy="0"/>
+        </a:xfrm>
+      </p:grpSpPr>
+      <p:sp>
+        <p:nvSpPr>
+          <p:cNvPr id="2" name="Title 1"/>
+          <p:cNvSpPr>
+            <a:spLocks noGrp="1"/>
+          </p:cNvSpPr>
+          <p:nvPr>
+            <p:ph type="title"/>
+          </p:nvPr>
+        </p:nvSpPr>
+        <p:spPr/>
+        <p:txBody>
+          <a:bodyPr/>
+          <a:lstStyle/>
+          <a:p>
+            <a:r>
+              <a:rPr lang="en-US" dirty="0" smtClean="0"/>
+              <a:t>Linked Data</a:t>
+            </a:r>
+            <a:endParaRPr lang="en-US" dirty="0"/>
+          </a:p>
+        </p:txBody>
+      </p:sp>
+      <p:sp>
+        <p:nvSpPr>
+          <p:cNvPr id="3" name="Content Placeholder 2"/>
+          <p:cNvSpPr>
+            <a:spLocks noGrp="1"/>
+          </p:cNvSpPr>
+          <p:nvPr>
+            <p:ph idx="1"/>
+          </p:nvPr>
+        </p:nvSpPr>
+        <p:spPr/>
+        <p:txBody>
+          <a:bodyPr/>
+          <a:lstStyle/>
+          <a:p>
+            <a:r>
+              <a:rPr lang="en-US" dirty="0" smtClean="0"/>
+              <a:t>Use identifiers that can be dereferenced on the WWW</a:t>
+            </a:r>
+          </a:p>
+          <a:p>
+            <a:r>
+              <a:rPr lang="en-US" dirty="0" smtClean="0"/>
+              <a:t>Enable navigation between related resources</a:t>
+            </a:r>
+          </a:p>
+          <a:p>
+            <a:endParaRPr lang="en-US" dirty="0"/>
+          </a:p>
+          <a:p>
+            <a:pPr marL="0" indent="0">
+              <a:buNone/>
+            </a:pPr>
+            <a:r>
+              <a:rPr lang="en-US" sz="2000" dirty="0" err="1"/>
+              <a:t>GitHub</a:t>
+            </a:r>
+            <a:r>
+              <a:rPr lang="en-US" sz="2000" dirty="0"/>
+              <a:t>\USGIN\Workshops\</a:t>
+            </a:r>
+            <a:r>
+              <a:rPr lang="en-US" sz="2000" dirty="0" err="1"/>
+              <a:t>WesternRegionalWorkshopWMS_URIDemo.mxd</a:t>
+            </a:r>
+            <a:endParaRPr lang="en-US" sz="2000" dirty="0" smtClean="0"/>
+          </a:p>
+          <a:p>
+            <a:endParaRPr lang="en-US" dirty="0"/>
+          </a:p>
+          <a:p>
+            <a:endParaRPr lang="en-US" dirty="0"/>
+          </a:p>
+        </p:txBody>
+      </p:sp>
+    </p:spTree>
+    <p:extLst>
+      <p:ext uri="{BB962C8B-B14F-4D97-AF65-F5344CB8AC3E}">
+        <p14:creationId xmlns:p14="http://schemas.microsoft.com/office/powerpoint/2010/main" val="3393243109"/>
+      </p:ext>
+    </p:extLst>
+  </p:cSld>
+  <p:clrMapOvr>
+    <a:masterClrMapping/>
+  </p:clrMapOvr>
+  <p:transition spd="slow">
+    <p:wipe dir="d"/>
+  </p:transition>
+</p:sld>
+</file>
+
+<file path=ppt/slides/slide5.xml><?xml version="1.0" encoding="utf-8"?>
+<p:sld xmlns:a="http://schemas.openxmlformats.org/drawingml/2006/main" xmlns:r="http://schemas.openxmlformats.org/officeDocument/2006/relationships" xmlns:p="http://schemas.openxmlformats.org/presentationml/2006/main">
+  <p:cSld>
+    <p:spTree>
+      <p:nvGrpSpPr>
+        <p:cNvPr id="1" name=""/>
+        <p:cNvGrpSpPr/>
+        <p:nvPr/>
+      </p:nvGrpSpPr>
+      <p:grpSpPr>
+        <a:xfrm>
+          <a:off x="0" y="0"/>
+          <a:ext cx="0" cy="0"/>
+          <a:chOff x="0" y="0"/>
+          <a:chExt cx="0" cy="0"/>
+        </a:xfrm>
+      </p:grpSpPr>
+      <p:sp>
+        <p:nvSpPr>
+          <p:cNvPr id="2" name="Title 1"/>
+          <p:cNvSpPr>
+            <a:spLocks noGrp="1"/>
+          </p:cNvSpPr>
+          <p:nvPr>
+            <p:ph type="ctrTitle"/>
+            <p:custDataLst>
+              <p:tags r:id="rId2"/>
+            </p:custDataLst>
+          </p:nvPr>
+        </p:nvSpPr>
+        <p:spPr/>
+        <p:txBody>
+          <a:bodyPr/>
+          <a:lstStyle/>
+          <a:p>
+            <a:r>
+              <a:rPr lang="en-US" dirty="0" smtClean="0"/>
+              <a:t>NGDS Sustainability</a:t>
+            </a:r>
+            <a:endParaRPr lang="en-US" dirty="0"/>
+          </a:p>
+        </p:txBody>
+      </p:sp>
+      <p:sp>
+        <p:nvSpPr>
+          <p:cNvPr id="3" name="Subtitle 2"/>
+          <p:cNvSpPr>
+            <a:spLocks noGrp="1"/>
+          </p:cNvSpPr>
+          <p:nvPr>
+            <p:ph type="subTitle" idx="1"/>
+            <p:custDataLst>
+              <p:tags r:id="rId3"/>
+            </p:custDataLst>
+          </p:nvPr>
+        </p:nvSpPr>
+        <p:spPr/>
+        <p:txBody>
+          <a:bodyPr>
+            <a:normAutofit/>
+          </a:bodyPr>
+          <a:lstStyle/>
+          <a:p>
+            <a:r>
+              <a:rPr lang="en-US" sz="2400" dirty="0" smtClean="0">
+                <a:latin typeface="+mn-lt"/>
+              </a:rPr>
+              <a:t>Stephen Richard and NGDS team</a:t>
+            </a:r>
+          </a:p>
+          <a:p>
+            <a:r>
+              <a:rPr lang="en-US" sz="2400" dirty="0" smtClean="0">
+                <a:latin typeface="+mn-lt"/>
+              </a:rPr>
+              <a:t>Reno, NV  May 14, 2013 </a:t>
+            </a:r>
+            <a:endParaRPr lang="en-US" sz="2400" dirty="0">
+              <a:latin typeface="+mn-lt"/>
+            </a:endParaRPr>
+          </a:p>
+        </p:txBody>
+      </p:sp>
+    </p:spTree>
+    <p:custDataLst>
+      <p:tags r:id="rId1"/>
+    </p:custDataLst>
+  </p:cSld>
+  <p:clrMapOvr>
+    <a:masterClrMapping/>
+  </p:clrMapOvr>
+  <p:transition spd="slow">
+    <p:fade/>
+  </p:transition>
+  <p:timing>
+    <p:tnLst>
+      <p:par>
+        <p:cTn id="1" dur="indefinite" restart="never" nodeType="tmRoot"/>
+      </p:par>
+    </p:tnLst>
+  </p:timing>
+</p:sld>
+</file>
+
+<file path=ppt/slides/slide6.xml><?xml version="1.0" encoding="utf-8"?>
+<p:sld xmlns:a="http://schemas.openxmlformats.org/drawingml/2006/main" xmlns:r="http://schemas.openxmlformats.org/officeDocument/2006/relationships" xmlns:p="http://schemas.openxmlformats.org/presentationml/2006/main">
+  <p:cSld>
+    <p:spTree>
+      <p:nvGrpSpPr>
+        <p:cNvPr id="1" name=""/>
+        <p:cNvGrpSpPr/>
+        <p:nvPr/>
+      </p:nvGrpSpPr>
+      <p:grpSpPr>
+        <a:xfrm>
+          <a:off x="0" y="0"/>
+          <a:ext cx="0" cy="0"/>
+          <a:chOff x="0" y="0"/>
+          <a:chExt cx="0" cy="0"/>
+        </a:xfrm>
+      </p:grpSpPr>
+      <p:sp>
+        <p:nvSpPr>
+          <p:cNvPr id="2" name="Title 1"/>
+          <p:cNvSpPr>
+            <a:spLocks noGrp="1"/>
+          </p:cNvSpPr>
+          <p:nvPr>
+            <p:ph type="title"/>
+            <p:custDataLst>
+              <p:tags r:id="rId2"/>
+            </p:custDataLst>
+          </p:nvPr>
+        </p:nvSpPr>
+        <p:spPr/>
+        <p:txBody>
+          <a:bodyPr/>
+          <a:lstStyle/>
+          <a:p>
+            <a:r>
+              <a:rPr lang="en-US" dirty="0" smtClean="0"/>
+              <a:t>Outline</a:t>
+            </a:r>
+            <a:endParaRPr lang="en-US" dirty="0"/>
+          </a:p>
+        </p:txBody>
+      </p:sp>
+      <p:sp>
+        <p:nvSpPr>
+          <p:cNvPr id="5" name="Content Placeholder 4"/>
+          <p:cNvSpPr>
+            <a:spLocks noGrp="1"/>
+          </p:cNvSpPr>
+          <p:nvPr>
+            <p:ph idx="1"/>
+            <p:custDataLst>
+              <p:tags r:id="rId3"/>
+            </p:custDataLst>
+          </p:nvPr>
+        </p:nvSpPr>
+        <p:spPr/>
+        <p:txBody>
+          <a:bodyPr>
+            <a:normAutofit/>
+          </a:bodyPr>
+          <a:lstStyle/>
+          <a:p>
+            <a:r>
+              <a:rPr lang="en-US" dirty="0" smtClean="0"/>
+              <a:t>What needs to be sustained </a:t>
+            </a:r>
+          </a:p>
+          <a:p>
+            <a:r>
+              <a:rPr lang="en-US" dirty="0" smtClean="0"/>
+              <a:t>Costs</a:t>
+            </a:r>
+          </a:p>
+          <a:p>
+            <a:r>
+              <a:rPr lang="en-US" dirty="0" smtClean="0"/>
+              <a:t>Business models</a:t>
+            </a:r>
+            <a:endParaRPr lang="en-US" dirty="0"/>
+          </a:p>
+        </p:txBody>
+      </p:sp>
+    </p:spTree>
+    <p:custDataLst>
+      <p:tags r:id="rId1"/>
+    </p:custDataLst>
+  </p:cSld>
+  <p:clrMapOvr>
+    <a:masterClrMapping/>
+  </p:clrMapOvr>
+  <p:transition spd="slow">
+    <p:wipe dir="d"/>
+  </p:transition>
+  <p:timing>
+    <p:tnLst>
+      <p:par>
+        <p:cTn id="1" dur="indefinite" restart="never" nodeType="tmRoot"/>
+      </p:par>
+    </p:tnLst>
+  </p:timing>
+</p:sld>
+</file>
+
+<file path=ppt/slides/slide7.xml><?xml version="1.0" encoding="utf-8"?>
+<p:sld xmlns:a="http://schemas.openxmlformats.org/drawingml/2006/main" xmlns:r="http://schemas.openxmlformats.org/officeDocument/2006/relationships" xmlns:p="http://schemas.openxmlformats.org/presentationml/2006/main">
+  <p:cSld>
+    <p:spTree>
+      <p:nvGrpSpPr>
+        <p:cNvPr id="1" name=""/>
+        <p:cNvGrpSpPr/>
+        <p:nvPr/>
+      </p:nvGrpSpPr>
+      <p:grpSpPr>
+        <a:xfrm>
+          <a:off x="0" y="0"/>
+          <a:ext cx="0" cy="0"/>
+          <a:chOff x="0" y="0"/>
+          <a:chExt cx="0" cy="0"/>
+        </a:xfrm>
+      </p:grpSpPr>
+      <p:sp>
+        <p:nvSpPr>
+          <p:cNvPr id="2" name="Title 1"/>
+          <p:cNvSpPr>
+            <a:spLocks noGrp="1"/>
+          </p:cNvSpPr>
+          <p:nvPr>
+            <p:ph type="title"/>
+          </p:nvPr>
+        </p:nvSpPr>
+        <p:spPr/>
+        <p:txBody>
+          <a:bodyPr/>
+          <a:lstStyle/>
+          <a:p>
+            <a:r>
+              <a:rPr lang="en-US" dirty="0" smtClean="0"/>
+              <a:t>Paradigm Shift</a:t>
+            </a:r>
+            <a:endParaRPr lang="en-US" dirty="0"/>
+          </a:p>
+        </p:txBody>
+      </p:sp>
+      <p:sp>
+        <p:nvSpPr>
+          <p:cNvPr id="3" name="Content Placeholder 2"/>
+          <p:cNvSpPr>
+            <a:spLocks noGrp="1"/>
+          </p:cNvSpPr>
+          <p:nvPr>
+            <p:ph idx="1"/>
+          </p:nvPr>
+        </p:nvSpPr>
+        <p:spPr/>
+        <p:txBody>
+          <a:bodyPr/>
+          <a:lstStyle/>
+          <a:p>
+            <a:r>
+              <a:rPr lang="en-US" dirty="0" smtClean="0"/>
+              <a:t>From: Paper publications as the product</a:t>
+            </a:r>
+          </a:p>
+          <a:p>
+            <a:r>
+              <a:rPr lang="en-US" dirty="0" smtClean="0"/>
+              <a:t>To: Information via web services as the product </a:t>
+            </a:r>
+            <a:endParaRPr lang="en-US" dirty="0"/>
+          </a:p>
+        </p:txBody>
+      </p:sp>
+      <p:pic>
+        <p:nvPicPr>
+          <p:cNvPr id="1028" name="Picture 4" descr="https://encrypted-tbn1.gstatic.com/images?q=tbn:ANd9GcRbgruyKr4FgIaCjZpvoCF83xj2-2jv1Iw0VpazuSXvyxaUX-ftag"/>
+          <p:cNvPicPr>
+            <a:picLocks noChangeAspect="1" noChangeArrowheads="1"/>
+          </p:cNvPicPr>
+          <p:nvPr/>
+        </p:nvPicPr>
+        <p:blipFill>
+          <a:blip r:embed="rId2">
+            <a:extLst>
+              <a:ext uri="{28A0092B-C50C-407E-A947-70E740481C1C}">
+                <a14:useLocalDpi xmlns:a14="http://schemas.microsoft.com/office/drawing/2010/main" val="0"/>
+              </a:ext>
+            </a:extLst>
+          </a:blip>
+          <a:srcRect/>
+          <a:stretch>
+            <a:fillRect/>
+          </a:stretch>
+        </p:blipFill>
+        <p:spPr bwMode="auto">
+          <a:xfrm>
+            <a:off x="10058400" y="2819400"/>
+            <a:ext cx="2162175" cy="2114550"/>
+          </a:xfrm>
+          <a:prstGeom prst="rect">
+            <a:avLst/>
+          </a:prstGeom>
+          <a:noFill/>
+          <a:extLst>
+            <a:ext uri="{909E8E84-426E-40DD-AFC4-6F175D3DCCD1}">
+              <a14:hiddenFill xmlns:a14="http://schemas.microsoft.com/office/drawing/2010/main">
+                <a:solidFill>
+                  <a:srgbClr val="FFFFFF"/>
+                </a:solidFill>
+              </a14:hiddenFill>
+            </a:ext>
+          </a:extLst>
+        </p:spPr>
+      </p:pic>
+      <p:pic>
+        <p:nvPicPr>
+          <p:cNvPr id="1030" name="Picture 6" descr="http://www.aronsonsecurity.com/Portals/55833/images/newparadigmahead.jpg"/>
+          <p:cNvPicPr>
+            <a:picLocks noChangeAspect="1" noChangeArrowheads="1"/>
+          </p:cNvPicPr>
+          <p:nvPr/>
+        </p:nvPicPr>
+        <p:blipFill>
+          <a:blip r:embed="rId3">
+            <a:extLst>
+              <a:ext uri="{28A0092B-C50C-407E-A947-70E740481C1C}">
+                <a14:useLocalDpi xmlns:a14="http://schemas.microsoft.com/office/drawing/2010/main" val="0"/>
+              </a:ext>
+            </a:extLst>
+          </a:blip>
+          <a:srcRect/>
+          <a:stretch>
+            <a:fillRect/>
+          </a:stretch>
+        </p:blipFill>
+        <p:spPr bwMode="auto">
+          <a:xfrm>
+            <a:off x="1077884" y="3590924"/>
+            <a:ext cx="4048125" cy="2686051"/>
+          </a:xfrm>
+          <a:prstGeom prst="rect">
+            <a:avLst/>
+          </a:prstGeom>
+          <a:noFill/>
+          <a:extLst>
+            <a:ext uri="{909E8E84-426E-40DD-AFC4-6F175D3DCCD1}">
+              <a14:hiddenFill xmlns:a14="http://schemas.microsoft.com/office/drawing/2010/main">
+                <a:solidFill>
+                  <a:srgbClr val="FFFFFF"/>
+                </a:solidFill>
+              </a14:hiddenFill>
+            </a:ext>
+          </a:extLst>
+        </p:spPr>
+      </p:pic>
+    </p:spTree>
+    <p:extLst>
+      <p:ext uri="{BB962C8B-B14F-4D97-AF65-F5344CB8AC3E}">
+        <p14:creationId xmlns:p14="http://schemas.microsoft.com/office/powerpoint/2010/main" val="137891083"/>
+      </p:ext>
+    </p:extLst>
+  </p:cSld>
+  <p:clrMapOvr>
+    <a:masterClrMapping/>
+  </p:clrMapOvr>
+  <p:transition spd="slow">
+    <p:wipe dir="d"/>
+  </p:transition>
+</p:sld>
+</file>
+
 <file path=ppt/slides/slide8.xml><?xml version="1.0" encoding="utf-8"?>
 <p:sld xmlns:a="http://schemas.openxmlformats.org/drawingml/2006/main" xmlns:r="http://schemas.openxmlformats.org/officeDocument/2006/relationships" xmlns:p="http://schemas.openxmlformats.org/presentationml/2006/main">
   <p:cSld>
@@ -5966,87 +6404,47 @@
         </p:nvSpPr>
         <p:spPr/>
         <p:txBody>
-          <a:bodyPr>
-            <a:normAutofit/>
-          </a:bodyPr>
-          <a:lstStyle/>
-          <a:p>
-            <a:r>
-              <a:rPr lang="en-US" dirty="0" smtClean="0"/>
-              <a:t>Grand Total:</a:t>
-            </a:r>
-            <a:endParaRPr lang="en-US" dirty="0"/>
-          </a:p>
-        </p:txBody>
-      </p:sp>
-      <p:sp>
-        <p:nvSpPr>
-          <p:cNvPr id="3" name="Content Placeholder 2"/>
-          <p:cNvSpPr>
-            <a:spLocks noGrp="1"/>
-          </p:cNvSpPr>
-          <p:nvPr>
-            <p:ph idx="1"/>
-          </p:nvPr>
-        </p:nvSpPr>
-        <p:spPr/>
-        <p:txBody>
           <a:bodyPr/>
           <a:lstStyle/>
           <a:p>
             <a:r>
-              <a:rPr lang="en-US" b="1" dirty="0"/>
-              <a:t>$</a:t>
-            </a:r>
-            <a:r>
-              <a:rPr lang="en-US" b="1" dirty="0" smtClean="0"/>
-              <a:t>18,300.00   </a:t>
-            </a:r>
-            <a:r>
               <a:rPr lang="en-US" dirty="0" smtClean="0"/>
-              <a:t>per year</a:t>
-            </a:r>
-          </a:p>
-          <a:p>
-            <a:pPr lvl="1"/>
+              <a:t>State surveys as data providers</a:t>
+            </a:r>
+            <a:endParaRPr lang="en-US" dirty="0"/>
+          </a:p>
+        </p:txBody>
+      </p:sp>
+      <p:sp>
+        <p:nvSpPr>
+          <p:cNvPr id="3" name="Content Placeholder 2"/>
+          <p:cNvSpPr>
+            <a:spLocks noGrp="1"/>
+          </p:cNvSpPr>
+          <p:nvPr>
+            <p:ph idx="1"/>
+          </p:nvPr>
+        </p:nvSpPr>
+        <p:spPr/>
+        <p:txBody>
+          <a:bodyPr/>
+          <a:lstStyle/>
+          <a:p>
             <a:r>
               <a:rPr lang="en-US" dirty="0" smtClean="0"/>
-              <a:t>% personnel</a:t>
-            </a:r>
-            <a:r>
-              <a:rPr lang="en-US" dirty="0"/>
-              <a:t>	83%</a:t>
-            </a:r>
-          </a:p>
-          <a:p>
-            <a:pPr lvl="1"/>
+              <a:t>We all have web servers and web sites </a:t>
+            </a:r>
+          </a:p>
+          <a:p>
             <a:r>
               <a:rPr lang="en-US" dirty="0" smtClean="0"/>
-              <a:t>% equipment</a:t>
-            </a:r>
-            <a:r>
-              <a:rPr lang="en-US" dirty="0"/>
-              <a:t>	17</a:t>
-            </a:r>
+              <a:t>Run data services </a:t>
+            </a:r>
+          </a:p>
+          <a:p>
             <a:r>
               <a:rPr lang="en-US" dirty="0" smtClean="0"/>
-              <a:t>%</a:t>
-            </a:r>
-          </a:p>
-          <a:p>
-            <a:pPr lvl="1"/>
-            <a:endParaRPr lang="en-US" dirty="0"/>
-          </a:p>
-          <a:p>
-            <a:r>
-              <a:rPr lang="en-US" dirty="0" smtClean="0"/>
-              <a:t>Account for lifetime of hardware</a:t>
-            </a:r>
-          </a:p>
-          <a:p>
-            <a:r>
-              <a:rPr lang="en-US" dirty="0" smtClean="0"/>
-              <a:t>Include funds for personnel to monitor and update</a:t>
+              <a:t>Have to integrate web usage metrics into agency performance assessment</a:t>
             </a:r>
             <a:endParaRPr lang="en-US" dirty="0"/>
           </a:p>
@@ -6055,7 +6453,7 @@
     </p:spTree>
     <p:extLst>
       <p:ext uri="{BB962C8B-B14F-4D97-AF65-F5344CB8AC3E}">
-        <p14:creationId xmlns:p14="http://schemas.microsoft.com/office/powerpoint/2010/main" val="288215504"/>
+        <p14:creationId xmlns:p14="http://schemas.microsoft.com/office/powerpoint/2010/main" val="1464449752"/>
       </p:ext>
     </p:extLst>
   </p:cSld>
@@ -6102,7 +6500,7 @@
           <a:p>
             <a:r>
               <a:rPr lang="en-US" dirty="0" smtClean="0"/>
-              <a:t>Business models:</a:t>
+              <a:t>What needs to be maintained</a:t>
             </a:r>
             <a:endParaRPr lang="en-US" dirty="0"/>
           </a:p>
@@ -6118,38 +6516,69 @@
             <p:ph idx="1"/>
           </p:nvPr>
         </p:nvSpPr>
-        <p:spPr/>
-        <p:txBody>
-          <a:bodyPr/>
+        <p:spPr>
+          <a:xfrm>
+            <a:off x="762000" y="1596413"/>
+            <a:ext cx="8077200" cy="4575787"/>
+          </a:xfrm>
+        </p:spPr>
+        <p:txBody>
+          <a:bodyPr>
+            <a:normAutofit/>
+          </a:bodyPr>
           <a:lstStyle/>
           <a:p>
             <a:r>
               <a:rPr lang="en-US" dirty="0" smtClean="0"/>
-              <a:t>Build into operating costs</a:t>
-            </a:r>
-          </a:p>
-          <a:p>
+              <a:t>Web server:</a:t>
+            </a:r>
+          </a:p>
+          <a:p>
+            <a:pPr lvl="1"/>
             <a:r>
               <a:rPr lang="en-US" dirty="0" smtClean="0"/>
-              <a:t>Sponsors</a:t>
-            </a:r>
-          </a:p>
-          <a:p>
+              <a:t>Physical server</a:t>
+            </a:r>
+          </a:p>
+          <a:p>
+            <a:pPr lvl="1"/>
             <a:r>
               <a:rPr lang="en-US" dirty="0" smtClean="0"/>
-              <a:t>Advertising</a:t>
-            </a:r>
-          </a:p>
-          <a:p>
+              <a:t>Cloud server</a:t>
+            </a:r>
+          </a:p>
+          <a:p>
+            <a:pPr lvl="1"/>
             <a:r>
               <a:rPr lang="en-US" dirty="0" smtClean="0"/>
-              <a:t>Subscriptions</a:t>
+              <a:t>Hosting service</a:t>
             </a:r>
           </a:p>
           <a:p>
             <a:r>
               <a:rPr lang="en-US" dirty="0" smtClean="0"/>
-              <a:t>… </a:t>
+              <a:t>Datasets:</a:t>
+            </a:r>
+          </a:p>
+          <a:p>
+            <a:pPr lvl="1"/>
+            <a:r>
+              <a:rPr lang="en-US" dirty="0" smtClean="0"/>
+              <a:t>Correct errors</a:t>
+            </a:r>
+          </a:p>
+          <a:p>
+            <a:pPr lvl="1"/>
+            <a:r>
+              <a:rPr lang="en-US" dirty="0" smtClean="0"/>
+              <a:t>Update with new data</a:t>
+            </a:r>
+          </a:p>
+          <a:p>
+            <a:pPr lvl="1"/>
+            <a:r>
+              <a:rPr lang="en-US" dirty="0" smtClean="0"/>
+              <a:t>Upgrade as software evolves</a:t>
             </a:r>
             <a:endParaRPr lang="en-US" dirty="0"/>
           </a:p>
@@ -6158,7 +6587,7 @@
     </p:spTree>
     <p:extLst>
       <p:ext uri="{BB962C8B-B14F-4D97-AF65-F5344CB8AC3E}">
-        <p14:creationId xmlns:p14="http://schemas.microsoft.com/office/powerpoint/2010/main" val="3394251941"/>
+        <p14:creationId xmlns:p14="http://schemas.microsoft.com/office/powerpoint/2010/main" val="1930345773"/>
       </p:ext>
     </p:extLst>
   </p:cSld>

</xml_diff>

<commit_message>
update presentation and demo ArcMap project
</commit_message>
<xml_diff>
--- a/WesternRegionalWorkshop/NGDSSustainability.pptx
+++ b/WesternRegionalWorkshop/NGDSSustainability.pptx
@@ -5,25 +5,28 @@
     <p:sldMasterId id="2147483648" r:id="rId1"/>
   </p:sldMasterIdLst>
   <p:notesMasterIdLst>
-    <p:notesMasterId r:id="rId15"/>
+    <p:notesMasterId r:id="rId18"/>
   </p:notesMasterIdLst>
   <p:handoutMasterIdLst>
-    <p:handoutMasterId r:id="rId16"/>
+    <p:handoutMasterId r:id="rId19"/>
   </p:handoutMasterIdLst>
   <p:sldIdLst>
-    <p:sldId id="269" r:id="rId2"/>
-    <p:sldId id="270" r:id="rId3"/>
-    <p:sldId id="271" r:id="rId4"/>
-    <p:sldId id="272" r:id="rId5"/>
-    <p:sldId id="259" r:id="rId6"/>
-    <p:sldId id="261" r:id="rId7"/>
-    <p:sldId id="262" r:id="rId8"/>
-    <p:sldId id="263" r:id="rId9"/>
-    <p:sldId id="264" r:id="rId10"/>
-    <p:sldId id="265" r:id="rId11"/>
-    <p:sldId id="266" r:id="rId12"/>
-    <p:sldId id="267" r:id="rId13"/>
-    <p:sldId id="268" r:id="rId14"/>
+    <p:sldId id="273" r:id="rId2"/>
+    <p:sldId id="274" r:id="rId3"/>
+    <p:sldId id="275" r:id="rId4"/>
+    <p:sldId id="269" r:id="rId5"/>
+    <p:sldId id="270" r:id="rId6"/>
+    <p:sldId id="271" r:id="rId7"/>
+    <p:sldId id="272" r:id="rId8"/>
+    <p:sldId id="259" r:id="rId9"/>
+    <p:sldId id="261" r:id="rId10"/>
+    <p:sldId id="262" r:id="rId11"/>
+    <p:sldId id="263" r:id="rId12"/>
+    <p:sldId id="264" r:id="rId13"/>
+    <p:sldId id="265" r:id="rId14"/>
+    <p:sldId id="266" r:id="rId15"/>
+    <p:sldId id="267" r:id="rId16"/>
+    <p:sldId id="268" r:id="rId17"/>
   </p:sldIdLst>
   <p:sldSz cx="9144000" cy="6858000" type="screen4x3"/>
   <p:notesSz cx="6858000" cy="9144000"/>
@@ -209,7 +212,7 @@
             <a:fld id="{D83FDC75-7F73-4A4A-A77C-09AADF00E0EA}" type="datetimeFigureOut">
               <a:rPr lang="en-US" smtClean="0"/>
               <a:pPr/>
-              <a:t>5/13/2013</a:t>
+              <a:t>5/14/2013</a:t>
             </a:fld>
             <a:endParaRPr lang="en-US" dirty="0"/>
           </a:p>
@@ -376,7 +379,7 @@
             <a:fld id="{48AEF76B-3757-4A0B-AF93-28494465C1DD}" type="datetimeFigureOut">
               <a:rPr lang="en-US" smtClean="0"/>
               <a:pPr/>
-              <a:t>5/13/2013</a:t>
+              <a:t>5/14/2013</a:t>
             </a:fld>
             <a:endParaRPr lang="en-US" dirty="0"/>
           </a:p>
@@ -713,7 +716,7 @@
             <a:fld id="{EC6EAC7D-5A89-47C2-8ABA-56C9C2DEF7A4}" type="slidenum">
               <a:rPr lang="en-US" smtClean="0"/>
               <a:pPr/>
-              <a:t>5</a:t>
+              <a:t>8</a:t>
             </a:fld>
             <a:endParaRPr lang="en-US"/>
           </a:p>
@@ -800,7 +803,7 @@
             <a:fld id="{EC6EAC7D-5A89-47C2-8ABA-56C9C2DEF7A4}" type="slidenum">
               <a:rPr lang="en-US" smtClean="0"/>
               <a:pPr/>
-              <a:t>6</a:t>
+              <a:t>9</a:t>
             </a:fld>
             <a:endParaRPr lang="en-US"/>
           </a:p>
@@ -1080,6 +1083,36 @@
           </a:p>
         </p:txBody>
       </p:sp>
+      <p:pic>
+        <p:nvPicPr>
+          <p:cNvPr id="8" name="Picture 7"/>
+          <p:cNvPicPr>
+            <a:picLocks noChangeAspect="1"/>
+          </p:cNvPicPr>
+          <p:nvPr userDrawn="1"/>
+        </p:nvPicPr>
+        <p:blipFill>
+          <a:blip r:embed="rId4">
+            <a:extLst>
+              <a:ext uri="{28A0092B-C50C-407E-A947-70E740481C1C}">
+                <a14:useLocalDpi xmlns:a14="http://schemas.microsoft.com/office/drawing/2010/main" val="0"/>
+              </a:ext>
+            </a:extLst>
+          </a:blip>
+          <a:stretch>
+            <a:fillRect/>
+          </a:stretch>
+        </p:blipFill>
+        <p:spPr>
+          <a:xfrm>
+            <a:off x="304800" y="5029200"/>
+            <a:ext cx="686198" cy="1270738"/>
+          </a:xfrm>
+          <a:prstGeom prst="rect">
+            <a:avLst/>
+          </a:prstGeom>
+        </p:spPr>
+      </p:pic>
     </p:spTree>
   </p:cSld>
   <p:clrMapOvr>
@@ -1282,7 +1315,7 @@
             <a:fld id="{757B281C-5159-4971-8228-52B9A72E9ED2}" type="datetimeFigureOut">
               <a:rPr lang="en-US" smtClean="0"/>
               <a:pPr/>
-              <a:t>5/13/2013</a:t>
+              <a:t>5/14/2013</a:t>
             </a:fld>
             <a:endParaRPr lang="en-US" dirty="0"/>
           </a:p>
@@ -1384,7 +1417,7 @@
             <a:fld id="{757B281C-5159-4971-8228-52B9A72E9ED2}" type="datetimeFigureOut">
               <a:rPr lang="en-US" smtClean="0"/>
               <a:pPr/>
-              <a:t>5/13/2013</a:t>
+              <a:t>5/14/2013</a:t>
             </a:fld>
             <a:endParaRPr lang="en-US" dirty="0"/>
           </a:p>
@@ -1520,7 +1553,7 @@
             <a:fld id="{757B281C-5159-4971-8228-52B9A72E9ED2}" type="datetimeFigureOut">
               <a:rPr lang="en-US" smtClean="0"/>
               <a:pPr/>
-              <a:t>5/13/2013</a:t>
+              <a:t>5/14/2013</a:t>
             </a:fld>
             <a:endParaRPr lang="en-US" dirty="0"/>
           </a:p>
@@ -1726,7 +1759,7 @@
             <a:fld id="{757B281C-5159-4971-8228-52B9A72E9ED2}" type="datetimeFigureOut">
               <a:rPr lang="en-US" smtClean="0"/>
               <a:pPr/>
-              <a:t>5/13/2013</a:t>
+              <a:t>5/14/2013</a:t>
             </a:fld>
             <a:endParaRPr lang="en-US" dirty="0"/>
           </a:p>
@@ -2125,7 +2158,7 @@
             <a:fld id="{757B281C-5159-4971-8228-52B9A72E9ED2}" type="datetimeFigureOut">
               <a:rPr lang="en-US" smtClean="0"/>
               <a:pPr/>
-              <a:t>5/13/2013</a:t>
+              <a:t>5/14/2013</a:t>
             </a:fld>
             <a:endParaRPr lang="en-US" dirty="0"/>
           </a:p>
@@ -2179,6 +2212,36 @@
           </a:p>
         </p:txBody>
       </p:sp>
+      <p:pic>
+        <p:nvPicPr>
+          <p:cNvPr id="7" name="Picture 6"/>
+          <p:cNvPicPr>
+            <a:picLocks noChangeAspect="1"/>
+          </p:cNvPicPr>
+          <p:nvPr userDrawn="1"/>
+        </p:nvPicPr>
+        <p:blipFill>
+          <a:blip r:embed="rId3" cstate="email">
+            <a:extLst>
+              <a:ext uri="{28A0092B-C50C-407E-A947-70E740481C1C}">
+                <a14:useLocalDpi xmlns:a14="http://schemas.microsoft.com/office/drawing/2010/main" val="0"/>
+              </a:ext>
+            </a:extLst>
+          </a:blip>
+          <a:stretch>
+            <a:fillRect/>
+          </a:stretch>
+        </p:blipFill>
+        <p:spPr>
+          <a:xfrm>
+            <a:off x="110835" y="6096000"/>
+            <a:ext cx="343099" cy="635369"/>
+          </a:xfrm>
+          <a:prstGeom prst="rect">
+            <a:avLst/>
+          </a:prstGeom>
+        </p:spPr>
+      </p:pic>
     </p:spTree>
   </p:cSld>
   <p:clrMapOvr>
@@ -2425,7 +2488,7 @@
             <a:fld id="{757B281C-5159-4971-8228-52B9A72E9ED2}" type="datetimeFigureOut">
               <a:rPr lang="en-US" smtClean="0"/>
               <a:pPr/>
-              <a:t>5/13/2013</a:t>
+              <a:t>5/14/2013</a:t>
             </a:fld>
             <a:endParaRPr lang="en-US" dirty="0"/>
           </a:p>
@@ -2854,7 +2917,7 @@
             <a:fld id="{757B281C-5159-4971-8228-52B9A72E9ED2}" type="datetimeFigureOut">
               <a:rPr lang="en-US" smtClean="0"/>
               <a:pPr/>
-              <a:t>5/13/2013</a:t>
+              <a:t>5/14/2013</a:t>
             </a:fld>
             <a:endParaRPr lang="en-US" dirty="0"/>
           </a:p>
@@ -3131,7 +3194,7 @@
             <a:fld id="{757B281C-5159-4971-8228-52B9A72E9ED2}" type="datetimeFigureOut">
               <a:rPr lang="en-US" smtClean="0"/>
               <a:pPr/>
-              <a:t>5/13/2013</a:t>
+              <a:t>5/14/2013</a:t>
             </a:fld>
             <a:endParaRPr lang="en-US" dirty="0"/>
           </a:p>
@@ -3395,7 +3458,7 @@
             <a:fld id="{757B281C-5159-4971-8228-52B9A72E9ED2}" type="datetimeFigureOut">
               <a:rPr lang="en-US" smtClean="0"/>
               <a:pPr/>
-              <a:t>5/13/2013</a:t>
+              <a:t>5/14/2013</a:t>
             </a:fld>
             <a:endParaRPr lang="en-US" dirty="0"/>
           </a:p>
@@ -3565,7 +3628,7 @@
             <a:fld id="{757B281C-5159-4971-8228-52B9A72E9ED2}" type="datetimeFigureOut">
               <a:rPr lang="en-US" smtClean="0"/>
               <a:pPr/>
-              <a:t>5/13/2013</a:t>
+              <a:t>5/14/2013</a:t>
             </a:fld>
             <a:endParaRPr lang="en-US" dirty="0"/>
           </a:p>
@@ -3745,7 +3808,7 @@
             <a:fld id="{757B281C-5159-4971-8228-52B9A72E9ED2}" type="datetimeFigureOut">
               <a:rPr lang="en-US" smtClean="0"/>
               <a:pPr/>
-              <a:t>5/13/2013</a:t>
+              <a:t>5/14/2013</a:t>
             </a:fld>
             <a:endParaRPr lang="en-US" dirty="0"/>
           </a:p>
@@ -3987,7 +4050,7 @@
             <a:fld id="{757B281C-5159-4971-8228-52B9A72E9ED2}" type="datetimeFigureOut">
               <a:rPr lang="en-US" smtClean="0"/>
               <a:pPr/>
-              <a:t>5/13/2013</a:t>
+              <a:t>5/14/2013</a:t>
             </a:fld>
             <a:endParaRPr lang="en-US" dirty="0"/>
           </a:p>
@@ -4410,13 +4473,18 @@
         </p:nvSpPr>
         <p:spPr/>
         <p:txBody>
-          <a:bodyPr/>
+          <a:bodyPr>
+            <a:normAutofit fontScale="90000"/>
+          </a:bodyPr>
           <a:lstStyle/>
           <a:p>
             <a:r>
-              <a:rPr lang="en-US" dirty="0" smtClean="0"/>
-              <a:t>Why </a:t>
-            </a:r>
+              <a:rPr lang="en-US" dirty="0"/>
+              <a:t>Demystifying interoperability</a:t>
+            </a:r>
+            <a:br>
+              <a:rPr lang="en-US" dirty="0"/>
+            </a:br>
             <a:endParaRPr lang="en-US" dirty="0"/>
           </a:p>
         </p:txBody>
@@ -4431,53 +4499,145 @@
             <p:ph type="subTitle" idx="1"/>
           </p:nvPr>
         </p:nvSpPr>
-        <p:spPr/>
-        <p:txBody>
-          <a:bodyPr/>
-          <a:lstStyle/>
-          <a:p>
-            <a:r>
-              <a:rPr lang="en-US" dirty="0" smtClean="0"/>
-              <a:t>Is interoperability worth the pain</a:t>
-            </a:r>
-            <a:endParaRPr lang="en-US" dirty="0"/>
-          </a:p>
-        </p:txBody>
-      </p:sp>
-      <p:pic>
-        <p:nvPicPr>
-          <p:cNvPr id="6" name="Picture 5"/>
-          <p:cNvPicPr>
-            <a:picLocks noChangeAspect="1"/>
-          </p:cNvPicPr>
-          <p:nvPr/>
-        </p:nvPicPr>
-        <p:blipFill>
-          <a:blip r:embed="rId2">
-            <a:extLst>
-              <a:ext uri="{28A0092B-C50C-407E-A947-70E740481C1C}">
-                <a14:useLocalDpi xmlns:a14="http://schemas.microsoft.com/office/drawing/2010/main" val="0"/>
-              </a:ext>
-            </a:extLst>
-          </a:blip>
-          <a:stretch>
-            <a:fillRect/>
-          </a:stretch>
-        </p:blipFill>
         <p:spPr>
           <a:xfrm>
-            <a:off x="7543800" y="4876800"/>
-            <a:ext cx="686198" cy="1270738"/>
+            <a:off x="3962400" y="3276600"/>
+            <a:ext cx="4772528" cy="990600"/>
+          </a:xfrm>
+        </p:spPr>
+        <p:txBody>
+          <a:bodyPr>
+            <a:normAutofit fontScale="85000" lnSpcReduction="10000"/>
+          </a:bodyPr>
+          <a:lstStyle/>
+          <a:p>
+            <a:r>
+              <a:rPr lang="en-US" dirty="0" smtClean="0"/>
+              <a:t>The </a:t>
+            </a:r>
+            <a:r>
+              <a:rPr lang="en-US" b="1" dirty="0" smtClean="0"/>
+              <a:t>National Geothermal Data System</a:t>
+            </a:r>
+            <a:r>
+              <a:rPr lang="en-US" dirty="0" smtClean="0"/>
+              <a:t>:</a:t>
+            </a:r>
+          </a:p>
+          <a:p>
+            <a:r>
+              <a:rPr lang="en-US" dirty="0" smtClean="0"/>
+              <a:t>Implementation of the</a:t>
+            </a:r>
+            <a:r>
+              <a:rPr lang="en-US" b="1" dirty="0" smtClean="0"/>
+              <a:t> </a:t>
+            </a:r>
+            <a:br>
+              <a:rPr lang="en-US" b="1" dirty="0" smtClean="0"/>
+            </a:br>
+            <a:r>
+              <a:rPr lang="en-US" b="1" dirty="0" smtClean="0"/>
+              <a:t>U.S. Geoscience Information Network </a:t>
+            </a:r>
+            <a:endParaRPr lang="en-US" b="1" dirty="0"/>
+          </a:p>
+        </p:txBody>
+      </p:sp>
+      <p:sp>
+        <p:nvSpPr>
+          <p:cNvPr id="5" name="TextBox 4"/>
+          <p:cNvSpPr txBox="1"/>
+          <p:nvPr/>
+        </p:nvSpPr>
+        <p:spPr>
+          <a:xfrm>
+            <a:off x="4467728" y="4648200"/>
+            <a:ext cx="4267200" cy="646331"/>
           </a:xfrm>
           <a:prstGeom prst="rect">
             <a:avLst/>
           </a:prstGeom>
+          <a:noFill/>
         </p:spPr>
-      </p:pic>
+        <p:txBody>
+          <a:bodyPr wrap="square" numCol="2" rtlCol="0">
+            <a:spAutoFit/>
+          </a:bodyPr>
+          <a:lstStyle/>
+          <a:p>
+            <a:pPr algn="r"/>
+            <a:r>
+              <a:rPr lang="en-US" dirty="0" smtClean="0"/>
+              <a:t>Stephen M Richard</a:t>
+            </a:r>
+          </a:p>
+          <a:p>
+            <a:pPr algn="r"/>
+            <a:r>
+              <a:rPr lang="en-US" dirty="0" smtClean="0"/>
+              <a:t>Ron Palmer</a:t>
+            </a:r>
+          </a:p>
+          <a:p>
+            <a:pPr algn="r"/>
+            <a:r>
+              <a:rPr lang="en-US" dirty="0" smtClean="0"/>
+              <a:t>Christy Caudill</a:t>
+            </a:r>
+          </a:p>
+          <a:p>
+            <a:pPr algn="r"/>
+            <a:r>
+              <a:rPr lang="en-US" dirty="0" smtClean="0"/>
+              <a:t>Janel Day</a:t>
+            </a:r>
+            <a:endParaRPr lang="en-US" dirty="0"/>
+          </a:p>
+        </p:txBody>
+      </p:sp>
+      <p:sp>
+        <p:nvSpPr>
+          <p:cNvPr id="6" name="TextBox 5"/>
+          <p:cNvSpPr txBox="1"/>
+          <p:nvPr/>
+        </p:nvSpPr>
+        <p:spPr>
+          <a:xfrm>
+            <a:off x="4696328" y="5562600"/>
+            <a:ext cx="4038600" cy="646331"/>
+          </a:xfrm>
+          <a:prstGeom prst="rect">
+            <a:avLst/>
+          </a:prstGeom>
+          <a:noFill/>
+        </p:spPr>
+        <p:txBody>
+          <a:bodyPr wrap="square" rtlCol="0">
+            <a:spAutoFit/>
+          </a:bodyPr>
+          <a:lstStyle/>
+          <a:p>
+            <a:pPr algn="r"/>
+            <a:r>
+              <a:rPr lang="en-US" dirty="0" smtClean="0"/>
+              <a:t>Grand Sierra Resort and Casino, Reno, NV</a:t>
+            </a:r>
+          </a:p>
+          <a:p>
+            <a:pPr algn="r"/>
+            <a:r>
+              <a:rPr lang="en-US" dirty="0" smtClean="0"/>
+              <a:t>May 14, 2013</a:t>
+            </a:r>
+            <a:endParaRPr lang="en-US" dirty="0"/>
+          </a:p>
+        </p:txBody>
+      </p:sp>
     </p:spTree>
     <p:extLst>
       <p:ext uri="{BB962C8B-B14F-4D97-AF65-F5344CB8AC3E}">
-        <p14:creationId xmlns:p14="http://schemas.microsoft.com/office/powerpoint/2010/main" val="3208795293"/>
+        <p14:creationId xmlns:p14="http://schemas.microsoft.com/office/powerpoint/2010/main" val="2040057281"/>
       </p:ext>
     </p:extLst>
   </p:cSld>
@@ -4487,6 +4647,13 @@
   <p:transition spd="slow">
     <p:wipe dir="d"/>
   </p:transition>
+  <p:timing>
+    <p:tnLst>
+      <p:par>
+        <p:cTn id="1" dur="indefinite" restart="never" nodeType="tmRoot"/>
+      </p:par>
+    </p:tnLst>
+  </p:timing>
 </p:sld>
 </file>
 
@@ -4524,6 +4691,435 @@
           <a:p>
             <a:r>
               <a:rPr lang="en-US" dirty="0" smtClean="0"/>
+              <a:t>Paradigm Shift</a:t>
+            </a:r>
+            <a:endParaRPr lang="en-US" dirty="0"/>
+          </a:p>
+        </p:txBody>
+      </p:sp>
+      <p:sp>
+        <p:nvSpPr>
+          <p:cNvPr id="3" name="Content Placeholder 2"/>
+          <p:cNvSpPr>
+            <a:spLocks noGrp="1"/>
+          </p:cNvSpPr>
+          <p:nvPr>
+            <p:ph idx="1"/>
+          </p:nvPr>
+        </p:nvSpPr>
+        <p:spPr/>
+        <p:txBody>
+          <a:bodyPr/>
+          <a:lstStyle/>
+          <a:p>
+            <a:r>
+              <a:rPr lang="en-US" dirty="0" smtClean="0"/>
+              <a:t>From: Paper publications as the product</a:t>
+            </a:r>
+          </a:p>
+          <a:p>
+            <a:r>
+              <a:rPr lang="en-US" dirty="0" smtClean="0"/>
+              <a:t>To: Information via web services as the product </a:t>
+            </a:r>
+            <a:endParaRPr lang="en-US" dirty="0"/>
+          </a:p>
+        </p:txBody>
+      </p:sp>
+      <p:pic>
+        <p:nvPicPr>
+          <p:cNvPr id="1028" name="Picture 4" descr="https://encrypted-tbn1.gstatic.com/images?q=tbn:ANd9GcRbgruyKr4FgIaCjZpvoCF83xj2-2jv1Iw0VpazuSXvyxaUX-ftag"/>
+          <p:cNvPicPr>
+            <a:picLocks noChangeAspect="1" noChangeArrowheads="1"/>
+          </p:cNvPicPr>
+          <p:nvPr/>
+        </p:nvPicPr>
+        <p:blipFill>
+          <a:blip r:embed="rId2">
+            <a:extLst>
+              <a:ext uri="{28A0092B-C50C-407E-A947-70E740481C1C}">
+                <a14:useLocalDpi xmlns:a14="http://schemas.microsoft.com/office/drawing/2010/main" val="0"/>
+              </a:ext>
+            </a:extLst>
+          </a:blip>
+          <a:srcRect/>
+          <a:stretch>
+            <a:fillRect/>
+          </a:stretch>
+        </p:blipFill>
+        <p:spPr bwMode="auto">
+          <a:xfrm>
+            <a:off x="10058400" y="2819400"/>
+            <a:ext cx="2162175" cy="2114550"/>
+          </a:xfrm>
+          <a:prstGeom prst="rect">
+            <a:avLst/>
+          </a:prstGeom>
+          <a:noFill/>
+          <a:extLst>
+            <a:ext uri="{909E8E84-426E-40DD-AFC4-6F175D3DCCD1}">
+              <a14:hiddenFill xmlns:a14="http://schemas.microsoft.com/office/drawing/2010/main">
+                <a:solidFill>
+                  <a:srgbClr val="FFFFFF"/>
+                </a:solidFill>
+              </a14:hiddenFill>
+            </a:ext>
+          </a:extLst>
+        </p:spPr>
+      </p:pic>
+      <p:pic>
+        <p:nvPicPr>
+          <p:cNvPr id="1030" name="Picture 6" descr="http://www.aronsonsecurity.com/Portals/55833/images/newparadigmahead.jpg"/>
+          <p:cNvPicPr>
+            <a:picLocks noChangeAspect="1" noChangeArrowheads="1"/>
+          </p:cNvPicPr>
+          <p:nvPr/>
+        </p:nvPicPr>
+        <p:blipFill>
+          <a:blip r:embed="rId3">
+            <a:extLst>
+              <a:ext uri="{28A0092B-C50C-407E-A947-70E740481C1C}">
+                <a14:useLocalDpi xmlns:a14="http://schemas.microsoft.com/office/drawing/2010/main" val="0"/>
+              </a:ext>
+            </a:extLst>
+          </a:blip>
+          <a:srcRect/>
+          <a:stretch>
+            <a:fillRect/>
+          </a:stretch>
+        </p:blipFill>
+        <p:spPr bwMode="auto">
+          <a:xfrm>
+            <a:off x="1077884" y="3590924"/>
+            <a:ext cx="4048125" cy="2686051"/>
+          </a:xfrm>
+          <a:prstGeom prst="rect">
+            <a:avLst/>
+          </a:prstGeom>
+          <a:noFill/>
+          <a:extLst>
+            <a:ext uri="{909E8E84-426E-40DD-AFC4-6F175D3DCCD1}">
+              <a14:hiddenFill xmlns:a14="http://schemas.microsoft.com/office/drawing/2010/main">
+                <a:solidFill>
+                  <a:srgbClr val="FFFFFF"/>
+                </a:solidFill>
+              </a14:hiddenFill>
+            </a:ext>
+          </a:extLst>
+        </p:spPr>
+      </p:pic>
+    </p:spTree>
+    <p:extLst>
+      <p:ext uri="{BB962C8B-B14F-4D97-AF65-F5344CB8AC3E}">
+        <p14:creationId xmlns:p14="http://schemas.microsoft.com/office/powerpoint/2010/main" val="137891083"/>
+      </p:ext>
+    </p:extLst>
+  </p:cSld>
+  <p:clrMapOvr>
+    <a:masterClrMapping/>
+  </p:clrMapOvr>
+  <p:transition spd="slow">
+    <p:wipe dir="d"/>
+  </p:transition>
+  <p:timing>
+    <p:tnLst>
+      <p:par>
+        <p:cTn id="1" dur="indefinite" restart="never" nodeType="tmRoot"/>
+      </p:par>
+    </p:tnLst>
+  </p:timing>
+</p:sld>
+</file>
+
+<file path=ppt/slides/slide11.xml><?xml version="1.0" encoding="utf-8"?>
+<p:sld xmlns:a="http://schemas.openxmlformats.org/drawingml/2006/main" xmlns:r="http://schemas.openxmlformats.org/officeDocument/2006/relationships" xmlns:p="http://schemas.openxmlformats.org/presentationml/2006/main">
+  <p:cSld>
+    <p:spTree>
+      <p:nvGrpSpPr>
+        <p:cNvPr id="1" name=""/>
+        <p:cNvGrpSpPr/>
+        <p:nvPr/>
+      </p:nvGrpSpPr>
+      <p:grpSpPr>
+        <a:xfrm>
+          <a:off x="0" y="0"/>
+          <a:ext cx="0" cy="0"/>
+          <a:chOff x="0" y="0"/>
+          <a:chExt cx="0" cy="0"/>
+        </a:xfrm>
+      </p:grpSpPr>
+      <p:sp>
+        <p:nvSpPr>
+          <p:cNvPr id="2" name="Title 1"/>
+          <p:cNvSpPr>
+            <a:spLocks noGrp="1"/>
+          </p:cNvSpPr>
+          <p:nvPr>
+            <p:ph type="title"/>
+          </p:nvPr>
+        </p:nvSpPr>
+        <p:spPr/>
+        <p:txBody>
+          <a:bodyPr/>
+          <a:lstStyle/>
+          <a:p>
+            <a:r>
+              <a:rPr lang="en-US" dirty="0" smtClean="0"/>
+              <a:t>State surveys as data providers</a:t>
+            </a:r>
+            <a:endParaRPr lang="en-US" dirty="0"/>
+          </a:p>
+        </p:txBody>
+      </p:sp>
+      <p:sp>
+        <p:nvSpPr>
+          <p:cNvPr id="3" name="Content Placeholder 2"/>
+          <p:cNvSpPr>
+            <a:spLocks noGrp="1"/>
+          </p:cNvSpPr>
+          <p:nvPr>
+            <p:ph idx="1"/>
+          </p:nvPr>
+        </p:nvSpPr>
+        <p:spPr/>
+        <p:txBody>
+          <a:bodyPr/>
+          <a:lstStyle/>
+          <a:p>
+            <a:r>
+              <a:rPr lang="en-US" dirty="0" smtClean="0"/>
+              <a:t>We all have web servers and web sites </a:t>
+            </a:r>
+          </a:p>
+          <a:p>
+            <a:r>
+              <a:rPr lang="en-US" dirty="0" smtClean="0"/>
+              <a:t>Run data services </a:t>
+            </a:r>
+          </a:p>
+          <a:p>
+            <a:r>
+              <a:rPr lang="en-US" dirty="0" smtClean="0"/>
+              <a:t>Have to integrate web usage metrics into agency performance assessment</a:t>
+            </a:r>
+            <a:endParaRPr lang="en-US" dirty="0"/>
+          </a:p>
+        </p:txBody>
+      </p:sp>
+    </p:spTree>
+    <p:extLst>
+      <p:ext uri="{BB962C8B-B14F-4D97-AF65-F5344CB8AC3E}">
+        <p14:creationId xmlns:p14="http://schemas.microsoft.com/office/powerpoint/2010/main" val="1464449752"/>
+      </p:ext>
+    </p:extLst>
+  </p:cSld>
+  <p:clrMapOvr>
+    <a:masterClrMapping/>
+  </p:clrMapOvr>
+  <p:transition spd="slow">
+    <p:wipe dir="d"/>
+  </p:transition>
+  <p:timing>
+    <p:tnLst>
+      <p:par>
+        <p:cTn id="1" dur="indefinite" restart="never" nodeType="tmRoot"/>
+      </p:par>
+    </p:tnLst>
+  </p:timing>
+</p:sld>
+</file>
+
+<file path=ppt/slides/slide12.xml><?xml version="1.0" encoding="utf-8"?>
+<p:sld xmlns:a="http://schemas.openxmlformats.org/drawingml/2006/main" xmlns:r="http://schemas.openxmlformats.org/officeDocument/2006/relationships" xmlns:p="http://schemas.openxmlformats.org/presentationml/2006/main">
+  <p:cSld>
+    <p:spTree>
+      <p:nvGrpSpPr>
+        <p:cNvPr id="1" name=""/>
+        <p:cNvGrpSpPr/>
+        <p:nvPr/>
+      </p:nvGrpSpPr>
+      <p:grpSpPr>
+        <a:xfrm>
+          <a:off x="0" y="0"/>
+          <a:ext cx="0" cy="0"/>
+          <a:chOff x="0" y="0"/>
+          <a:chExt cx="0" cy="0"/>
+        </a:xfrm>
+      </p:grpSpPr>
+      <p:sp>
+        <p:nvSpPr>
+          <p:cNvPr id="2" name="Title 1"/>
+          <p:cNvSpPr>
+            <a:spLocks noGrp="1"/>
+          </p:cNvSpPr>
+          <p:nvPr>
+            <p:ph type="title"/>
+          </p:nvPr>
+        </p:nvSpPr>
+        <p:spPr/>
+        <p:txBody>
+          <a:bodyPr/>
+          <a:lstStyle/>
+          <a:p>
+            <a:r>
+              <a:rPr lang="en-US" dirty="0" smtClean="0"/>
+              <a:t>What needs to be maintained</a:t>
+            </a:r>
+            <a:endParaRPr lang="en-US" dirty="0"/>
+          </a:p>
+        </p:txBody>
+      </p:sp>
+      <p:sp>
+        <p:nvSpPr>
+          <p:cNvPr id="3" name="Content Placeholder 2"/>
+          <p:cNvSpPr>
+            <a:spLocks noGrp="1"/>
+          </p:cNvSpPr>
+          <p:nvPr>
+            <p:ph idx="1"/>
+          </p:nvPr>
+        </p:nvSpPr>
+        <p:spPr>
+          <a:xfrm>
+            <a:off x="762000" y="1596413"/>
+            <a:ext cx="8077200" cy="4575787"/>
+          </a:xfrm>
+        </p:spPr>
+        <p:txBody>
+          <a:bodyPr>
+            <a:normAutofit lnSpcReduction="10000"/>
+          </a:bodyPr>
+          <a:lstStyle/>
+          <a:p>
+            <a:r>
+              <a:rPr lang="en-US" dirty="0" smtClean="0"/>
+              <a:t>Web server:</a:t>
+            </a:r>
+          </a:p>
+          <a:p>
+            <a:pPr lvl="1"/>
+            <a:r>
+              <a:rPr lang="en-US" dirty="0" smtClean="0"/>
+              <a:t>Physical </a:t>
+            </a:r>
+            <a:r>
+              <a:rPr lang="en-US" dirty="0" smtClean="0"/>
+              <a:t>server: maintain hardware, update system software, security</a:t>
+            </a:r>
+            <a:endParaRPr lang="en-US" dirty="0" smtClean="0"/>
+          </a:p>
+          <a:p>
+            <a:pPr lvl="1"/>
+            <a:r>
+              <a:rPr lang="en-US" dirty="0" smtClean="0"/>
+              <a:t>Cloud </a:t>
+            </a:r>
+            <a:r>
+              <a:rPr lang="en-US" dirty="0" smtClean="0"/>
+              <a:t>server: update system software, security</a:t>
+            </a:r>
+            <a:endParaRPr lang="en-US" dirty="0" smtClean="0"/>
+          </a:p>
+          <a:p>
+            <a:pPr lvl="1"/>
+            <a:r>
+              <a:rPr lang="en-US" dirty="0" smtClean="0"/>
+              <a:t>Hosting </a:t>
+            </a:r>
+            <a:r>
+              <a:rPr lang="en-US" dirty="0" smtClean="0"/>
+              <a:t>service:</a:t>
+            </a:r>
+            <a:endParaRPr lang="en-US" dirty="0" smtClean="0"/>
+          </a:p>
+          <a:p>
+            <a:r>
+              <a:rPr lang="en-US" dirty="0" smtClean="0"/>
+              <a:t>Data:</a:t>
+            </a:r>
+            <a:endParaRPr lang="en-US" dirty="0" smtClean="0"/>
+          </a:p>
+          <a:p>
+            <a:pPr lvl="1"/>
+            <a:r>
+              <a:rPr lang="en-US" dirty="0" smtClean="0"/>
+              <a:t>Correct errors</a:t>
+            </a:r>
+          </a:p>
+          <a:p>
+            <a:pPr lvl="1"/>
+            <a:r>
+              <a:rPr lang="en-US" dirty="0" smtClean="0"/>
+              <a:t>Update with new data</a:t>
+            </a:r>
+          </a:p>
+          <a:p>
+            <a:pPr lvl="1"/>
+            <a:r>
+              <a:rPr lang="en-US" dirty="0" smtClean="0"/>
+              <a:t>Upgrade as software evolves</a:t>
+            </a:r>
+            <a:endParaRPr lang="en-US" dirty="0"/>
+          </a:p>
+        </p:txBody>
+      </p:sp>
+    </p:spTree>
+    <p:extLst>
+      <p:ext uri="{BB962C8B-B14F-4D97-AF65-F5344CB8AC3E}">
+        <p14:creationId xmlns:p14="http://schemas.microsoft.com/office/powerpoint/2010/main" val="1930345773"/>
+      </p:ext>
+    </p:extLst>
+  </p:cSld>
+  <p:clrMapOvr>
+    <a:masterClrMapping/>
+  </p:clrMapOvr>
+  <p:transition spd="slow">
+    <p:wipe dir="d"/>
+  </p:transition>
+  <p:timing>
+    <p:tnLst>
+      <p:par>
+        <p:cTn id="1" dur="indefinite" restart="never" nodeType="tmRoot"/>
+      </p:par>
+    </p:tnLst>
+  </p:timing>
+</p:sld>
+</file>
+
+<file path=ppt/slides/slide13.xml><?xml version="1.0" encoding="utf-8"?>
+<p:sld xmlns:a="http://schemas.openxmlformats.org/drawingml/2006/main" xmlns:r="http://schemas.openxmlformats.org/officeDocument/2006/relationships" xmlns:p="http://schemas.openxmlformats.org/presentationml/2006/main">
+  <p:cSld>
+    <p:spTree>
+      <p:nvGrpSpPr>
+        <p:cNvPr id="1" name=""/>
+        <p:cNvGrpSpPr/>
+        <p:nvPr/>
+      </p:nvGrpSpPr>
+      <p:grpSpPr>
+        <a:xfrm>
+          <a:off x="0" y="0"/>
+          <a:ext cx="0" cy="0"/>
+          <a:chOff x="0" y="0"/>
+          <a:chExt cx="0" cy="0"/>
+        </a:xfrm>
+      </p:grpSpPr>
+      <p:sp>
+        <p:nvSpPr>
+          <p:cNvPr id="2" name="Title 1"/>
+          <p:cNvSpPr>
+            <a:spLocks noGrp="1"/>
+          </p:cNvSpPr>
+          <p:nvPr>
+            <p:ph type="title"/>
+          </p:nvPr>
+        </p:nvSpPr>
+        <p:spPr/>
+        <p:txBody>
+          <a:bodyPr/>
+          <a:lstStyle/>
+          <a:p>
+            <a:r>
+              <a:rPr lang="en-US" dirty="0" smtClean="0"/>
               <a:t>What’s it cost… People	</a:t>
             </a:r>
             <a:endParaRPr lang="en-US" dirty="0"/>
@@ -4572,7 +5168,7 @@
           <p:nvPr>
             <p:extLst>
               <p:ext uri="{D42A27DB-BD31-4B8C-83A1-F6EECF244321}">
-                <p14:modId xmlns:p14="http://schemas.microsoft.com/office/powerpoint/2010/main" val="3587828673"/>
+                <p14:modId xmlns:p14="http://schemas.microsoft.com/office/powerpoint/2010/main" val="559726661"/>
               </p:ext>
             </p:extLst>
           </p:nvPr>
@@ -4917,8 +5513,18 @@
                     <a:bodyPr/>
                     <a:lstStyle/>
                     <a:p>
-                      <a:pPr algn="l" fontAlgn="t"/>
-                      <a:endParaRPr lang="en-US" sz="2400" b="0" i="0" u="none" strike="noStrike" dirty="0">
+                      <a:pPr algn="r" fontAlgn="t"/>
+                      <a:r>
+                        <a:rPr lang="en-US" sz="2400" b="1" i="0" u="none" strike="noStrike" dirty="0" smtClean="0">
+                          <a:solidFill>
+                            <a:srgbClr val="000000"/>
+                          </a:solidFill>
+                          <a:effectLst/>
+                          <a:latin typeface="Calibri"/>
+                        </a:rPr>
+                        <a:t>Annual Total: </a:t>
+                      </a:r>
+                      <a:endParaRPr lang="en-US" sz="2400" b="1" i="0" u="none" strike="noStrike" dirty="0">
                         <a:solidFill>
                           <a:srgbClr val="000000"/>
                         </a:solidFill>
@@ -4983,10 +5589,17 @@
   <p:transition spd="slow">
     <p:wipe dir="d"/>
   </p:transition>
+  <p:timing>
+    <p:tnLst>
+      <p:par>
+        <p:cTn id="1" dur="indefinite" restart="never" nodeType="tmRoot"/>
+      </p:par>
+    </p:tnLst>
+  </p:timing>
 </p:sld>
 </file>
 
-<file path=ppt/slides/slide11.xml><?xml version="1.0" encoding="utf-8"?>
+<file path=ppt/slides/slide14.xml><?xml version="1.0" encoding="utf-8"?>
 <p:sld xmlns:a="http://schemas.openxmlformats.org/drawingml/2006/main" xmlns:r="http://schemas.openxmlformats.org/officeDocument/2006/relationships" xmlns:p="http://schemas.openxmlformats.org/presentationml/2006/main">
   <p:cSld>
     <p:spTree>
@@ -5431,10 +6044,17 @@
   <p:transition spd="slow">
     <p:wipe dir="d"/>
   </p:transition>
+  <p:timing>
+    <p:tnLst>
+      <p:par>
+        <p:cTn id="1" dur="indefinite" restart="never" nodeType="tmRoot"/>
+      </p:par>
+    </p:tnLst>
+  </p:timing>
 </p:sld>
 </file>
 
-<file path=ppt/slides/slide12.xml><?xml version="1.0" encoding="utf-8"?>
+<file path=ppt/slides/slide15.xml><?xml version="1.0" encoding="utf-8"?>
 <p:sld xmlns:a="http://schemas.openxmlformats.org/drawingml/2006/main" xmlns:r="http://schemas.openxmlformats.org/officeDocument/2006/relationships" xmlns:p="http://schemas.openxmlformats.org/presentationml/2006/main">
   <p:cSld>
     <p:spTree>
@@ -5562,10 +6182,17 @@
   <p:transition spd="slow">
     <p:wipe dir="d"/>
   </p:transition>
+  <p:timing>
+    <p:tnLst>
+      <p:par>
+        <p:cTn id="1" dur="indefinite" restart="never" nodeType="tmRoot"/>
+      </p:par>
+    </p:tnLst>
+  </p:timing>
 </p:sld>
 </file>
 
-<file path=ppt/slides/slide13.xml><?xml version="1.0" encoding="utf-8"?>
+<file path=ppt/slides/slide16.xml><?xml version="1.0" encoding="utf-8"?>
 <p:sld xmlns:a="http://schemas.openxmlformats.org/drawingml/2006/main" xmlns:r="http://schemas.openxmlformats.org/officeDocument/2006/relationships" xmlns:p="http://schemas.openxmlformats.org/presentationml/2006/main">
   <p:cSld>
     <p:spTree>
@@ -5648,6 +6275,10 @@
               <a:rPr lang="en-US" dirty="0" smtClean="0"/>
               <a:t>… </a:t>
             </a:r>
+            <a:r>
+              <a:rPr lang="en-US" dirty="0" smtClean="0"/>
+              <a:t>  We need to invent</a:t>
+            </a:r>
             <a:endParaRPr lang="en-US" dirty="0"/>
           </a:p>
         </p:txBody>
@@ -5665,6 +6296,13 @@
   <p:transition spd="slow">
     <p:wipe dir="d"/>
   </p:transition>
+  <p:timing>
+    <p:tnLst>
+      <p:par>
+        <p:cTn id="1" dur="indefinite" restart="never" nodeType="tmRoot"/>
+      </p:par>
+    </p:tnLst>
+  </p:timing>
 </p:sld>
 </file>
 
@@ -5687,7 +6325,7 @@
       </p:grpSpPr>
       <p:sp>
         <p:nvSpPr>
-          <p:cNvPr id="4" name="Title 3"/>
+          <p:cNvPr id="2" name="Title 1"/>
           <p:cNvSpPr>
             <a:spLocks noGrp="1"/>
           </p:cNvSpPr>
@@ -5702,7 +6340,7 @@
           <a:p>
             <a:r>
               <a:rPr lang="en-US" dirty="0" smtClean="0"/>
-              <a:t>Make things easier</a:t>
+              <a:t>USGIN: Purpose</a:t>
             </a:r>
             <a:endParaRPr lang="en-US" dirty="0"/>
           </a:p>
@@ -5710,12 +6348,310 @@
       </p:sp>
       <p:sp>
         <p:nvSpPr>
-          <p:cNvPr id="5" name="Content Placeholder 4"/>
+          <p:cNvPr id="19459" name="Content Placeholder 2"/>
           <p:cNvSpPr>
             <a:spLocks noGrp="1"/>
           </p:cNvSpPr>
           <p:nvPr>
             <p:ph idx="1"/>
+          </p:nvPr>
+        </p:nvSpPr>
+        <p:spPr>
+          <a:xfrm>
+            <a:off x="762000" y="1596413"/>
+            <a:ext cx="8077200" cy="3432787"/>
+          </a:xfrm>
+        </p:spPr>
+        <p:txBody>
+          <a:bodyPr>
+            <a:normAutofit/>
+          </a:bodyPr>
+          <a:lstStyle/>
+          <a:p>
+            <a:r>
+              <a:rPr lang="en-US" dirty="0" smtClean="0"/>
+              <a:t>Make data resources of State and Federal geological surveys accessible online in a distributed network by </a:t>
+            </a:r>
+          </a:p>
+          <a:p>
+            <a:r>
+              <a:rPr lang="en-US" dirty="0" smtClean="0"/>
+              <a:t>using common standards and protocols</a:t>
+            </a:r>
+          </a:p>
+          <a:p>
+            <a:r>
+              <a:rPr lang="en-US" dirty="0" smtClean="0"/>
+              <a:t>working with data providers to implement these services.   </a:t>
+            </a:r>
+            <a:endParaRPr lang="en-US" dirty="0" smtClean="0"/>
+          </a:p>
+        </p:txBody>
+      </p:sp>
+      <p:pic>
+        <p:nvPicPr>
+          <p:cNvPr id="19460" name="Picture 4"/>
+          <p:cNvPicPr>
+            <a:picLocks noChangeAspect="1" noChangeArrowheads="1"/>
+          </p:cNvPicPr>
+          <p:nvPr/>
+        </p:nvPicPr>
+        <p:blipFill>
+          <a:blip r:embed="rId2" cstate="email">
+            <a:extLst>
+              <a:ext uri="{28A0092B-C50C-407E-A947-70E740481C1C}">
+                <a14:useLocalDpi xmlns:a14="http://schemas.microsoft.com/office/drawing/2010/main" val="0"/>
+              </a:ext>
+            </a:extLst>
+          </a:blip>
+          <a:srcRect/>
+          <a:stretch>
+            <a:fillRect/>
+          </a:stretch>
+        </p:blipFill>
+        <p:spPr bwMode="auto">
+          <a:xfrm>
+            <a:off x="914400" y="5410200"/>
+            <a:ext cx="1544638" cy="1300163"/>
+          </a:xfrm>
+          <a:prstGeom prst="rect">
+            <a:avLst/>
+          </a:prstGeom>
+          <a:noFill/>
+          <a:ln>
+            <a:noFill/>
+          </a:ln>
+          <a:extLst>
+            <a:ext uri="{909E8E84-426E-40DD-AFC4-6F175D3DCCD1}">
+              <a14:hiddenFill xmlns:a14="http://schemas.microsoft.com/office/drawing/2010/main">
+                <a:solidFill>
+                  <a:srgbClr val="FFFFFF"/>
+                </a:solidFill>
+              </a14:hiddenFill>
+            </a:ext>
+            <a:ext uri="{91240B29-F687-4F45-9708-019B960494DF}">
+              <a14:hiddenLine xmlns:a14="http://schemas.microsoft.com/office/drawing/2010/main" w="9525">
+                <a:solidFill>
+                  <a:srgbClr val="000000"/>
+                </a:solidFill>
+                <a:miter lim="800000"/>
+                <a:headEnd/>
+                <a:tailEnd/>
+              </a14:hiddenLine>
+            </a:ext>
+          </a:extLst>
+        </p:spPr>
+      </p:pic>
+      <p:pic>
+        <p:nvPicPr>
+          <p:cNvPr id="19461" name="Picture 5"/>
+          <p:cNvPicPr>
+            <a:picLocks noChangeAspect="1" noChangeArrowheads="1"/>
+          </p:cNvPicPr>
+          <p:nvPr/>
+        </p:nvPicPr>
+        <p:blipFill>
+          <a:blip r:embed="rId3" cstate="email">
+            <a:extLst>
+              <a:ext uri="{28A0092B-C50C-407E-A947-70E740481C1C}">
+                <a14:useLocalDpi xmlns:a14="http://schemas.microsoft.com/office/drawing/2010/main" val="0"/>
+              </a:ext>
+            </a:extLst>
+          </a:blip>
+          <a:srcRect/>
+          <a:stretch>
+            <a:fillRect/>
+          </a:stretch>
+        </p:blipFill>
+        <p:spPr bwMode="auto">
+          <a:xfrm>
+            <a:off x="2895600" y="5410200"/>
+            <a:ext cx="1639888" cy="1160463"/>
+          </a:xfrm>
+          <a:prstGeom prst="rect">
+            <a:avLst/>
+          </a:prstGeom>
+          <a:noFill/>
+          <a:ln>
+            <a:noFill/>
+          </a:ln>
+          <a:extLst>
+            <a:ext uri="{909E8E84-426E-40DD-AFC4-6F175D3DCCD1}">
+              <a14:hiddenFill xmlns:a14="http://schemas.microsoft.com/office/drawing/2010/main">
+                <a:solidFill>
+                  <a:srgbClr val="FFFFFF"/>
+                </a:solidFill>
+              </a14:hiddenFill>
+            </a:ext>
+            <a:ext uri="{91240B29-F687-4F45-9708-019B960494DF}">
+              <a14:hiddenLine xmlns:a14="http://schemas.microsoft.com/office/drawing/2010/main" w="9525">
+                <a:solidFill>
+                  <a:srgbClr val="000000"/>
+                </a:solidFill>
+                <a:miter lim="800000"/>
+                <a:headEnd/>
+                <a:tailEnd/>
+              </a14:hiddenLine>
+            </a:ext>
+          </a:extLst>
+        </p:spPr>
+      </p:pic>
+      <p:pic>
+        <p:nvPicPr>
+          <p:cNvPr id="19462" name="Picture 3"/>
+          <p:cNvPicPr>
+            <a:picLocks noChangeAspect="1" noChangeArrowheads="1"/>
+          </p:cNvPicPr>
+          <p:nvPr/>
+        </p:nvPicPr>
+        <p:blipFill>
+          <a:blip r:embed="rId4" cstate="email">
+            <a:extLst>
+              <a:ext uri="{28A0092B-C50C-407E-A947-70E740481C1C}">
+                <a14:useLocalDpi xmlns:a14="http://schemas.microsoft.com/office/drawing/2010/main" val="0"/>
+              </a:ext>
+            </a:extLst>
+          </a:blip>
+          <a:srcRect/>
+          <a:stretch>
+            <a:fillRect/>
+          </a:stretch>
+        </p:blipFill>
+        <p:spPr bwMode="auto">
+          <a:xfrm>
+            <a:off x="4876800" y="5334000"/>
+            <a:ext cx="1595438" cy="1317625"/>
+          </a:xfrm>
+          <a:prstGeom prst="rect">
+            <a:avLst/>
+          </a:prstGeom>
+          <a:noFill/>
+          <a:ln>
+            <a:noFill/>
+          </a:ln>
+          <a:extLst>
+            <a:ext uri="{909E8E84-426E-40DD-AFC4-6F175D3DCCD1}">
+              <a14:hiddenFill xmlns:a14="http://schemas.microsoft.com/office/drawing/2010/main">
+                <a:solidFill>
+                  <a:srgbClr val="FFFFFF"/>
+                </a:solidFill>
+              </a14:hiddenFill>
+            </a:ext>
+            <a:ext uri="{91240B29-F687-4F45-9708-019B960494DF}">
+              <a14:hiddenLine xmlns:a14="http://schemas.microsoft.com/office/drawing/2010/main" w="9525">
+                <a:solidFill>
+                  <a:srgbClr val="000000"/>
+                </a:solidFill>
+                <a:miter lim="800000"/>
+                <a:headEnd/>
+                <a:tailEnd/>
+              </a14:hiddenLine>
+            </a:ext>
+          </a:extLst>
+        </p:spPr>
+      </p:pic>
+      <p:pic>
+        <p:nvPicPr>
+          <p:cNvPr id="19463" name="Picture 2"/>
+          <p:cNvPicPr>
+            <a:picLocks noChangeAspect="1" noChangeArrowheads="1"/>
+          </p:cNvPicPr>
+          <p:nvPr/>
+        </p:nvPicPr>
+        <p:blipFill>
+          <a:blip r:embed="rId5" cstate="email">
+            <a:extLst>
+              <a:ext uri="{28A0092B-C50C-407E-A947-70E740481C1C}">
+                <a14:useLocalDpi xmlns:a14="http://schemas.microsoft.com/office/drawing/2010/main" val="0"/>
+              </a:ext>
+            </a:extLst>
+          </a:blip>
+          <a:srcRect/>
+          <a:stretch>
+            <a:fillRect/>
+          </a:stretch>
+        </p:blipFill>
+        <p:spPr bwMode="auto">
+          <a:xfrm>
+            <a:off x="7162800" y="5181600"/>
+            <a:ext cx="1220788" cy="1535113"/>
+          </a:xfrm>
+          <a:prstGeom prst="rect">
+            <a:avLst/>
+          </a:prstGeom>
+          <a:noFill/>
+          <a:ln>
+            <a:noFill/>
+          </a:ln>
+          <a:extLst>
+            <a:ext uri="{909E8E84-426E-40DD-AFC4-6F175D3DCCD1}">
+              <a14:hiddenFill xmlns:a14="http://schemas.microsoft.com/office/drawing/2010/main">
+                <a:solidFill>
+                  <a:srgbClr val="FFFFFF"/>
+                </a:solidFill>
+              </a14:hiddenFill>
+            </a:ext>
+            <a:ext uri="{91240B29-F687-4F45-9708-019B960494DF}">
+              <a14:hiddenLine xmlns:a14="http://schemas.microsoft.com/office/drawing/2010/main" w="9525">
+                <a:solidFill>
+                  <a:srgbClr val="000000"/>
+                </a:solidFill>
+                <a:miter lim="800000"/>
+                <a:headEnd/>
+                <a:tailEnd/>
+              </a14:hiddenLine>
+            </a:ext>
+          </a:extLst>
+        </p:spPr>
+      </p:pic>
+    </p:spTree>
+    <p:extLst>
+      <p:ext uri="{BB962C8B-B14F-4D97-AF65-F5344CB8AC3E}">
+        <p14:creationId xmlns:p14="http://schemas.microsoft.com/office/powerpoint/2010/main" val="893035916"/>
+      </p:ext>
+    </p:extLst>
+  </p:cSld>
+  <p:clrMapOvr>
+    <a:masterClrMapping/>
+  </p:clrMapOvr>
+  <p:transition spd="slow">
+    <p:wipe dir="d"/>
+  </p:transition>
+  <p:timing>
+    <p:tnLst>
+      <p:par>
+        <p:cTn id="1" dur="indefinite" restart="never" nodeType="tmRoot"/>
+      </p:par>
+    </p:tnLst>
+  </p:timing>
+</p:sld>
+</file>
+
+<file path=ppt/slides/slide3.xml><?xml version="1.0" encoding="utf-8"?>
+<p:sld xmlns:a="http://schemas.openxmlformats.org/drawingml/2006/main" xmlns:r="http://schemas.openxmlformats.org/officeDocument/2006/relationships" xmlns:p="http://schemas.openxmlformats.org/presentationml/2006/main">
+  <p:cSld>
+    <p:spTree>
+      <p:nvGrpSpPr>
+        <p:cNvPr id="1" name=""/>
+        <p:cNvGrpSpPr/>
+        <p:nvPr/>
+      </p:nvGrpSpPr>
+      <p:grpSpPr>
+        <a:xfrm>
+          <a:off x="0" y="0"/>
+          <a:ext cx="0" cy="0"/>
+          <a:chOff x="0" y="0"/>
+          <a:chExt cx="0" cy="0"/>
+        </a:xfrm>
+      </p:grpSpPr>
+      <p:sp>
+        <p:nvSpPr>
+          <p:cNvPr id="2" name="Title 1"/>
+          <p:cNvSpPr>
+            <a:spLocks noGrp="1"/>
+          </p:cNvSpPr>
+          <p:nvPr>
+            <p:ph type="title"/>
           </p:nvPr>
         </p:nvSpPr>
         <p:spPr/>
@@ -5724,6 +6660,437 @@
           <a:lstStyle/>
           <a:p>
             <a:r>
+              <a:rPr lang="en-US" smtClean="0"/>
+              <a:t>What defines the network</a:t>
+            </a:r>
+            <a:endParaRPr lang="en-US" dirty="0"/>
+          </a:p>
+        </p:txBody>
+      </p:sp>
+      <p:sp>
+        <p:nvSpPr>
+          <p:cNvPr id="3" name="Content Placeholder 2"/>
+          <p:cNvSpPr>
+            <a:spLocks noGrp="1"/>
+          </p:cNvSpPr>
+          <p:nvPr>
+            <p:ph idx="1"/>
+          </p:nvPr>
+        </p:nvSpPr>
+        <p:spPr/>
+        <p:txBody>
+          <a:bodyPr>
+            <a:normAutofit/>
+          </a:bodyPr>
+          <a:lstStyle/>
+          <a:p>
+            <a:r>
+              <a:rPr lang="en-US" dirty="0" smtClean="0"/>
+              <a:t>Specifications</a:t>
+            </a:r>
+          </a:p>
+          <a:p>
+            <a:r>
+              <a:rPr lang="en-US" dirty="0" smtClean="0"/>
+              <a:t>People and </a:t>
+            </a:r>
+            <a:r>
+              <a:rPr lang="en-US" dirty="0" smtClean="0"/>
+              <a:t>software using them</a:t>
+            </a:r>
+          </a:p>
+          <a:p>
+            <a:r>
+              <a:rPr lang="en-US" dirty="0" smtClean="0"/>
+              <a:t>Information Exchanges</a:t>
+            </a:r>
+          </a:p>
+          <a:p>
+            <a:pPr lvl="1"/>
+            <a:r>
+              <a:rPr lang="en-US" dirty="0" smtClean="0"/>
+              <a:t>Service Protocol – how message are sent to ask for and get data</a:t>
+            </a:r>
+          </a:p>
+          <a:p>
+            <a:pPr lvl="1"/>
+            <a:r>
+              <a:rPr lang="en-US" dirty="0" smtClean="0"/>
+              <a:t>Content models – what information is available</a:t>
+            </a:r>
+          </a:p>
+          <a:p>
+            <a:pPr lvl="1"/>
+            <a:r>
+              <a:rPr lang="en-US" dirty="0" smtClean="0"/>
+              <a:t>Interchange formats – how the information is encoded (e.g. </a:t>
+            </a:r>
+            <a:r>
+              <a:rPr lang="en-US" dirty="0" smtClean="0"/>
+              <a:t>HTML, xml, </a:t>
+            </a:r>
+            <a:r>
+              <a:rPr lang="en-US" dirty="0" err="1" smtClean="0"/>
+              <a:t>json</a:t>
+            </a:r>
+            <a:r>
+              <a:rPr lang="en-US" dirty="0" smtClean="0"/>
+              <a:t>, txt, </a:t>
+            </a:r>
+            <a:r>
+              <a:rPr lang="en-US" dirty="0" err="1" smtClean="0"/>
+              <a:t>xls</a:t>
+            </a:r>
+            <a:r>
+              <a:rPr lang="en-US" dirty="0" smtClean="0"/>
+              <a:t>)</a:t>
+            </a:r>
+            <a:endParaRPr lang="en-US" dirty="0"/>
+          </a:p>
+        </p:txBody>
+      </p:sp>
+    </p:spTree>
+    <p:extLst>
+      <p:ext uri="{BB962C8B-B14F-4D97-AF65-F5344CB8AC3E}">
+        <p14:creationId xmlns:p14="http://schemas.microsoft.com/office/powerpoint/2010/main" val="1884491153"/>
+      </p:ext>
+    </p:extLst>
+  </p:cSld>
+  <p:clrMapOvr>
+    <a:masterClrMapping/>
+  </p:clrMapOvr>
+  <p:transition spd="slow">
+    <p:wipe dir="d"/>
+  </p:transition>
+  <p:timing>
+    <p:tnLst>
+      <p:par>
+        <p:cTn id="1" dur="indefinite" restart="never" nodeType="tmRoot">
+          <p:childTnLst>
+            <p:seq concurrent="1" nextAc="seek">
+              <p:cTn id="2" dur="indefinite" nodeType="mainSeq">
+                <p:childTnLst>
+                  <p:par>
+                    <p:cTn id="3" fill="hold">
+                      <p:stCondLst>
+                        <p:cond delay="indefinite"/>
+                      </p:stCondLst>
+                      <p:childTnLst>
+                        <p:par>
+                          <p:cTn id="4" fill="hold">
+                            <p:stCondLst>
+                              <p:cond delay="0"/>
+                            </p:stCondLst>
+                            <p:childTnLst>
+                              <p:par>
+                                <p:cTn id="5" presetID="1" presetClass="entr" presetSubtype="0" fill="hold" nodeType="clickEffect">
+                                  <p:stCondLst>
+                                    <p:cond delay="0"/>
+                                  </p:stCondLst>
+                                  <p:childTnLst>
+                                    <p:set>
+                                      <p:cBhvr>
+                                        <p:cTn id="6" dur="1" fill="hold">
+                                          <p:stCondLst>
+                                            <p:cond delay="0"/>
+                                          </p:stCondLst>
+                                        </p:cTn>
+                                        <p:tgtEl>
+                                          <p:spTgt spid="3">
+                                            <p:txEl>
+                                              <p:pRg st="2" end="2"/>
+                                            </p:txEl>
+                                          </p:spTgt>
+                                        </p:tgtEl>
+                                        <p:attrNameLst>
+                                          <p:attrName>style.visibility</p:attrName>
+                                        </p:attrNameLst>
+                                      </p:cBhvr>
+                                      <p:to>
+                                        <p:strVal val="visible"/>
+                                      </p:to>
+                                    </p:set>
+                                  </p:childTnLst>
+                                </p:cTn>
+                              </p:par>
+                              <p:par>
+                                <p:cTn id="7" presetID="1" presetClass="entr" presetSubtype="0" fill="hold" nodeType="withEffect">
+                                  <p:stCondLst>
+                                    <p:cond delay="0"/>
+                                  </p:stCondLst>
+                                  <p:childTnLst>
+                                    <p:set>
+                                      <p:cBhvr>
+                                        <p:cTn id="8" dur="1" fill="hold">
+                                          <p:stCondLst>
+                                            <p:cond delay="0"/>
+                                          </p:stCondLst>
+                                        </p:cTn>
+                                        <p:tgtEl>
+                                          <p:spTgt spid="3">
+                                            <p:txEl>
+                                              <p:pRg st="3" end="3"/>
+                                            </p:txEl>
+                                          </p:spTgt>
+                                        </p:tgtEl>
+                                        <p:attrNameLst>
+                                          <p:attrName>style.visibility</p:attrName>
+                                        </p:attrNameLst>
+                                      </p:cBhvr>
+                                      <p:to>
+                                        <p:strVal val="visible"/>
+                                      </p:to>
+                                    </p:set>
+                                  </p:childTnLst>
+                                </p:cTn>
+                              </p:par>
+                              <p:par>
+                                <p:cTn id="9" presetID="1" presetClass="entr" presetSubtype="0" fill="hold" nodeType="withEffect">
+                                  <p:stCondLst>
+                                    <p:cond delay="0"/>
+                                  </p:stCondLst>
+                                  <p:childTnLst>
+                                    <p:set>
+                                      <p:cBhvr>
+                                        <p:cTn id="10" dur="1" fill="hold">
+                                          <p:stCondLst>
+                                            <p:cond delay="0"/>
+                                          </p:stCondLst>
+                                        </p:cTn>
+                                        <p:tgtEl>
+                                          <p:spTgt spid="3">
+                                            <p:txEl>
+                                              <p:pRg st="4" end="4"/>
+                                            </p:txEl>
+                                          </p:spTgt>
+                                        </p:tgtEl>
+                                        <p:attrNameLst>
+                                          <p:attrName>style.visibility</p:attrName>
+                                        </p:attrNameLst>
+                                      </p:cBhvr>
+                                      <p:to>
+                                        <p:strVal val="visible"/>
+                                      </p:to>
+                                    </p:set>
+                                  </p:childTnLst>
+                                </p:cTn>
+                              </p:par>
+                              <p:par>
+                                <p:cTn id="11" presetID="1" presetClass="entr" presetSubtype="0" fill="hold" nodeType="withEffect">
+                                  <p:stCondLst>
+                                    <p:cond delay="0"/>
+                                  </p:stCondLst>
+                                  <p:childTnLst>
+                                    <p:set>
+                                      <p:cBhvr>
+                                        <p:cTn id="12" dur="1" fill="hold">
+                                          <p:stCondLst>
+                                            <p:cond delay="0"/>
+                                          </p:stCondLst>
+                                        </p:cTn>
+                                        <p:tgtEl>
+                                          <p:spTgt spid="3">
+                                            <p:txEl>
+                                              <p:pRg st="5" end="5"/>
+                                            </p:txEl>
+                                          </p:spTgt>
+                                        </p:tgtEl>
+                                        <p:attrNameLst>
+                                          <p:attrName>style.visibility</p:attrName>
+                                        </p:attrNameLst>
+                                      </p:cBhvr>
+                                      <p:to>
+                                        <p:strVal val="visible"/>
+                                      </p:to>
+                                    </p:set>
+                                  </p:childTnLst>
+                                </p:cTn>
+                              </p:par>
+                            </p:childTnLst>
+                          </p:cTn>
+                        </p:par>
+                      </p:childTnLst>
+                    </p:cTn>
+                  </p:par>
+                </p:childTnLst>
+              </p:cTn>
+              <p:prevCondLst>
+                <p:cond evt="onPrev" delay="0">
+                  <p:tgtEl>
+                    <p:sldTgt/>
+                  </p:tgtEl>
+                </p:cond>
+              </p:prevCondLst>
+              <p:nextCondLst>
+                <p:cond evt="onNext" delay="0">
+                  <p:tgtEl>
+                    <p:sldTgt/>
+                  </p:tgtEl>
+                </p:cond>
+              </p:nextCondLst>
+            </p:seq>
+          </p:childTnLst>
+        </p:cTn>
+      </p:par>
+    </p:tnLst>
+  </p:timing>
+</p:sld>
+</file>
+
+<file path=ppt/slides/slide4.xml><?xml version="1.0" encoding="utf-8"?>
+<p:sld xmlns:a="http://schemas.openxmlformats.org/drawingml/2006/main" xmlns:r="http://schemas.openxmlformats.org/officeDocument/2006/relationships" xmlns:p="http://schemas.openxmlformats.org/presentationml/2006/main">
+  <p:cSld>
+    <p:spTree>
+      <p:nvGrpSpPr>
+        <p:cNvPr id="1" name=""/>
+        <p:cNvGrpSpPr/>
+        <p:nvPr/>
+      </p:nvGrpSpPr>
+      <p:grpSpPr>
+        <a:xfrm>
+          <a:off x="0" y="0"/>
+          <a:ext cx="0" cy="0"/>
+          <a:chOff x="0" y="0"/>
+          <a:chExt cx="0" cy="0"/>
+        </a:xfrm>
+      </p:grpSpPr>
+      <p:sp>
+        <p:nvSpPr>
+          <p:cNvPr id="2" name="Title 1"/>
+          <p:cNvSpPr>
+            <a:spLocks noGrp="1"/>
+          </p:cNvSpPr>
+          <p:nvPr>
+            <p:ph type="ctrTitle"/>
+          </p:nvPr>
+        </p:nvSpPr>
+        <p:spPr>
+          <a:xfrm>
+            <a:off x="2057400" y="2209800"/>
+            <a:ext cx="6180224" cy="1470025"/>
+          </a:xfrm>
+        </p:spPr>
+        <p:txBody>
+          <a:bodyPr/>
+          <a:lstStyle/>
+          <a:p>
+            <a:r>
+              <a:rPr lang="en-US" dirty="0" smtClean="0"/>
+              <a:t>Why </a:t>
+            </a:r>
+            <a:endParaRPr lang="en-US" dirty="0"/>
+          </a:p>
+        </p:txBody>
+      </p:sp>
+      <p:sp>
+        <p:nvSpPr>
+          <p:cNvPr id="3" name="Subtitle 2"/>
+          <p:cNvSpPr>
+            <a:spLocks noGrp="1"/>
+          </p:cNvSpPr>
+          <p:nvPr>
+            <p:ph type="subTitle" idx="1"/>
+          </p:nvPr>
+        </p:nvSpPr>
+        <p:spPr/>
+        <p:txBody>
+          <a:bodyPr/>
+          <a:lstStyle/>
+          <a:p>
+            <a:r>
+              <a:rPr lang="en-US" dirty="0" smtClean="0"/>
+              <a:t>Is interoperability worth the pain</a:t>
+            </a:r>
+            <a:endParaRPr lang="en-US" dirty="0"/>
+          </a:p>
+        </p:txBody>
+      </p:sp>
+    </p:spTree>
+    <p:extLst>
+      <p:ext uri="{BB962C8B-B14F-4D97-AF65-F5344CB8AC3E}">
+        <p14:creationId xmlns:p14="http://schemas.microsoft.com/office/powerpoint/2010/main" val="3208795293"/>
+      </p:ext>
+    </p:extLst>
+  </p:cSld>
+  <p:clrMapOvr>
+    <a:masterClrMapping/>
+  </p:clrMapOvr>
+  <p:transition spd="slow">
+    <p:wipe dir="d"/>
+  </p:transition>
+  <p:timing>
+    <p:tnLst>
+      <p:par>
+        <p:cTn id="1" dur="indefinite" restart="never" nodeType="tmRoot"/>
+      </p:par>
+    </p:tnLst>
+  </p:timing>
+</p:sld>
+</file>
+
+<file path=ppt/slides/slide5.xml><?xml version="1.0" encoding="utf-8"?>
+<p:sld xmlns:a="http://schemas.openxmlformats.org/drawingml/2006/main" xmlns:r="http://schemas.openxmlformats.org/officeDocument/2006/relationships" xmlns:p="http://schemas.openxmlformats.org/presentationml/2006/main">
+  <p:cSld>
+    <p:spTree>
+      <p:nvGrpSpPr>
+        <p:cNvPr id="1" name=""/>
+        <p:cNvGrpSpPr/>
+        <p:nvPr/>
+      </p:nvGrpSpPr>
+      <p:grpSpPr>
+        <a:xfrm>
+          <a:off x="0" y="0"/>
+          <a:ext cx="0" cy="0"/>
+          <a:chOff x="0" y="0"/>
+          <a:chExt cx="0" cy="0"/>
+        </a:xfrm>
+      </p:grpSpPr>
+      <p:sp>
+        <p:nvSpPr>
+          <p:cNvPr id="4" name="Title 3"/>
+          <p:cNvSpPr>
+            <a:spLocks noGrp="1"/>
+          </p:cNvSpPr>
+          <p:nvPr>
+            <p:ph type="title"/>
+          </p:nvPr>
+        </p:nvSpPr>
+        <p:spPr/>
+        <p:txBody>
+          <a:bodyPr/>
+          <a:lstStyle/>
+          <a:p>
+            <a:r>
+              <a:rPr lang="en-US" dirty="0" smtClean="0"/>
+              <a:t>Make things easier</a:t>
+            </a:r>
+            <a:endParaRPr lang="en-US" dirty="0"/>
+          </a:p>
+        </p:txBody>
+      </p:sp>
+      <p:sp>
+        <p:nvSpPr>
+          <p:cNvPr id="5" name="Content Placeholder 4"/>
+          <p:cNvSpPr>
+            <a:spLocks noGrp="1"/>
+          </p:cNvSpPr>
+          <p:nvPr>
+            <p:ph idx="1"/>
+          </p:nvPr>
+        </p:nvSpPr>
+        <p:spPr>
+          <a:xfrm>
+            <a:off x="762000" y="1371600"/>
+            <a:ext cx="8077200" cy="4880587"/>
+          </a:xfrm>
+        </p:spPr>
+        <p:txBody>
+          <a:bodyPr>
+            <a:normAutofit lnSpcReduction="10000"/>
+          </a:bodyPr>
+          <a:lstStyle/>
+          <a:p>
+            <a:r>
               <a:rPr lang="en-US" dirty="0"/>
               <a:t>Make life easier for the </a:t>
             </a:r>
@@ -5742,22 +7109,50 @@
           <a:p>
             <a:r>
               <a:rPr lang="en-US" dirty="0" smtClean="0"/>
-              <a:t>Make metadata easier</a:t>
+              <a:t>Create bigger market for applications</a:t>
             </a:r>
           </a:p>
           <a:p>
             <a:pPr lvl="1"/>
             <a:r>
               <a:rPr lang="en-US" dirty="0" smtClean="0"/>
-              <a:t>Don’t have to document data structure-it’s already done.</a:t>
-            </a:r>
-          </a:p>
-          <a:p>
-            <a:r>
-              <a:rPr lang="en-US" dirty="0" smtClean="0"/>
-              <a:t>Create bigger market for applications</a:t>
-            </a:r>
-            <a:endParaRPr lang="en-US" dirty="0"/>
+              <a:t>App works with different data providers</a:t>
+            </a:r>
+          </a:p>
+          <a:p>
+            <a:pPr lvl="1"/>
+            <a:r>
+              <a:rPr lang="en-US" dirty="0" smtClean="0"/>
+              <a:t>Facilitate machine processing</a:t>
+            </a:r>
+          </a:p>
+          <a:p>
+            <a:r>
+              <a:rPr lang="en-US" dirty="0" smtClean="0"/>
+              <a:t>Make </a:t>
+            </a:r>
+            <a:r>
+              <a:rPr lang="en-US" dirty="0" smtClean="0"/>
+              <a:t>metadata easier</a:t>
+            </a:r>
+          </a:p>
+          <a:p>
+            <a:pPr lvl="1"/>
+            <a:r>
+              <a:rPr lang="en-US" dirty="0" smtClean="0"/>
+              <a:t>Don’t have to document data structure-it’s already done</a:t>
+            </a:r>
+            <a:r>
+              <a:rPr lang="en-US" dirty="0" smtClean="0"/>
+              <a:t>.</a:t>
+            </a:r>
+          </a:p>
+          <a:p>
+            <a:r>
+              <a:rPr lang="en-US" dirty="0" smtClean="0"/>
+              <a:t>Simplify data maintenance</a:t>
+            </a:r>
+            <a:endParaRPr lang="en-US" dirty="0" smtClean="0"/>
           </a:p>
         </p:txBody>
       </p:sp>
@@ -5774,10 +7169,280 @@
   <p:transition spd="slow">
     <p:wipe dir="d"/>
   </p:transition>
+  <p:timing>
+    <p:tnLst>
+      <p:par>
+        <p:cTn id="1" dur="indefinite" restart="never" nodeType="tmRoot">
+          <p:childTnLst>
+            <p:seq concurrent="1" nextAc="seek">
+              <p:cTn id="2" dur="indefinite" nodeType="mainSeq">
+                <p:childTnLst>
+                  <p:par>
+                    <p:cTn id="3" fill="hold">
+                      <p:stCondLst>
+                        <p:cond delay="indefinite"/>
+                      </p:stCondLst>
+                      <p:childTnLst>
+                        <p:par>
+                          <p:cTn id="4" fill="hold">
+                            <p:stCondLst>
+                              <p:cond delay="0"/>
+                            </p:stCondLst>
+                            <p:childTnLst>
+                              <p:par>
+                                <p:cTn id="5" presetID="1" presetClass="entr" presetSubtype="0" fill="hold" nodeType="clickEffect">
+                                  <p:stCondLst>
+                                    <p:cond delay="0"/>
+                                  </p:stCondLst>
+                                  <p:childTnLst>
+                                    <p:set>
+                                      <p:cBhvr>
+                                        <p:cTn id="6" dur="1" fill="hold">
+                                          <p:stCondLst>
+                                            <p:cond delay="0"/>
+                                          </p:stCondLst>
+                                        </p:cTn>
+                                        <p:tgtEl>
+                                          <p:spTgt spid="5">
+                                            <p:txEl>
+                                              <p:pRg st="2" end="2"/>
+                                            </p:txEl>
+                                          </p:spTgt>
+                                        </p:tgtEl>
+                                        <p:attrNameLst>
+                                          <p:attrName>style.visibility</p:attrName>
+                                        </p:attrNameLst>
+                                      </p:cBhvr>
+                                      <p:to>
+                                        <p:strVal val="visible"/>
+                                      </p:to>
+                                    </p:set>
+                                  </p:childTnLst>
+                                </p:cTn>
+                              </p:par>
+                              <p:par>
+                                <p:cTn id="7" presetID="1" presetClass="entr" presetSubtype="0" fill="hold" nodeType="withEffect">
+                                  <p:stCondLst>
+                                    <p:cond delay="0"/>
+                                  </p:stCondLst>
+                                  <p:childTnLst>
+                                    <p:set>
+                                      <p:cBhvr>
+                                        <p:cTn id="8" dur="1" fill="hold">
+                                          <p:stCondLst>
+                                            <p:cond delay="0"/>
+                                          </p:stCondLst>
+                                        </p:cTn>
+                                        <p:tgtEl>
+                                          <p:spTgt spid="5">
+                                            <p:txEl>
+                                              <p:pRg st="3" end="3"/>
+                                            </p:txEl>
+                                          </p:spTgt>
+                                        </p:tgtEl>
+                                        <p:attrNameLst>
+                                          <p:attrName>style.visibility</p:attrName>
+                                        </p:attrNameLst>
+                                      </p:cBhvr>
+                                      <p:to>
+                                        <p:strVal val="visible"/>
+                                      </p:to>
+                                    </p:set>
+                                  </p:childTnLst>
+                                </p:cTn>
+                              </p:par>
+                              <p:par>
+                                <p:cTn id="9" presetID="1" presetClass="entr" presetSubtype="0" fill="hold" nodeType="withEffect">
+                                  <p:stCondLst>
+                                    <p:cond delay="0"/>
+                                  </p:stCondLst>
+                                  <p:childTnLst>
+                                    <p:set>
+                                      <p:cBhvr>
+                                        <p:cTn id="10" dur="1" fill="hold">
+                                          <p:stCondLst>
+                                            <p:cond delay="0"/>
+                                          </p:stCondLst>
+                                        </p:cTn>
+                                        <p:tgtEl>
+                                          <p:spTgt spid="5">
+                                            <p:txEl>
+                                              <p:pRg st="4" end="4"/>
+                                            </p:txEl>
+                                          </p:spTgt>
+                                        </p:tgtEl>
+                                        <p:attrNameLst>
+                                          <p:attrName>style.visibility</p:attrName>
+                                        </p:attrNameLst>
+                                      </p:cBhvr>
+                                      <p:to>
+                                        <p:strVal val="visible"/>
+                                      </p:to>
+                                    </p:set>
+                                  </p:childTnLst>
+                                </p:cTn>
+                              </p:par>
+                            </p:childTnLst>
+                          </p:cTn>
+                        </p:par>
+                      </p:childTnLst>
+                    </p:cTn>
+                  </p:par>
+                  <p:par>
+                    <p:cTn id="11" fill="hold">
+                      <p:stCondLst>
+                        <p:cond delay="indefinite"/>
+                      </p:stCondLst>
+                      <p:childTnLst>
+                        <p:par>
+                          <p:cTn id="12" fill="hold">
+                            <p:stCondLst>
+                              <p:cond delay="0"/>
+                            </p:stCondLst>
+                            <p:childTnLst>
+                              <p:par>
+                                <p:cTn id="13" presetID="1" presetClass="entr" presetSubtype="0" fill="hold" nodeType="clickEffect">
+                                  <p:stCondLst>
+                                    <p:cond delay="0"/>
+                                  </p:stCondLst>
+                                  <p:childTnLst>
+                                    <p:set>
+                                      <p:cBhvr>
+                                        <p:cTn id="14" dur="1" fill="hold">
+                                          <p:stCondLst>
+                                            <p:cond delay="0"/>
+                                          </p:stCondLst>
+                                        </p:cTn>
+                                        <p:tgtEl>
+                                          <p:spTgt spid="5">
+                                            <p:txEl>
+                                              <p:pRg st="5" end="5"/>
+                                            </p:txEl>
+                                          </p:spTgt>
+                                        </p:tgtEl>
+                                        <p:attrNameLst>
+                                          <p:attrName>style.visibility</p:attrName>
+                                        </p:attrNameLst>
+                                      </p:cBhvr>
+                                      <p:to>
+                                        <p:strVal val="visible"/>
+                                      </p:to>
+                                    </p:set>
+                                  </p:childTnLst>
+                                </p:cTn>
+                              </p:par>
+                              <p:par>
+                                <p:cTn id="15" presetID="1" presetClass="entr" presetSubtype="0" fill="hold" nodeType="withEffect">
+                                  <p:stCondLst>
+                                    <p:cond delay="0"/>
+                                  </p:stCondLst>
+                                  <p:childTnLst>
+                                    <p:set>
+                                      <p:cBhvr>
+                                        <p:cTn id="16" dur="1" fill="hold">
+                                          <p:stCondLst>
+                                            <p:cond delay="0"/>
+                                          </p:stCondLst>
+                                        </p:cTn>
+                                        <p:tgtEl>
+                                          <p:spTgt spid="5">
+                                            <p:txEl>
+                                              <p:pRg st="6" end="6"/>
+                                            </p:txEl>
+                                          </p:spTgt>
+                                        </p:tgtEl>
+                                        <p:attrNameLst>
+                                          <p:attrName>style.visibility</p:attrName>
+                                        </p:attrNameLst>
+                                      </p:cBhvr>
+                                      <p:to>
+                                        <p:strVal val="visible"/>
+                                      </p:to>
+                                    </p:set>
+                                  </p:childTnLst>
+                                </p:cTn>
+                              </p:par>
+                            </p:childTnLst>
+                          </p:cTn>
+                        </p:par>
+                      </p:childTnLst>
+                    </p:cTn>
+                  </p:par>
+                  <p:par>
+                    <p:cTn id="17" fill="hold">
+                      <p:stCondLst>
+                        <p:cond delay="indefinite"/>
+                      </p:stCondLst>
+                      <p:childTnLst>
+                        <p:par>
+                          <p:cTn id="18" fill="hold">
+                            <p:stCondLst>
+                              <p:cond delay="0"/>
+                            </p:stCondLst>
+                            <p:childTnLst>
+                              <p:par>
+                                <p:cTn id="19" presetID="1" presetClass="entr" presetSubtype="0" fill="hold" nodeType="clickEffect">
+                                  <p:stCondLst>
+                                    <p:cond delay="0"/>
+                                  </p:stCondLst>
+                                  <p:childTnLst>
+                                    <p:set>
+                                      <p:cBhvr>
+                                        <p:cTn id="20" dur="1" fill="hold">
+                                          <p:stCondLst>
+                                            <p:cond delay="0"/>
+                                          </p:stCondLst>
+                                        </p:cTn>
+                                        <p:tgtEl>
+                                          <p:spTgt spid="5">
+                                            <p:txEl>
+                                              <p:pRg st="7" end="7"/>
+                                            </p:txEl>
+                                          </p:spTgt>
+                                        </p:tgtEl>
+                                        <p:attrNameLst>
+                                          <p:attrName>style.visibility</p:attrName>
+                                        </p:attrNameLst>
+                                      </p:cBhvr>
+                                      <p:to>
+                                        <p:strVal val="visible"/>
+                                      </p:to>
+                                    </p:set>
+                                  </p:childTnLst>
+                                </p:cTn>
+                              </p:par>
+                            </p:childTnLst>
+                          </p:cTn>
+                        </p:par>
+                      </p:childTnLst>
+                    </p:cTn>
+                  </p:par>
+                </p:childTnLst>
+              </p:cTn>
+              <p:prevCondLst>
+                <p:cond evt="onPrev" delay="0">
+                  <p:tgtEl>
+                    <p:sldTgt/>
+                  </p:tgtEl>
+                </p:cond>
+              </p:prevCondLst>
+              <p:nextCondLst>
+                <p:cond evt="onNext" delay="0">
+                  <p:tgtEl>
+                    <p:sldTgt/>
+                  </p:tgtEl>
+                </p:cond>
+              </p:nextCondLst>
+            </p:seq>
+          </p:childTnLst>
+        </p:cTn>
+      </p:par>
+    </p:tnLst>
+  </p:timing>
 </p:sld>
 </file>
 
-<file path=ppt/slides/slide3.xml><?xml version="1.0" encoding="utf-8"?>
+<file path=ppt/slides/slide6.xml><?xml version="1.0" encoding="utf-8"?>
 <p:sld xmlns:a="http://schemas.openxmlformats.org/drawingml/2006/main" xmlns:r="http://schemas.openxmlformats.org/officeDocument/2006/relationships" xmlns:p="http://schemas.openxmlformats.org/presentationml/2006/main">
   <p:cSld>
     <p:spTree>
@@ -5886,318 +7551,6 @@
   <p:transition spd="slow">
     <p:wipe dir="d"/>
   </p:transition>
-</p:sld>
-</file>
-
-<file path=ppt/slides/slide4.xml><?xml version="1.0" encoding="utf-8"?>
-<p:sld xmlns:a="http://schemas.openxmlformats.org/drawingml/2006/main" xmlns:r="http://schemas.openxmlformats.org/officeDocument/2006/relationships" xmlns:p="http://schemas.openxmlformats.org/presentationml/2006/main">
-  <p:cSld>
-    <p:spTree>
-      <p:nvGrpSpPr>
-        <p:cNvPr id="1" name=""/>
-        <p:cNvGrpSpPr/>
-        <p:nvPr/>
-      </p:nvGrpSpPr>
-      <p:grpSpPr>
-        <a:xfrm>
-          <a:off x="0" y="0"/>
-          <a:ext cx="0" cy="0"/>
-          <a:chOff x="0" y="0"/>
-          <a:chExt cx="0" cy="0"/>
-        </a:xfrm>
-      </p:grpSpPr>
-      <p:sp>
-        <p:nvSpPr>
-          <p:cNvPr id="2" name="Title 1"/>
-          <p:cNvSpPr>
-            <a:spLocks noGrp="1"/>
-          </p:cNvSpPr>
-          <p:nvPr>
-            <p:ph type="title"/>
-          </p:nvPr>
-        </p:nvSpPr>
-        <p:spPr/>
-        <p:txBody>
-          <a:bodyPr/>
-          <a:lstStyle/>
-          <a:p>
-            <a:r>
-              <a:rPr lang="en-US" dirty="0" smtClean="0"/>
-              <a:t>Linked Data</a:t>
-            </a:r>
-            <a:endParaRPr lang="en-US" dirty="0"/>
-          </a:p>
-        </p:txBody>
-      </p:sp>
-      <p:sp>
-        <p:nvSpPr>
-          <p:cNvPr id="3" name="Content Placeholder 2"/>
-          <p:cNvSpPr>
-            <a:spLocks noGrp="1"/>
-          </p:cNvSpPr>
-          <p:nvPr>
-            <p:ph idx="1"/>
-          </p:nvPr>
-        </p:nvSpPr>
-        <p:spPr/>
-        <p:txBody>
-          <a:bodyPr/>
-          <a:lstStyle/>
-          <a:p>
-            <a:r>
-              <a:rPr lang="en-US" dirty="0" smtClean="0"/>
-              <a:t>Use identifiers that can be dereferenced on the WWW</a:t>
-            </a:r>
-          </a:p>
-          <a:p>
-            <a:r>
-              <a:rPr lang="en-US" dirty="0" smtClean="0"/>
-              <a:t>Enable navigation between related resources</a:t>
-            </a:r>
-          </a:p>
-          <a:p>
-            <a:endParaRPr lang="en-US" dirty="0"/>
-          </a:p>
-          <a:p>
-            <a:pPr marL="0" indent="0">
-              <a:buNone/>
-            </a:pPr>
-            <a:r>
-              <a:rPr lang="en-US" sz="2000" dirty="0" err="1"/>
-              <a:t>GitHub</a:t>
-            </a:r>
-            <a:r>
-              <a:rPr lang="en-US" sz="2000" dirty="0"/>
-              <a:t>\USGIN\Workshops\</a:t>
-            </a:r>
-            <a:r>
-              <a:rPr lang="en-US" sz="2000" dirty="0" err="1"/>
-              <a:t>WesternRegionalWorkshopWMS_URIDemo.mxd</a:t>
-            </a:r>
-            <a:endParaRPr lang="en-US" sz="2000" dirty="0" smtClean="0"/>
-          </a:p>
-          <a:p>
-            <a:endParaRPr lang="en-US" dirty="0"/>
-          </a:p>
-          <a:p>
-            <a:endParaRPr lang="en-US" dirty="0"/>
-          </a:p>
-        </p:txBody>
-      </p:sp>
-    </p:spTree>
-    <p:extLst>
-      <p:ext uri="{BB962C8B-B14F-4D97-AF65-F5344CB8AC3E}">
-        <p14:creationId xmlns:p14="http://schemas.microsoft.com/office/powerpoint/2010/main" val="3393243109"/>
-      </p:ext>
-    </p:extLst>
-  </p:cSld>
-  <p:clrMapOvr>
-    <a:masterClrMapping/>
-  </p:clrMapOvr>
-  <p:transition spd="slow">
-    <p:wipe dir="d"/>
-  </p:transition>
-</p:sld>
-</file>
-
-<file path=ppt/slides/slide5.xml><?xml version="1.0" encoding="utf-8"?>
-<p:sld xmlns:a="http://schemas.openxmlformats.org/drawingml/2006/main" xmlns:r="http://schemas.openxmlformats.org/officeDocument/2006/relationships" xmlns:p="http://schemas.openxmlformats.org/presentationml/2006/main">
-  <p:cSld>
-    <p:spTree>
-      <p:nvGrpSpPr>
-        <p:cNvPr id="1" name=""/>
-        <p:cNvGrpSpPr/>
-        <p:nvPr/>
-      </p:nvGrpSpPr>
-      <p:grpSpPr>
-        <a:xfrm>
-          <a:off x="0" y="0"/>
-          <a:ext cx="0" cy="0"/>
-          <a:chOff x="0" y="0"/>
-          <a:chExt cx="0" cy="0"/>
-        </a:xfrm>
-      </p:grpSpPr>
-      <p:sp>
-        <p:nvSpPr>
-          <p:cNvPr id="2" name="Title 1"/>
-          <p:cNvSpPr>
-            <a:spLocks noGrp="1"/>
-          </p:cNvSpPr>
-          <p:nvPr>
-            <p:ph type="ctrTitle"/>
-            <p:custDataLst>
-              <p:tags r:id="rId2"/>
-            </p:custDataLst>
-          </p:nvPr>
-        </p:nvSpPr>
-        <p:spPr/>
-        <p:txBody>
-          <a:bodyPr/>
-          <a:lstStyle/>
-          <a:p>
-            <a:r>
-              <a:rPr lang="en-US" dirty="0" smtClean="0"/>
-              <a:t>NGDS Sustainability</a:t>
-            </a:r>
-            <a:endParaRPr lang="en-US" dirty="0"/>
-          </a:p>
-        </p:txBody>
-      </p:sp>
-      <p:sp>
-        <p:nvSpPr>
-          <p:cNvPr id="3" name="Subtitle 2"/>
-          <p:cNvSpPr>
-            <a:spLocks noGrp="1"/>
-          </p:cNvSpPr>
-          <p:nvPr>
-            <p:ph type="subTitle" idx="1"/>
-            <p:custDataLst>
-              <p:tags r:id="rId3"/>
-            </p:custDataLst>
-          </p:nvPr>
-        </p:nvSpPr>
-        <p:spPr/>
-        <p:txBody>
-          <a:bodyPr>
-            <a:normAutofit/>
-          </a:bodyPr>
-          <a:lstStyle/>
-          <a:p>
-            <a:r>
-              <a:rPr lang="en-US" sz="2400" dirty="0" smtClean="0">
-                <a:latin typeface="+mn-lt"/>
-              </a:rPr>
-              <a:t>Stephen Richard and NGDS team</a:t>
-            </a:r>
-          </a:p>
-          <a:p>
-            <a:r>
-              <a:rPr lang="en-US" sz="2400" dirty="0" smtClean="0">
-                <a:latin typeface="+mn-lt"/>
-              </a:rPr>
-              <a:t>Reno, NV  May 14, 2013 </a:t>
-            </a:r>
-            <a:endParaRPr lang="en-US" sz="2400" dirty="0">
-              <a:latin typeface="+mn-lt"/>
-            </a:endParaRPr>
-          </a:p>
-        </p:txBody>
-      </p:sp>
-    </p:spTree>
-    <p:custDataLst>
-      <p:tags r:id="rId1"/>
-    </p:custDataLst>
-  </p:cSld>
-  <p:clrMapOvr>
-    <a:masterClrMapping/>
-  </p:clrMapOvr>
-  <p:transition spd="slow">
-    <p:fade/>
-  </p:transition>
-  <p:timing>
-    <p:tnLst>
-      <p:par>
-        <p:cTn id="1" dur="indefinite" restart="never" nodeType="tmRoot"/>
-      </p:par>
-    </p:tnLst>
-  </p:timing>
-</p:sld>
-</file>
-
-<file path=ppt/slides/slide6.xml><?xml version="1.0" encoding="utf-8"?>
-<p:sld xmlns:a="http://schemas.openxmlformats.org/drawingml/2006/main" xmlns:r="http://schemas.openxmlformats.org/officeDocument/2006/relationships" xmlns:p="http://schemas.openxmlformats.org/presentationml/2006/main">
-  <p:cSld>
-    <p:spTree>
-      <p:nvGrpSpPr>
-        <p:cNvPr id="1" name=""/>
-        <p:cNvGrpSpPr/>
-        <p:nvPr/>
-      </p:nvGrpSpPr>
-      <p:grpSpPr>
-        <a:xfrm>
-          <a:off x="0" y="0"/>
-          <a:ext cx="0" cy="0"/>
-          <a:chOff x="0" y="0"/>
-          <a:chExt cx="0" cy="0"/>
-        </a:xfrm>
-      </p:grpSpPr>
-      <p:sp>
-        <p:nvSpPr>
-          <p:cNvPr id="2" name="Title 1"/>
-          <p:cNvSpPr>
-            <a:spLocks noGrp="1"/>
-          </p:cNvSpPr>
-          <p:nvPr>
-            <p:ph type="title"/>
-            <p:custDataLst>
-              <p:tags r:id="rId2"/>
-            </p:custDataLst>
-          </p:nvPr>
-        </p:nvSpPr>
-        <p:spPr/>
-        <p:txBody>
-          <a:bodyPr/>
-          <a:lstStyle/>
-          <a:p>
-            <a:r>
-              <a:rPr lang="en-US" dirty="0" smtClean="0"/>
-              <a:t>Outline</a:t>
-            </a:r>
-            <a:endParaRPr lang="en-US" dirty="0"/>
-          </a:p>
-        </p:txBody>
-      </p:sp>
-      <p:sp>
-        <p:nvSpPr>
-          <p:cNvPr id="5" name="Content Placeholder 4"/>
-          <p:cNvSpPr>
-            <a:spLocks noGrp="1"/>
-          </p:cNvSpPr>
-          <p:nvPr>
-            <p:ph idx="1"/>
-            <p:custDataLst>
-              <p:tags r:id="rId3"/>
-            </p:custDataLst>
-          </p:nvPr>
-        </p:nvSpPr>
-        <p:spPr/>
-        <p:txBody>
-          <a:bodyPr>
-            <a:normAutofit/>
-          </a:bodyPr>
-          <a:lstStyle/>
-          <a:p>
-            <a:r>
-              <a:rPr lang="en-US" dirty="0" smtClean="0"/>
-              <a:t>What needs to be sustained </a:t>
-            </a:r>
-          </a:p>
-          <a:p>
-            <a:r>
-              <a:rPr lang="en-US" dirty="0" smtClean="0"/>
-              <a:t>Costs</a:t>
-            </a:r>
-          </a:p>
-          <a:p>
-            <a:r>
-              <a:rPr lang="en-US" dirty="0" smtClean="0"/>
-              <a:t>Business models</a:t>
-            </a:r>
-            <a:endParaRPr lang="en-US" dirty="0"/>
-          </a:p>
-        </p:txBody>
-      </p:sp>
-    </p:spTree>
-    <p:custDataLst>
-      <p:tags r:id="rId1"/>
-    </p:custDataLst>
-  </p:cSld>
-  <p:clrMapOvr>
-    <a:masterClrMapping/>
-  </p:clrMapOvr>
-  <p:transition spd="slow">
-    <p:wipe dir="d"/>
-  </p:transition>
   <p:timing>
     <p:tnLst>
       <p:par>
@@ -6242,7 +7595,7 @@
           <a:p>
             <a:r>
               <a:rPr lang="en-US" dirty="0" smtClean="0"/>
-              <a:t>Paradigm Shift</a:t>
+              <a:t>Linked Data</a:t>
             </a:r>
             <a:endParaRPr lang="en-US" dirty="0"/>
           </a:p>
@@ -6265,104 +7618,63 @@
           <a:p>
             <a:r>
               <a:rPr lang="en-US" dirty="0" smtClean="0"/>
-              <a:t>From: Paper publications as the product</a:t>
-            </a:r>
-          </a:p>
-          <a:p>
-            <a:r>
-              <a:rPr lang="en-US" dirty="0" smtClean="0"/>
-              <a:t>To: Information via web services as the product </a:t>
-            </a:r>
+              <a:t>Use identifiers that can be dereferenced on the WWW</a:t>
+            </a:r>
+          </a:p>
+          <a:p>
+            <a:r>
+              <a:rPr lang="en-US" dirty="0" smtClean="0"/>
+              <a:t>Enable navigation between related </a:t>
+            </a:r>
+            <a:r>
+              <a:rPr lang="en-US" dirty="0" smtClean="0"/>
+              <a:t>resources</a:t>
+            </a:r>
+          </a:p>
+          <a:p>
+            <a:r>
+              <a:rPr lang="en-US" dirty="0" smtClean="0"/>
+              <a:t>Leverage web </a:t>
+            </a:r>
+            <a:r>
+              <a:rPr lang="en-US" dirty="0" err="1" smtClean="0"/>
+              <a:t>archecture</a:t>
+            </a:r>
+            <a:endParaRPr lang="en-US" dirty="0" smtClean="0"/>
+          </a:p>
+          <a:p>
             <a:endParaRPr lang="en-US" dirty="0"/>
           </a:p>
-        </p:txBody>
-      </p:sp>
-      <p:pic>
-        <p:nvPicPr>
-          <p:cNvPr id="1028" name="Picture 4" descr="https://encrypted-tbn1.gstatic.com/images?q=tbn:ANd9GcRbgruyKr4FgIaCjZpvoCF83xj2-2jv1Iw0VpazuSXvyxaUX-ftag"/>
-          <p:cNvPicPr>
-            <a:picLocks noChangeAspect="1" noChangeArrowheads="1"/>
-          </p:cNvPicPr>
-          <p:nvPr/>
-        </p:nvPicPr>
-        <p:blipFill>
-          <a:blip r:embed="rId2">
-            <a:extLst>
-              <a:ext uri="{28A0092B-C50C-407E-A947-70E740481C1C}">
-                <a14:useLocalDpi xmlns:a14="http://schemas.microsoft.com/office/drawing/2010/main" val="0"/>
-              </a:ext>
-            </a:extLst>
-          </a:blip>
-          <a:srcRect/>
-          <a:stretch>
-            <a:fillRect/>
-          </a:stretch>
-        </p:blipFill>
-        <p:spPr bwMode="auto">
-          <a:xfrm>
-            <a:off x="10058400" y="2819400"/>
-            <a:ext cx="2162175" cy="2114550"/>
-          </a:xfrm>
-          <a:prstGeom prst="rect">
-            <a:avLst/>
-          </a:prstGeom>
-          <a:noFill/>
-          <a:extLst>
-            <a:ext uri="{909E8E84-426E-40DD-AFC4-6F175D3DCCD1}">
-              <a14:hiddenFill xmlns:a14="http://schemas.microsoft.com/office/drawing/2010/main">
-                <a:solidFill>
-                  <a:srgbClr val="FFFFFF"/>
-                </a:solidFill>
-              </a14:hiddenFill>
-            </a:ext>
-          </a:extLst>
-        </p:spPr>
-      </p:pic>
-      <p:pic>
-        <p:nvPicPr>
-          <p:cNvPr id="1030" name="Picture 6" descr="http://www.aronsonsecurity.com/Portals/55833/images/newparadigmahead.jpg"/>
-          <p:cNvPicPr>
-            <a:picLocks noChangeAspect="1" noChangeArrowheads="1"/>
-          </p:cNvPicPr>
-          <p:nvPr/>
-        </p:nvPicPr>
-        <p:blipFill>
-          <a:blip r:embed="rId3">
-            <a:extLst>
-              <a:ext uri="{28A0092B-C50C-407E-A947-70E740481C1C}">
-                <a14:useLocalDpi xmlns:a14="http://schemas.microsoft.com/office/drawing/2010/main" val="0"/>
-              </a:ext>
-            </a:extLst>
-          </a:blip>
-          <a:srcRect/>
-          <a:stretch>
-            <a:fillRect/>
-          </a:stretch>
-        </p:blipFill>
-        <p:spPr bwMode="auto">
-          <a:xfrm>
-            <a:off x="1077884" y="3590924"/>
-            <a:ext cx="4048125" cy="2686051"/>
-          </a:xfrm>
-          <a:prstGeom prst="rect">
-            <a:avLst/>
-          </a:prstGeom>
-          <a:noFill/>
-          <a:extLst>
-            <a:ext uri="{909E8E84-426E-40DD-AFC4-6F175D3DCCD1}">
-              <a14:hiddenFill xmlns:a14="http://schemas.microsoft.com/office/drawing/2010/main">
-                <a:solidFill>
-                  <a:srgbClr val="FFFFFF"/>
-                </a:solidFill>
-              </a14:hiddenFill>
-            </a:ext>
-          </a:extLst>
-        </p:spPr>
-      </p:pic>
+          <a:p>
+            <a:pPr marL="0" indent="0">
+              <a:buNone/>
+            </a:pPr>
+            <a:r>
+              <a:rPr lang="en-US" sz="2000" dirty="0" err="1"/>
+              <a:t>GitHub</a:t>
+            </a:r>
+            <a:r>
+              <a:rPr lang="en-US" sz="2000" dirty="0"/>
+              <a:t>\USGIN\Workshops\</a:t>
+            </a:r>
+            <a:r>
+              <a:rPr lang="en-US" sz="2000" dirty="0" err="1"/>
+              <a:t>WesternRegionalWorkshopWMS_URIDemo.mxd</a:t>
+            </a:r>
+            <a:endParaRPr lang="en-US" sz="2000" dirty="0" smtClean="0"/>
+          </a:p>
+          <a:p>
+            <a:endParaRPr lang="en-US" dirty="0"/>
+          </a:p>
+          <a:p>
+            <a:endParaRPr lang="en-US" dirty="0"/>
+          </a:p>
+        </p:txBody>
+      </p:sp>
     </p:spTree>
     <p:extLst>
       <p:ext uri="{BB962C8B-B14F-4D97-AF65-F5344CB8AC3E}">
-        <p14:creationId xmlns:p14="http://schemas.microsoft.com/office/powerpoint/2010/main" val="137891083"/>
+        <p14:creationId xmlns:p14="http://schemas.microsoft.com/office/powerpoint/2010/main" val="3393243109"/>
       </p:ext>
     </p:extLst>
   </p:cSld>
@@ -6372,6 +7684,13 @@
   <p:transition spd="slow">
     <p:wipe dir="d"/>
   </p:transition>
+  <p:timing>
+    <p:tnLst>
+      <p:par>
+        <p:cTn id="1" dur="indefinite" restart="never" nodeType="tmRoot"/>
+      </p:par>
+    </p:tnLst>
+  </p:timing>
 </p:sld>
 </file>
 
@@ -6399,7 +7718,10 @@
             <a:spLocks noGrp="1"/>
           </p:cNvSpPr>
           <p:nvPr>
-            <p:ph type="title"/>
+            <p:ph type="ctrTitle"/>
+            <p:custDataLst>
+              <p:tags r:id="rId2"/>
+            </p:custDataLst>
           </p:nvPr>
         </p:nvSpPr>
         <p:spPr/>
@@ -6409,7 +7731,7 @@
           <a:p>
             <a:r>
               <a:rPr lang="en-US" dirty="0" smtClean="0"/>
-              <a:t>State surveys as data providers</a:t>
+              <a:t>NGDS Sustainability</a:t>
             </a:r>
             <a:endParaRPr lang="en-US" dirty="0"/>
           </a:p>
@@ -6417,52 +7739,62 @@
       </p:sp>
       <p:sp>
         <p:nvSpPr>
-          <p:cNvPr id="3" name="Content Placeholder 2"/>
-          <p:cNvSpPr>
-            <a:spLocks noGrp="1"/>
-          </p:cNvSpPr>
-          <p:nvPr>
-            <p:ph idx="1"/>
+          <p:cNvPr id="3" name="Subtitle 2"/>
+          <p:cNvSpPr>
+            <a:spLocks noGrp="1"/>
+          </p:cNvSpPr>
+          <p:nvPr>
+            <p:ph type="subTitle" idx="1"/>
+            <p:custDataLst>
+              <p:tags r:id="rId3"/>
+            </p:custDataLst>
           </p:nvPr>
         </p:nvSpPr>
         <p:spPr/>
         <p:txBody>
-          <a:bodyPr/>
+          <a:bodyPr>
+            <a:normAutofit/>
+          </a:bodyPr>
           <a:lstStyle/>
           <a:p>
             <a:r>
-              <a:rPr lang="en-US" dirty="0" smtClean="0"/>
-              <a:t>We all have web servers and web sites </a:t>
-            </a:r>
-          </a:p>
-          <a:p>
-            <a:r>
-              <a:rPr lang="en-US" dirty="0" smtClean="0"/>
-              <a:t>Run data services </a:t>
-            </a:r>
-          </a:p>
-          <a:p>
-            <a:r>
-              <a:rPr lang="en-US" dirty="0" smtClean="0"/>
-              <a:t>Have to integrate web usage metrics into agency performance assessment</a:t>
-            </a:r>
-            <a:endParaRPr lang="en-US" dirty="0"/>
+              <a:rPr lang="en-US" sz="2400" dirty="0" smtClean="0">
+                <a:latin typeface="+mn-lt"/>
+              </a:rPr>
+              <a:t>Stephen Richard and NGDS team</a:t>
+            </a:r>
+          </a:p>
+          <a:p>
+            <a:r>
+              <a:rPr lang="en-US" sz="2400" dirty="0" smtClean="0">
+                <a:latin typeface="+mn-lt"/>
+              </a:rPr>
+              <a:t>Reno, NV  May 14, 2013 </a:t>
+            </a:r>
+            <a:endParaRPr lang="en-US" sz="2400" dirty="0">
+              <a:latin typeface="+mn-lt"/>
+            </a:endParaRPr>
           </a:p>
         </p:txBody>
       </p:sp>
     </p:spTree>
-    <p:extLst>
-      <p:ext uri="{BB962C8B-B14F-4D97-AF65-F5344CB8AC3E}">
-        <p14:creationId xmlns:p14="http://schemas.microsoft.com/office/powerpoint/2010/main" val="1464449752"/>
-      </p:ext>
-    </p:extLst>
+    <p:custDataLst>
+      <p:tags r:id="rId1"/>
+    </p:custDataLst>
   </p:cSld>
   <p:clrMapOvr>
     <a:masterClrMapping/>
   </p:clrMapOvr>
   <p:transition spd="slow">
-    <p:wipe dir="d"/>
+    <p:fade/>
   </p:transition>
+  <p:timing>
+    <p:tnLst>
+      <p:par>
+        <p:cTn id="1" dur="indefinite" restart="never" nodeType="tmRoot"/>
+      </p:par>
+    </p:tnLst>
+  </p:timing>
 </p:sld>
 </file>
 
@@ -6491,6 +7823,9 @@
           </p:cNvSpPr>
           <p:nvPr>
             <p:ph type="title"/>
+            <p:custDataLst>
+              <p:tags r:id="rId2"/>
+            </p:custDataLst>
           </p:nvPr>
         </p:nvSpPr>
         <p:spPr/>
@@ -6500,7 +7835,7 @@
           <a:p>
             <a:r>
               <a:rPr lang="en-US" dirty="0" smtClean="0"/>
-              <a:t>What needs to be maintained</a:t>
+              <a:t>Outline</a:t>
             </a:r>
             <a:endParaRPr lang="en-US" dirty="0"/>
           </a:p>
@@ -6508,20 +7843,18 @@
       </p:sp>
       <p:sp>
         <p:nvSpPr>
-          <p:cNvPr id="3" name="Content Placeholder 2"/>
+          <p:cNvPr id="5" name="Content Placeholder 4"/>
           <p:cNvSpPr>
             <a:spLocks noGrp="1"/>
           </p:cNvSpPr>
           <p:nvPr>
             <p:ph idx="1"/>
-          </p:nvPr>
-        </p:nvSpPr>
-        <p:spPr>
-          <a:xfrm>
-            <a:off x="762000" y="1596413"/>
-            <a:ext cx="8077200" cy="4575787"/>
-          </a:xfrm>
-        </p:spPr>
+            <p:custDataLst>
+              <p:tags r:id="rId3"/>
+            </p:custDataLst>
+          </p:nvPr>
+        </p:nvSpPr>
+        <p:spPr/>
         <p:txBody>
           <a:bodyPr>
             <a:normAutofit/>
@@ -6530,66 +7863,28 @@
           <a:p>
             <a:r>
               <a:rPr lang="en-US" dirty="0" smtClean="0"/>
-              <a:t>Web server:</a:t>
-            </a:r>
-          </a:p>
-          <a:p>
-            <a:pPr lvl="1"/>
-            <a:r>
-              <a:rPr lang="en-US" dirty="0" smtClean="0"/>
-              <a:t>Physical server</a:t>
-            </a:r>
-          </a:p>
-          <a:p>
-            <a:pPr lvl="1"/>
-            <a:r>
-              <a:rPr lang="en-US" dirty="0" smtClean="0"/>
-              <a:t>Cloud server</a:t>
-            </a:r>
-          </a:p>
-          <a:p>
-            <a:pPr lvl="1"/>
-            <a:r>
-              <a:rPr lang="en-US" dirty="0" smtClean="0"/>
-              <a:t>Hosting service</a:t>
-            </a:r>
-          </a:p>
-          <a:p>
-            <a:r>
-              <a:rPr lang="en-US" dirty="0" smtClean="0"/>
-              <a:t>Datasets:</a:t>
-            </a:r>
-          </a:p>
-          <a:p>
-            <a:pPr lvl="1"/>
-            <a:r>
-              <a:rPr lang="en-US" dirty="0" smtClean="0"/>
-              <a:t>Correct errors</a:t>
-            </a:r>
-          </a:p>
-          <a:p>
-            <a:pPr lvl="1"/>
-            <a:r>
-              <a:rPr lang="en-US" dirty="0" smtClean="0"/>
-              <a:t>Update with new data</a:t>
-            </a:r>
-          </a:p>
-          <a:p>
-            <a:pPr lvl="1"/>
-            <a:r>
-              <a:rPr lang="en-US" dirty="0" smtClean="0"/>
-              <a:t>Upgrade as software evolves</a:t>
+              <a:t>What needs to be sustained </a:t>
+            </a:r>
+          </a:p>
+          <a:p>
+            <a:r>
+              <a:rPr lang="en-US" dirty="0" smtClean="0"/>
+              <a:t>Costs</a:t>
+            </a:r>
+          </a:p>
+          <a:p>
+            <a:r>
+              <a:rPr lang="en-US" dirty="0" smtClean="0"/>
+              <a:t>Business models</a:t>
             </a:r>
             <a:endParaRPr lang="en-US" dirty="0"/>
           </a:p>
         </p:txBody>
       </p:sp>
     </p:spTree>
-    <p:extLst>
-      <p:ext uri="{BB962C8B-B14F-4D97-AF65-F5344CB8AC3E}">
-        <p14:creationId xmlns:p14="http://schemas.microsoft.com/office/powerpoint/2010/main" val="1930345773"/>
-      </p:ext>
-    </p:extLst>
+    <p:custDataLst>
+      <p:tags r:id="rId1"/>
+    </p:custDataLst>
   </p:cSld>
   <p:clrMapOvr>
     <a:masterClrMapping/>
@@ -6597,6 +7892,13 @@
   <p:transition spd="slow">
     <p:wipe dir="d"/>
   </p:transition>
+  <p:timing>
+    <p:tnLst>
+      <p:par>
+        <p:cTn id="1" dur="indefinite" restart="never" nodeType="tmRoot"/>
+      </p:par>
+    </p:tnLst>
+  </p:timing>
 </p:sld>
 </file>
 

</xml_diff>